<commit_message>
Initial develop commit from svn:1902
</commit_message>
<xml_diff>
--- a/Documentation/CohortGeneration.pptx
+++ b/Documentation/CohortGeneration.pptx
@@ -5,12 +5,15 @@
     <p:sldMasterId id="2147483648" r:id="rId1"/>
   </p:sldMasterIdLst>
   <p:notesMasterIdLst>
-    <p:notesMasterId r:id="rId5"/>
+    <p:notesMasterId r:id="rId8"/>
   </p:notesMasterIdLst>
   <p:sldIdLst>
     <p:sldId id="256" r:id="rId2"/>
     <p:sldId id="257" r:id="rId3"/>
     <p:sldId id="258" r:id="rId4"/>
+    <p:sldId id="259" r:id="rId5"/>
+    <p:sldId id="260" r:id="rId6"/>
+    <p:sldId id="261" r:id="rId7"/>
   </p:sldIdLst>
   <p:sldSz cx="12192000" cy="6858000"/>
   <p:notesSz cx="6858000" cy="9144000"/>
@@ -109,6 +112,11 @@
       </a:defRPr>
     </a:lvl9pPr>
   </p:defaultTextStyle>
+  <p:extLst>
+    <p:ext uri="{EFAFB233-063F-42B5-8137-9DF3F51BA10A}">
+      <p15:sldGuideLst xmlns:p15="http://schemas.microsoft.com/office/powerpoint/2012/main"/>
+    </p:ext>
+  </p:extLst>
 </p:presentation>
 </file>
 
@@ -194,7 +202,7 @@
           <a:p>
             <a:fld id="{E6799723-5C7A-4148-A580-1582FB869D21}" type="datetimeFigureOut">
               <a:rPr lang="en-GB" smtClean="0"/>
-              <a:t>22/10/2015</a:t>
+              <a:t>15/08/2017</a:t>
             </a:fld>
             <a:endParaRPr lang="en-GB"/>
           </a:p>
@@ -258,35 +266,35 @@
           <a:p>
             <a:pPr lvl="0"/>
             <a:r>
-              <a:rPr lang="en-US" smtClean="0"/>
+              <a:rPr lang="en-US"/>
               <a:t>Click to edit Master text styles</a:t>
             </a:r>
           </a:p>
           <a:p>
             <a:pPr lvl="1"/>
             <a:r>
-              <a:rPr lang="en-US" smtClean="0"/>
+              <a:rPr lang="en-US"/>
               <a:t>Second level</a:t>
             </a:r>
           </a:p>
           <a:p>
             <a:pPr lvl="2"/>
             <a:r>
-              <a:rPr lang="en-US" smtClean="0"/>
+              <a:rPr lang="en-US"/>
               <a:t>Third level</a:t>
             </a:r>
           </a:p>
           <a:p>
             <a:pPr lvl="3"/>
             <a:r>
-              <a:rPr lang="en-US" smtClean="0"/>
+              <a:rPr lang="en-US"/>
               <a:t>Fourth level</a:t>
             </a:r>
           </a:p>
           <a:p>
             <a:pPr lvl="4"/>
             <a:r>
-              <a:rPr lang="en-US" smtClean="0"/>
+              <a:rPr lang="en-US"/>
               <a:t>Fifth level</a:t>
             </a:r>
             <a:endParaRPr lang="en-GB"/>
@@ -588,7 +596,7 @@
           </a:lstStyle>
           <a:p>
             <a:r>
-              <a:rPr lang="en-US" smtClean="0"/>
+              <a:rPr lang="en-US"/>
               <a:t>Click to edit Master title style</a:t>
             </a:r>
             <a:endParaRPr lang="en-GB"/>
@@ -653,7 +661,7 @@
           </a:lstStyle>
           <a:p>
             <a:r>
-              <a:rPr lang="en-US" smtClean="0"/>
+              <a:rPr lang="en-US"/>
               <a:t>Click to edit Master subtitle style</a:t>
             </a:r>
             <a:endParaRPr lang="en-GB"/>
@@ -677,7 +685,7 @@
           <a:p>
             <a:fld id="{A4B2E03E-B9F4-48CD-BEDC-03BA93144C1F}" type="datetimeFigureOut">
               <a:rPr lang="en-GB" smtClean="0"/>
-              <a:t>22/10/2015</a:t>
+              <a:t>15/08/2017</a:t>
             </a:fld>
             <a:endParaRPr lang="en-GB"/>
           </a:p>
@@ -771,7 +779,7 @@
           <a:lstStyle/>
           <a:p>
             <a:r>
-              <a:rPr lang="en-US" smtClean="0"/>
+              <a:rPr lang="en-US"/>
               <a:t>Click to edit Master title style</a:t>
             </a:r>
             <a:endParaRPr lang="en-GB"/>
@@ -795,35 +803,35 @@
           <a:p>
             <a:pPr lvl="0"/>
             <a:r>
-              <a:rPr lang="en-US" smtClean="0"/>
+              <a:rPr lang="en-US"/>
               <a:t>Click to edit Master text styles</a:t>
             </a:r>
           </a:p>
           <a:p>
             <a:pPr lvl="1"/>
             <a:r>
-              <a:rPr lang="en-US" smtClean="0"/>
+              <a:rPr lang="en-US"/>
               <a:t>Second level</a:t>
             </a:r>
           </a:p>
           <a:p>
             <a:pPr lvl="2"/>
             <a:r>
-              <a:rPr lang="en-US" smtClean="0"/>
+              <a:rPr lang="en-US"/>
               <a:t>Third level</a:t>
             </a:r>
           </a:p>
           <a:p>
             <a:pPr lvl="3"/>
             <a:r>
-              <a:rPr lang="en-US" smtClean="0"/>
+              <a:rPr lang="en-US"/>
               <a:t>Fourth level</a:t>
             </a:r>
           </a:p>
           <a:p>
             <a:pPr lvl="4"/>
             <a:r>
-              <a:rPr lang="en-US" smtClean="0"/>
+              <a:rPr lang="en-US"/>
               <a:t>Fifth level</a:t>
             </a:r>
             <a:endParaRPr lang="en-GB"/>
@@ -847,7 +855,7 @@
           <a:p>
             <a:fld id="{A4B2E03E-B9F4-48CD-BEDC-03BA93144C1F}" type="datetimeFigureOut">
               <a:rPr lang="en-GB" smtClean="0"/>
-              <a:t>22/10/2015</a:t>
+              <a:t>15/08/2017</a:t>
             </a:fld>
             <a:endParaRPr lang="en-GB"/>
           </a:p>
@@ -946,7 +954,7 @@
           <a:lstStyle/>
           <a:p>
             <a:r>
-              <a:rPr lang="en-US" smtClean="0"/>
+              <a:rPr lang="en-US"/>
               <a:t>Click to edit Master title style</a:t>
             </a:r>
             <a:endParaRPr lang="en-GB"/>
@@ -975,35 +983,35 @@
           <a:p>
             <a:pPr lvl="0"/>
             <a:r>
-              <a:rPr lang="en-US" smtClean="0"/>
+              <a:rPr lang="en-US"/>
               <a:t>Click to edit Master text styles</a:t>
             </a:r>
           </a:p>
           <a:p>
             <a:pPr lvl="1"/>
             <a:r>
-              <a:rPr lang="en-US" smtClean="0"/>
+              <a:rPr lang="en-US"/>
               <a:t>Second level</a:t>
             </a:r>
           </a:p>
           <a:p>
             <a:pPr lvl="2"/>
             <a:r>
-              <a:rPr lang="en-US" smtClean="0"/>
+              <a:rPr lang="en-US"/>
               <a:t>Third level</a:t>
             </a:r>
           </a:p>
           <a:p>
             <a:pPr lvl="3"/>
             <a:r>
-              <a:rPr lang="en-US" smtClean="0"/>
+              <a:rPr lang="en-US"/>
               <a:t>Fourth level</a:t>
             </a:r>
           </a:p>
           <a:p>
             <a:pPr lvl="4"/>
             <a:r>
-              <a:rPr lang="en-US" smtClean="0"/>
+              <a:rPr lang="en-US"/>
               <a:t>Fifth level</a:t>
             </a:r>
             <a:endParaRPr lang="en-GB"/>
@@ -1027,7 +1035,7 @@
           <a:p>
             <a:fld id="{A4B2E03E-B9F4-48CD-BEDC-03BA93144C1F}" type="datetimeFigureOut">
               <a:rPr lang="en-GB" smtClean="0"/>
-              <a:t>22/10/2015</a:t>
+              <a:t>15/08/2017</a:t>
             </a:fld>
             <a:endParaRPr lang="en-GB"/>
           </a:p>
@@ -1121,7 +1129,7 @@
           <a:lstStyle/>
           <a:p>
             <a:r>
-              <a:rPr lang="en-US" smtClean="0"/>
+              <a:rPr lang="en-US"/>
               <a:t>Click to edit Master title style</a:t>
             </a:r>
             <a:endParaRPr lang="en-GB"/>
@@ -1145,35 +1153,35 @@
           <a:p>
             <a:pPr lvl="0"/>
             <a:r>
-              <a:rPr lang="en-US" smtClean="0"/>
+              <a:rPr lang="en-US"/>
               <a:t>Click to edit Master text styles</a:t>
             </a:r>
           </a:p>
           <a:p>
             <a:pPr lvl="1"/>
             <a:r>
-              <a:rPr lang="en-US" smtClean="0"/>
+              <a:rPr lang="en-US"/>
               <a:t>Second level</a:t>
             </a:r>
           </a:p>
           <a:p>
             <a:pPr lvl="2"/>
             <a:r>
-              <a:rPr lang="en-US" smtClean="0"/>
+              <a:rPr lang="en-US"/>
               <a:t>Third level</a:t>
             </a:r>
           </a:p>
           <a:p>
             <a:pPr lvl="3"/>
             <a:r>
-              <a:rPr lang="en-US" smtClean="0"/>
+              <a:rPr lang="en-US"/>
               <a:t>Fourth level</a:t>
             </a:r>
           </a:p>
           <a:p>
             <a:pPr lvl="4"/>
             <a:r>
-              <a:rPr lang="en-US" smtClean="0"/>
+              <a:rPr lang="en-US"/>
               <a:t>Fifth level</a:t>
             </a:r>
             <a:endParaRPr lang="en-GB"/>
@@ -1197,7 +1205,7 @@
           <a:p>
             <a:fld id="{A4B2E03E-B9F4-48CD-BEDC-03BA93144C1F}" type="datetimeFigureOut">
               <a:rPr lang="en-GB" smtClean="0"/>
-              <a:t>22/10/2015</a:t>
+              <a:t>15/08/2017</a:t>
             </a:fld>
             <a:endParaRPr lang="en-GB"/>
           </a:p>
@@ -1300,7 +1308,7 @@
           </a:lstStyle>
           <a:p>
             <a:r>
-              <a:rPr lang="en-US" smtClean="0"/>
+              <a:rPr lang="en-US"/>
               <a:t>Click to edit Master title style</a:t>
             </a:r>
             <a:endParaRPr lang="en-GB"/>
@@ -1420,7 +1428,7 @@
           <a:p>
             <a:pPr lvl="0"/>
             <a:r>
-              <a:rPr lang="en-US" smtClean="0"/>
+              <a:rPr lang="en-US"/>
               <a:t>Click to edit Master text styles</a:t>
             </a:r>
           </a:p>
@@ -1443,7 +1451,7 @@
           <a:p>
             <a:fld id="{A4B2E03E-B9F4-48CD-BEDC-03BA93144C1F}" type="datetimeFigureOut">
               <a:rPr lang="en-GB" smtClean="0"/>
-              <a:t>22/10/2015</a:t>
+              <a:t>15/08/2017</a:t>
             </a:fld>
             <a:endParaRPr lang="en-GB"/>
           </a:p>
@@ -1537,7 +1545,7 @@
           <a:lstStyle/>
           <a:p>
             <a:r>
-              <a:rPr lang="en-US" smtClean="0"/>
+              <a:rPr lang="en-US"/>
               <a:t>Click to edit Master title style</a:t>
             </a:r>
             <a:endParaRPr lang="en-GB"/>
@@ -1566,35 +1574,35 @@
           <a:p>
             <a:pPr lvl="0"/>
             <a:r>
-              <a:rPr lang="en-US" smtClean="0"/>
+              <a:rPr lang="en-US"/>
               <a:t>Click to edit Master text styles</a:t>
             </a:r>
           </a:p>
           <a:p>
             <a:pPr lvl="1"/>
             <a:r>
-              <a:rPr lang="en-US" smtClean="0"/>
+              <a:rPr lang="en-US"/>
               <a:t>Second level</a:t>
             </a:r>
           </a:p>
           <a:p>
             <a:pPr lvl="2"/>
             <a:r>
-              <a:rPr lang="en-US" smtClean="0"/>
+              <a:rPr lang="en-US"/>
               <a:t>Third level</a:t>
             </a:r>
           </a:p>
           <a:p>
             <a:pPr lvl="3"/>
             <a:r>
-              <a:rPr lang="en-US" smtClean="0"/>
+              <a:rPr lang="en-US"/>
               <a:t>Fourth level</a:t>
             </a:r>
           </a:p>
           <a:p>
             <a:pPr lvl="4"/>
             <a:r>
-              <a:rPr lang="en-US" smtClean="0"/>
+              <a:rPr lang="en-US"/>
               <a:t>Fifth level</a:t>
             </a:r>
             <a:endParaRPr lang="en-GB"/>
@@ -1623,35 +1631,35 @@
           <a:p>
             <a:pPr lvl="0"/>
             <a:r>
-              <a:rPr lang="en-US" smtClean="0"/>
+              <a:rPr lang="en-US"/>
               <a:t>Click to edit Master text styles</a:t>
             </a:r>
           </a:p>
           <a:p>
             <a:pPr lvl="1"/>
             <a:r>
-              <a:rPr lang="en-US" smtClean="0"/>
+              <a:rPr lang="en-US"/>
               <a:t>Second level</a:t>
             </a:r>
           </a:p>
           <a:p>
             <a:pPr lvl="2"/>
             <a:r>
-              <a:rPr lang="en-US" smtClean="0"/>
+              <a:rPr lang="en-US"/>
               <a:t>Third level</a:t>
             </a:r>
           </a:p>
           <a:p>
             <a:pPr lvl="3"/>
             <a:r>
-              <a:rPr lang="en-US" smtClean="0"/>
+              <a:rPr lang="en-US"/>
               <a:t>Fourth level</a:t>
             </a:r>
           </a:p>
           <a:p>
             <a:pPr lvl="4"/>
             <a:r>
-              <a:rPr lang="en-US" smtClean="0"/>
+              <a:rPr lang="en-US"/>
               <a:t>Fifth level</a:t>
             </a:r>
             <a:endParaRPr lang="en-GB"/>
@@ -1675,7 +1683,7 @@
           <a:p>
             <a:fld id="{A4B2E03E-B9F4-48CD-BEDC-03BA93144C1F}" type="datetimeFigureOut">
               <a:rPr lang="en-GB" smtClean="0"/>
-              <a:t>22/10/2015</a:t>
+              <a:t>15/08/2017</a:t>
             </a:fld>
             <a:endParaRPr lang="en-GB"/>
           </a:p>
@@ -1774,7 +1782,7 @@
           <a:lstStyle/>
           <a:p>
             <a:r>
-              <a:rPr lang="en-US" smtClean="0"/>
+              <a:rPr lang="en-US"/>
               <a:t>Click to edit Master title style</a:t>
             </a:r>
             <a:endParaRPr lang="en-GB"/>
@@ -1840,7 +1848,7 @@
           <a:p>
             <a:pPr lvl="0"/>
             <a:r>
-              <a:rPr lang="en-US" smtClean="0"/>
+              <a:rPr lang="en-US"/>
               <a:t>Click to edit Master text styles</a:t>
             </a:r>
           </a:p>
@@ -1868,35 +1876,35 @@
           <a:p>
             <a:pPr lvl="0"/>
             <a:r>
-              <a:rPr lang="en-US" smtClean="0"/>
+              <a:rPr lang="en-US"/>
               <a:t>Click to edit Master text styles</a:t>
             </a:r>
           </a:p>
           <a:p>
             <a:pPr lvl="1"/>
             <a:r>
-              <a:rPr lang="en-US" smtClean="0"/>
+              <a:rPr lang="en-US"/>
               <a:t>Second level</a:t>
             </a:r>
           </a:p>
           <a:p>
             <a:pPr lvl="2"/>
             <a:r>
-              <a:rPr lang="en-US" smtClean="0"/>
+              <a:rPr lang="en-US"/>
               <a:t>Third level</a:t>
             </a:r>
           </a:p>
           <a:p>
             <a:pPr lvl="3"/>
             <a:r>
-              <a:rPr lang="en-US" smtClean="0"/>
+              <a:rPr lang="en-US"/>
               <a:t>Fourth level</a:t>
             </a:r>
           </a:p>
           <a:p>
             <a:pPr lvl="4"/>
             <a:r>
-              <a:rPr lang="en-US" smtClean="0"/>
+              <a:rPr lang="en-US"/>
               <a:t>Fifth level</a:t>
             </a:r>
             <a:endParaRPr lang="en-GB"/>
@@ -1962,7 +1970,7 @@
           <a:p>
             <a:pPr lvl="0"/>
             <a:r>
-              <a:rPr lang="en-US" smtClean="0"/>
+              <a:rPr lang="en-US"/>
               <a:t>Click to edit Master text styles</a:t>
             </a:r>
           </a:p>
@@ -1990,35 +1998,35 @@
           <a:p>
             <a:pPr lvl="0"/>
             <a:r>
-              <a:rPr lang="en-US" smtClean="0"/>
+              <a:rPr lang="en-US"/>
               <a:t>Click to edit Master text styles</a:t>
             </a:r>
           </a:p>
           <a:p>
             <a:pPr lvl="1"/>
             <a:r>
-              <a:rPr lang="en-US" smtClean="0"/>
+              <a:rPr lang="en-US"/>
               <a:t>Second level</a:t>
             </a:r>
           </a:p>
           <a:p>
             <a:pPr lvl="2"/>
             <a:r>
-              <a:rPr lang="en-US" smtClean="0"/>
+              <a:rPr lang="en-US"/>
               <a:t>Third level</a:t>
             </a:r>
           </a:p>
           <a:p>
             <a:pPr lvl="3"/>
             <a:r>
-              <a:rPr lang="en-US" smtClean="0"/>
+              <a:rPr lang="en-US"/>
               <a:t>Fourth level</a:t>
             </a:r>
           </a:p>
           <a:p>
             <a:pPr lvl="4"/>
             <a:r>
-              <a:rPr lang="en-US" smtClean="0"/>
+              <a:rPr lang="en-US"/>
               <a:t>Fifth level</a:t>
             </a:r>
             <a:endParaRPr lang="en-GB"/>
@@ -2042,7 +2050,7 @@
           <a:p>
             <a:fld id="{A4B2E03E-B9F4-48CD-BEDC-03BA93144C1F}" type="datetimeFigureOut">
               <a:rPr lang="en-GB" smtClean="0"/>
-              <a:t>22/10/2015</a:t>
+              <a:t>15/08/2017</a:t>
             </a:fld>
             <a:endParaRPr lang="en-GB"/>
           </a:p>
@@ -2136,7 +2144,7 @@
           <a:lstStyle/>
           <a:p>
             <a:r>
-              <a:rPr lang="en-US" smtClean="0"/>
+              <a:rPr lang="en-US"/>
               <a:t>Click to edit Master title style</a:t>
             </a:r>
             <a:endParaRPr lang="en-GB"/>
@@ -2160,7 +2168,7 @@
           <a:p>
             <a:fld id="{A4B2E03E-B9F4-48CD-BEDC-03BA93144C1F}" type="datetimeFigureOut">
               <a:rPr lang="en-GB" smtClean="0"/>
-              <a:t>22/10/2015</a:t>
+              <a:t>15/08/2017</a:t>
             </a:fld>
             <a:endParaRPr lang="en-GB"/>
           </a:p>
@@ -2255,7 +2263,7 @@
           <a:p>
             <a:fld id="{A4B2E03E-B9F4-48CD-BEDC-03BA93144C1F}" type="datetimeFigureOut">
               <a:rPr lang="en-GB" smtClean="0"/>
-              <a:t>22/10/2015</a:t>
+              <a:t>15/08/2017</a:t>
             </a:fld>
             <a:endParaRPr lang="en-GB"/>
           </a:p>
@@ -2358,7 +2366,7 @@
           </a:lstStyle>
           <a:p>
             <a:r>
-              <a:rPr lang="en-US" smtClean="0"/>
+              <a:rPr lang="en-US"/>
               <a:t>Click to edit Master title style</a:t>
             </a:r>
             <a:endParaRPr lang="en-GB"/>
@@ -2415,35 +2423,35 @@
           <a:p>
             <a:pPr lvl="0"/>
             <a:r>
-              <a:rPr lang="en-US" smtClean="0"/>
+              <a:rPr lang="en-US"/>
               <a:t>Click to edit Master text styles</a:t>
             </a:r>
           </a:p>
           <a:p>
             <a:pPr lvl="1"/>
             <a:r>
-              <a:rPr lang="en-US" smtClean="0"/>
+              <a:rPr lang="en-US"/>
               <a:t>Second level</a:t>
             </a:r>
           </a:p>
           <a:p>
             <a:pPr lvl="2"/>
             <a:r>
-              <a:rPr lang="en-US" smtClean="0"/>
+              <a:rPr lang="en-US"/>
               <a:t>Third level</a:t>
             </a:r>
           </a:p>
           <a:p>
             <a:pPr lvl="3"/>
             <a:r>
-              <a:rPr lang="en-US" smtClean="0"/>
+              <a:rPr lang="en-US"/>
               <a:t>Fourth level</a:t>
             </a:r>
           </a:p>
           <a:p>
             <a:pPr lvl="4"/>
             <a:r>
-              <a:rPr lang="en-US" smtClean="0"/>
+              <a:rPr lang="en-US"/>
               <a:t>Fifth level</a:t>
             </a:r>
             <a:endParaRPr lang="en-GB"/>
@@ -2509,7 +2517,7 @@
           <a:p>
             <a:pPr lvl="0"/>
             <a:r>
-              <a:rPr lang="en-US" smtClean="0"/>
+              <a:rPr lang="en-US"/>
               <a:t>Click to edit Master text styles</a:t>
             </a:r>
           </a:p>
@@ -2532,7 +2540,7 @@
           <a:p>
             <a:fld id="{A4B2E03E-B9F4-48CD-BEDC-03BA93144C1F}" type="datetimeFigureOut">
               <a:rPr lang="en-GB" smtClean="0"/>
-              <a:t>22/10/2015</a:t>
+              <a:t>15/08/2017</a:t>
             </a:fld>
             <a:endParaRPr lang="en-GB"/>
           </a:p>
@@ -2635,7 +2643,7 @@
           </a:lstStyle>
           <a:p>
             <a:r>
-              <a:rPr lang="en-US" smtClean="0"/>
+              <a:rPr lang="en-US"/>
               <a:t>Click to edit Master title style</a:t>
             </a:r>
             <a:endParaRPr lang="en-GB"/>
@@ -2762,7 +2770,7 @@
           <a:p>
             <a:pPr lvl="0"/>
             <a:r>
-              <a:rPr lang="en-US" smtClean="0"/>
+              <a:rPr lang="en-US"/>
               <a:t>Click to edit Master text styles</a:t>
             </a:r>
           </a:p>
@@ -2785,7 +2793,7 @@
           <a:p>
             <a:fld id="{A4B2E03E-B9F4-48CD-BEDC-03BA93144C1F}" type="datetimeFigureOut">
               <a:rPr lang="en-GB" smtClean="0"/>
-              <a:t>22/10/2015</a:t>
+              <a:t>15/08/2017</a:t>
             </a:fld>
             <a:endParaRPr lang="en-GB"/>
           </a:p>
@@ -2894,7 +2902,7 @@
           <a:lstStyle/>
           <a:p>
             <a:r>
-              <a:rPr lang="en-US" smtClean="0"/>
+              <a:rPr lang="en-US"/>
               <a:t>Click to edit Master title style</a:t>
             </a:r>
             <a:endParaRPr lang="en-GB"/>
@@ -2928,35 +2936,35 @@
           <a:p>
             <a:pPr lvl="0"/>
             <a:r>
-              <a:rPr lang="en-US" smtClean="0"/>
+              <a:rPr lang="en-US"/>
               <a:t>Click to edit Master text styles</a:t>
             </a:r>
           </a:p>
           <a:p>
             <a:pPr lvl="1"/>
             <a:r>
-              <a:rPr lang="en-US" smtClean="0"/>
+              <a:rPr lang="en-US"/>
               <a:t>Second level</a:t>
             </a:r>
           </a:p>
           <a:p>
             <a:pPr lvl="2"/>
             <a:r>
-              <a:rPr lang="en-US" smtClean="0"/>
+              <a:rPr lang="en-US"/>
               <a:t>Third level</a:t>
             </a:r>
           </a:p>
           <a:p>
             <a:pPr lvl="3"/>
             <a:r>
-              <a:rPr lang="en-US" smtClean="0"/>
+              <a:rPr lang="en-US"/>
               <a:t>Fourth level</a:t>
             </a:r>
           </a:p>
           <a:p>
             <a:pPr lvl="4"/>
             <a:r>
-              <a:rPr lang="en-US" smtClean="0"/>
+              <a:rPr lang="en-US"/>
               <a:t>Fifth level</a:t>
             </a:r>
             <a:endParaRPr lang="en-GB"/>
@@ -2998,7 +3006,7 @@
           <a:p>
             <a:fld id="{A4B2E03E-B9F4-48CD-BEDC-03BA93144C1F}" type="datetimeFigureOut">
               <a:rPr lang="en-GB" smtClean="0"/>
-              <a:t>22/10/2015</a:t>
+              <a:t>15/08/2017</a:t>
             </a:fld>
             <a:endParaRPr lang="en-GB"/>
           </a:p>
@@ -3419,7 +3427,7 @@
           <a:lstStyle/>
           <a:p>
             <a:r>
-              <a:rPr lang="en-US" dirty="0" smtClean="0"/>
+              <a:rPr lang="en-US" dirty="0"/>
               <a:t>Cohort Generation</a:t>
             </a:r>
             <a:endParaRPr lang="en-GB" dirty="0"/>
@@ -3442,7 +3450,7 @@
           <a:lstStyle/>
           <a:p>
             <a:r>
-              <a:rPr lang="en-US" dirty="0" smtClean="0"/>
+              <a:rPr lang="en-US" dirty="0"/>
               <a:t>Cohort Manager</a:t>
             </a:r>
             <a:endParaRPr lang="en-GB" dirty="0"/>
@@ -3517,12 +3525,8 @@
               <a:buNone/>
             </a:pPr>
             <a:r>
-              <a:rPr lang="en-US" dirty="0" smtClean="0"/>
-              <a:t>“</a:t>
-            </a:r>
-            <a:r>
               <a:rPr lang="en-US" dirty="0"/>
-              <a:t>I want all </a:t>
+              <a:t>“I want all </a:t>
             </a:r>
             <a:r>
               <a:rPr lang="en-US" b="1" dirty="0">
@@ -3566,22 +3570,14 @@
                   <a:srgbClr val="FF0000"/>
                 </a:solidFill>
               </a:rPr>
-              <a:t>still alive </a:t>
-            </a:r>
-            <a:r>
-              <a:rPr lang="en-US" b="1" dirty="0" smtClean="0">
-                <a:solidFill>
-                  <a:srgbClr val="FF0000"/>
-                </a:solidFill>
-              </a:rPr>
-              <a:t>today</a:t>
-            </a:r>
-            <a:r>
-              <a:rPr lang="en-US" b="1" baseline="30000" dirty="0" smtClean="0"/>
+              <a:t>still alive today</a:t>
+            </a:r>
+            <a:r>
+              <a:rPr lang="en-US" b="1" baseline="30000" dirty="0"/>
               <a:t>3</a:t>
             </a:r>
             <a:r>
-              <a:rPr lang="en-US" dirty="0" smtClean="0"/>
+              <a:rPr lang="en-US" dirty="0"/>
               <a:t>”</a:t>
             </a:r>
           </a:p>
@@ -3589,7 +3585,7 @@
             <a:pPr marL="0" indent="0">
               <a:buNone/>
             </a:pPr>
-            <a:endParaRPr lang="en-US" dirty="0" smtClean="0"/>
+            <a:endParaRPr lang="en-US" dirty="0"/>
           </a:p>
         </p:txBody>
       </p:sp>
@@ -3868,13 +3864,13 @@
           <a:lstStyle/>
           <a:p>
             <a:r>
-              <a:rPr lang="en-US" sz="1200" dirty="0" smtClean="0"/>
+              <a:rPr lang="en-US" sz="1200" dirty="0"/>
               <a:t>Set 1</a:t>
             </a:r>
           </a:p>
           <a:p>
             <a:r>
-              <a:rPr lang="en-US" sz="1200" dirty="0" smtClean="0"/>
+              <a:rPr lang="en-US" sz="1200" dirty="0"/>
               <a:t>People who have ever had Diazepam prescriptions</a:t>
             </a:r>
             <a:endParaRPr lang="en-GB" sz="1200" dirty="0"/>
@@ -3937,13 +3933,13 @@
           <a:lstStyle/>
           <a:p>
             <a:r>
-              <a:rPr lang="en-US" sz="1200" dirty="0" smtClean="0"/>
+              <a:rPr lang="en-US" sz="1200" dirty="0"/>
               <a:t>Set 2</a:t>
             </a:r>
           </a:p>
           <a:p>
             <a:r>
-              <a:rPr lang="en-US" sz="1200" dirty="0" smtClean="0"/>
+              <a:rPr lang="en-US" sz="1200" dirty="0"/>
               <a:t>People who collected diazepam prescriptions before 2000</a:t>
             </a:r>
             <a:endParaRPr lang="en-GB" sz="1200" dirty="0"/>
@@ -3973,13 +3969,13 @@
           <a:lstStyle/>
           <a:p>
             <a:r>
-              <a:rPr lang="en-US" sz="1200" dirty="0" smtClean="0"/>
+              <a:rPr lang="en-US" sz="1200" dirty="0"/>
               <a:t>Set 3 </a:t>
             </a:r>
           </a:p>
           <a:p>
             <a:r>
-              <a:rPr lang="en-US" sz="1200" dirty="0" smtClean="0"/>
+              <a:rPr lang="en-US" sz="1200" dirty="0"/>
               <a:t>People who are dead</a:t>
             </a:r>
             <a:endParaRPr lang="en-GB" sz="1200" dirty="0"/>
@@ -4009,13 +4005,13 @@
           <a:lstStyle/>
           <a:p>
             <a:r>
-              <a:rPr lang="en-US" sz="1200" dirty="0" smtClean="0"/>
+              <a:rPr lang="en-US" sz="1200" dirty="0"/>
               <a:t>Set 3 INTERSECT Set 1 EXCEPT Set 2</a:t>
             </a:r>
           </a:p>
           <a:p>
             <a:r>
-              <a:rPr lang="en-US" sz="1200" dirty="0" smtClean="0"/>
+              <a:rPr lang="en-US" sz="1200" dirty="0"/>
               <a:t>People who were prescribed diazepam for the first time after 2000 and are now dead</a:t>
             </a:r>
           </a:p>
@@ -4044,13 +4040,13 @@
           <a:lstStyle/>
           <a:p>
             <a:r>
-              <a:rPr lang="en-US" sz="1200" dirty="0" smtClean="0"/>
+              <a:rPr lang="en-US" sz="1200" dirty="0"/>
               <a:t>Set 2 INTERSECT Set 3</a:t>
             </a:r>
           </a:p>
           <a:p>
             <a:r>
-              <a:rPr lang="en-US" sz="1200" dirty="0" smtClean="0"/>
+              <a:rPr lang="en-US" sz="1200" dirty="0"/>
               <a:t>People who were prescribed  diazepam before 2000 and are now dead</a:t>
             </a:r>
           </a:p>
@@ -4079,13 +4075,13 @@
           <a:lstStyle/>
           <a:p>
             <a:r>
-              <a:rPr lang="en-US" sz="1200" dirty="0" smtClean="0"/>
+              <a:rPr lang="en-US" sz="1200" dirty="0"/>
               <a:t>Set 1 EXCEPT Set 2 EXCEPT Set 3</a:t>
             </a:r>
           </a:p>
           <a:p>
             <a:r>
-              <a:rPr lang="en-US" sz="1200" dirty="0" smtClean="0"/>
+              <a:rPr lang="en-US" sz="1200" dirty="0"/>
               <a:t>People who were prescribed diazepam for the FIRST time after 2000 and are alive today</a:t>
             </a:r>
           </a:p>
@@ -4114,13 +4110,13 @@
           <a:lstStyle/>
           <a:p>
             <a:r>
-              <a:rPr lang="en-US" sz="1200" dirty="0" smtClean="0"/>
+              <a:rPr lang="en-US" sz="1200" dirty="0"/>
               <a:t>Set 2 EXCEPT Set 3</a:t>
             </a:r>
           </a:p>
           <a:p>
             <a:r>
-              <a:rPr lang="en-US" sz="1200" dirty="0" smtClean="0"/>
+              <a:rPr lang="en-US" sz="1200" dirty="0"/>
               <a:t>People who were prescribed diazepam before 2000 and are still alive</a:t>
             </a:r>
           </a:p>
@@ -4182,13 +4178,13 @@
           <a:lstStyle/>
           <a:p>
             <a:r>
-              <a:rPr lang="en-US" sz="1200" dirty="0" smtClean="0"/>
+              <a:rPr lang="en-US" sz="1200" dirty="0"/>
               <a:t>Set 3  EXCEPT Set 1</a:t>
             </a:r>
           </a:p>
           <a:p>
             <a:r>
-              <a:rPr lang="en-US" sz="1200" dirty="0" smtClean="0"/>
+              <a:rPr lang="en-US" sz="1200" dirty="0"/>
               <a:t>People who are dead and have never been prescribed Diazepam</a:t>
             </a:r>
             <a:endParaRPr lang="en-GB" sz="1200" dirty="0"/>
@@ -4199,6 +4195,2027 @@
     <p:extLst>
       <p:ext uri="{BB962C8B-B14F-4D97-AF65-F5344CB8AC3E}">
         <p14:creationId xmlns:p14="http://schemas.microsoft.com/office/powerpoint/2010/main" val="2524855296"/>
+      </p:ext>
+    </p:extLst>
+  </p:cSld>
+  <p:clrMapOvr>
+    <a:masterClrMapping/>
+  </p:clrMapOvr>
+</p:sld>
+</file>
+
+<file path=ppt/slides/slide4.xml><?xml version="1.0" encoding="utf-8"?>
+<p:sld xmlns:a="http://schemas.openxmlformats.org/drawingml/2006/main" xmlns:r="http://schemas.openxmlformats.org/officeDocument/2006/relationships" xmlns:p="http://schemas.openxmlformats.org/presentationml/2006/main">
+  <p:cSld>
+    <p:spTree>
+      <p:nvGrpSpPr>
+        <p:cNvPr id="1" name=""/>
+        <p:cNvGrpSpPr/>
+        <p:nvPr/>
+      </p:nvGrpSpPr>
+      <p:grpSpPr>
+        <a:xfrm>
+          <a:off x="0" y="0"/>
+          <a:ext cx="0" cy="0"/>
+          <a:chOff x="0" y="0"/>
+          <a:chExt cx="0" cy="0"/>
+        </a:xfrm>
+      </p:grpSpPr>
+      <p:sp>
+        <p:nvSpPr>
+          <p:cNvPr id="2" name="Title 1"/>
+          <p:cNvSpPr>
+            <a:spLocks noGrp="1"/>
+          </p:cNvSpPr>
+          <p:nvPr>
+            <p:ph type="title"/>
+          </p:nvPr>
+        </p:nvSpPr>
+        <p:spPr/>
+        <p:txBody>
+          <a:bodyPr/>
+          <a:lstStyle/>
+          <a:p>
+            <a:r>
+              <a:rPr lang="en-US" dirty="0"/>
+              <a:t>Physical Diagram - Simple Case (1 data server)</a:t>
+            </a:r>
+            <a:endParaRPr lang="en-GB" dirty="0"/>
+          </a:p>
+        </p:txBody>
+      </p:sp>
+      <p:sp>
+        <p:nvSpPr>
+          <p:cNvPr id="5" name="Rectangle 4"/>
+          <p:cNvSpPr/>
+          <p:nvPr/>
+        </p:nvSpPr>
+        <p:spPr>
+          <a:xfrm>
+            <a:off x="3395709" y="4589634"/>
+            <a:ext cx="3994951" cy="435006"/>
+          </a:xfrm>
+          <a:prstGeom prst="rect">
+            <a:avLst/>
+          </a:prstGeom>
+        </p:spPr>
+        <p:style>
+          <a:lnRef idx="2">
+            <a:schemeClr val="accent1">
+              <a:shade val="50000"/>
+            </a:schemeClr>
+          </a:lnRef>
+          <a:fillRef idx="1">
+            <a:schemeClr val="accent1"/>
+          </a:fillRef>
+          <a:effectRef idx="0">
+            <a:schemeClr val="accent1"/>
+          </a:effectRef>
+          <a:fontRef idx="minor">
+            <a:schemeClr val="lt1"/>
+          </a:fontRef>
+        </p:style>
+        <p:txBody>
+          <a:bodyPr rtlCol="0" anchor="ctr"/>
+          <a:lstStyle/>
+          <a:p>
+            <a:pPr algn="ctr"/>
+            <a:r>
+              <a:rPr lang="en-US" dirty="0"/>
+              <a:t>RDMP Software</a:t>
+            </a:r>
+            <a:endParaRPr lang="en-GB" dirty="0"/>
+          </a:p>
+        </p:txBody>
+      </p:sp>
+      <p:sp>
+        <p:nvSpPr>
+          <p:cNvPr id="6" name="Cylinder 5"/>
+          <p:cNvSpPr/>
+          <p:nvPr/>
+        </p:nvSpPr>
+        <p:spPr>
+          <a:xfrm>
+            <a:off x="3249228" y="1548645"/>
+            <a:ext cx="4279036" cy="1753848"/>
+          </a:xfrm>
+          <a:prstGeom prst="can">
+            <a:avLst/>
+          </a:prstGeom>
+        </p:spPr>
+        <p:style>
+          <a:lnRef idx="2">
+            <a:schemeClr val="accent1">
+              <a:shade val="50000"/>
+            </a:schemeClr>
+          </a:lnRef>
+          <a:fillRef idx="1">
+            <a:schemeClr val="accent1"/>
+          </a:fillRef>
+          <a:effectRef idx="0">
+            <a:schemeClr val="accent1"/>
+          </a:effectRef>
+          <a:fontRef idx="minor">
+            <a:schemeClr val="lt1"/>
+          </a:fontRef>
+        </p:style>
+        <p:txBody>
+          <a:bodyPr rtlCol="0" anchor="ctr"/>
+          <a:lstStyle/>
+          <a:p>
+            <a:pPr algn="ctr"/>
+            <a:r>
+              <a:rPr lang="en-US" dirty="0"/>
+              <a:t>Database Server</a:t>
+            </a:r>
+            <a:endParaRPr lang="en-GB" dirty="0"/>
+          </a:p>
+        </p:txBody>
+      </p:sp>
+      <p:sp>
+        <p:nvSpPr>
+          <p:cNvPr id="8" name="Cylinder 7"/>
+          <p:cNvSpPr/>
+          <p:nvPr/>
+        </p:nvSpPr>
+        <p:spPr>
+          <a:xfrm>
+            <a:off x="5388746" y="2874208"/>
+            <a:ext cx="2139518" cy="807867"/>
+          </a:xfrm>
+          <a:prstGeom prst="can">
+            <a:avLst/>
+          </a:prstGeom>
+        </p:spPr>
+        <p:style>
+          <a:lnRef idx="2">
+            <a:schemeClr val="accent1">
+              <a:shade val="50000"/>
+            </a:schemeClr>
+          </a:lnRef>
+          <a:fillRef idx="1">
+            <a:schemeClr val="accent1"/>
+          </a:fillRef>
+          <a:effectRef idx="0">
+            <a:schemeClr val="accent1"/>
+          </a:effectRef>
+          <a:fontRef idx="minor">
+            <a:schemeClr val="lt1"/>
+          </a:fontRef>
+        </p:style>
+        <p:txBody>
+          <a:bodyPr rtlCol="0" anchor="ctr"/>
+          <a:lstStyle/>
+          <a:p>
+            <a:pPr algn="ctr"/>
+            <a:r>
+              <a:rPr lang="en-US" dirty="0"/>
+              <a:t>Database 2</a:t>
+            </a:r>
+            <a:endParaRPr lang="en-GB" dirty="0"/>
+          </a:p>
+        </p:txBody>
+      </p:sp>
+      <p:sp>
+        <p:nvSpPr>
+          <p:cNvPr id="9" name="Cylinder 8"/>
+          <p:cNvSpPr/>
+          <p:nvPr/>
+        </p:nvSpPr>
+        <p:spPr>
+          <a:xfrm>
+            <a:off x="3249228" y="2898559"/>
+            <a:ext cx="2139518" cy="807867"/>
+          </a:xfrm>
+          <a:prstGeom prst="can">
+            <a:avLst/>
+          </a:prstGeom>
+        </p:spPr>
+        <p:style>
+          <a:lnRef idx="2">
+            <a:schemeClr val="accent1">
+              <a:shade val="50000"/>
+            </a:schemeClr>
+          </a:lnRef>
+          <a:fillRef idx="1">
+            <a:schemeClr val="accent1"/>
+          </a:fillRef>
+          <a:effectRef idx="0">
+            <a:schemeClr val="accent1"/>
+          </a:effectRef>
+          <a:fontRef idx="minor">
+            <a:schemeClr val="lt1"/>
+          </a:fontRef>
+        </p:style>
+        <p:txBody>
+          <a:bodyPr rtlCol="0" anchor="ctr"/>
+          <a:lstStyle/>
+          <a:p>
+            <a:pPr algn="ctr"/>
+            <a:r>
+              <a:rPr lang="en-US" dirty="0"/>
+              <a:t>Database 1</a:t>
+            </a:r>
+            <a:endParaRPr lang="en-GB" dirty="0"/>
+          </a:p>
+        </p:txBody>
+      </p:sp>
+      <p:sp>
+        <p:nvSpPr>
+          <p:cNvPr id="10" name="Arrow: Left 9"/>
+          <p:cNvSpPr/>
+          <p:nvPr/>
+        </p:nvSpPr>
+        <p:spPr>
+          <a:xfrm rot="5400000">
+            <a:off x="3892860" y="3924852"/>
+            <a:ext cx="346228" cy="221941"/>
+          </a:xfrm>
+          <a:prstGeom prst="leftArrow">
+            <a:avLst/>
+          </a:prstGeom>
+        </p:spPr>
+        <p:style>
+          <a:lnRef idx="2">
+            <a:schemeClr val="accent1">
+              <a:shade val="50000"/>
+            </a:schemeClr>
+          </a:lnRef>
+          <a:fillRef idx="1">
+            <a:schemeClr val="accent1"/>
+          </a:fillRef>
+          <a:effectRef idx="0">
+            <a:schemeClr val="accent1"/>
+          </a:effectRef>
+          <a:fontRef idx="minor">
+            <a:schemeClr val="lt1"/>
+          </a:fontRef>
+        </p:style>
+        <p:txBody>
+          <a:bodyPr rtlCol="0" anchor="ctr"/>
+          <a:lstStyle/>
+          <a:p>
+            <a:pPr algn="ctr"/>
+            <a:endParaRPr lang="en-GB"/>
+          </a:p>
+        </p:txBody>
+      </p:sp>
+      <p:sp>
+        <p:nvSpPr>
+          <p:cNvPr id="11" name="Rectangle: Folded Corner 10"/>
+          <p:cNvSpPr/>
+          <p:nvPr/>
+        </p:nvSpPr>
+        <p:spPr>
+          <a:xfrm>
+            <a:off x="315095" y="5024640"/>
+            <a:ext cx="2576128" cy="452637"/>
+          </a:xfrm>
+          <a:prstGeom prst="foldedCorner">
+            <a:avLst/>
+          </a:prstGeom>
+        </p:spPr>
+        <p:style>
+          <a:lnRef idx="2">
+            <a:schemeClr val="accent1">
+              <a:shade val="50000"/>
+            </a:schemeClr>
+          </a:lnRef>
+          <a:fillRef idx="1">
+            <a:schemeClr val="accent1"/>
+          </a:fillRef>
+          <a:effectRef idx="0">
+            <a:schemeClr val="accent1"/>
+          </a:effectRef>
+          <a:fontRef idx="minor">
+            <a:schemeClr val="lt1"/>
+          </a:fontRef>
+        </p:style>
+        <p:txBody>
+          <a:bodyPr rtlCol="0" anchor="ctr"/>
+          <a:lstStyle/>
+          <a:p>
+            <a:pPr algn="ctr"/>
+            <a:r>
+              <a:rPr lang="en-US" sz="1600" dirty="0"/>
+              <a:t>Query 1 </a:t>
+            </a:r>
+          </a:p>
+          <a:p>
+            <a:pPr algn="ctr"/>
+            <a:r>
+              <a:rPr lang="en-US" sz="1100" dirty="0"/>
+              <a:t>People on diabetic drugs</a:t>
+            </a:r>
+            <a:endParaRPr lang="en-GB" sz="1100" dirty="0"/>
+          </a:p>
+        </p:txBody>
+      </p:sp>
+      <p:sp>
+        <p:nvSpPr>
+          <p:cNvPr id="12" name="Rectangle: Folded Corner 11"/>
+          <p:cNvSpPr/>
+          <p:nvPr/>
+        </p:nvSpPr>
+        <p:spPr>
+          <a:xfrm>
+            <a:off x="315095" y="5530419"/>
+            <a:ext cx="2576128" cy="452637"/>
+          </a:xfrm>
+          <a:prstGeom prst="foldedCorner">
+            <a:avLst/>
+          </a:prstGeom>
+        </p:spPr>
+        <p:style>
+          <a:lnRef idx="2">
+            <a:schemeClr val="accent1">
+              <a:shade val="50000"/>
+            </a:schemeClr>
+          </a:lnRef>
+          <a:fillRef idx="1">
+            <a:schemeClr val="accent1"/>
+          </a:fillRef>
+          <a:effectRef idx="0">
+            <a:schemeClr val="accent1"/>
+          </a:effectRef>
+          <a:fontRef idx="minor">
+            <a:schemeClr val="lt1"/>
+          </a:fontRef>
+        </p:style>
+        <p:txBody>
+          <a:bodyPr rtlCol="0" anchor="ctr"/>
+          <a:lstStyle/>
+          <a:p>
+            <a:pPr algn="ctr"/>
+            <a:r>
+              <a:rPr lang="en-US" sz="1600" dirty="0"/>
+              <a:t>Query 2 </a:t>
+            </a:r>
+          </a:p>
+          <a:p>
+            <a:pPr algn="ctr"/>
+            <a:r>
+              <a:rPr lang="en-US" sz="1100" dirty="0"/>
+              <a:t>People with a diabetic hospital admission</a:t>
+            </a:r>
+            <a:endParaRPr lang="en-GB" sz="1100" dirty="0"/>
+          </a:p>
+        </p:txBody>
+      </p:sp>
+      <p:sp>
+        <p:nvSpPr>
+          <p:cNvPr id="13" name="Rectangle: Folded Corner 12"/>
+          <p:cNvSpPr/>
+          <p:nvPr/>
+        </p:nvSpPr>
+        <p:spPr>
+          <a:xfrm>
+            <a:off x="3395709" y="4280371"/>
+            <a:ext cx="1198486" cy="229993"/>
+          </a:xfrm>
+          <a:prstGeom prst="foldedCorner">
+            <a:avLst/>
+          </a:prstGeom>
+        </p:spPr>
+        <p:style>
+          <a:lnRef idx="2">
+            <a:schemeClr val="accent1">
+              <a:shade val="50000"/>
+            </a:schemeClr>
+          </a:lnRef>
+          <a:fillRef idx="1">
+            <a:schemeClr val="accent1"/>
+          </a:fillRef>
+          <a:effectRef idx="0">
+            <a:schemeClr val="accent1"/>
+          </a:effectRef>
+          <a:fontRef idx="minor">
+            <a:schemeClr val="lt1"/>
+          </a:fontRef>
+        </p:style>
+        <p:txBody>
+          <a:bodyPr rtlCol="0" anchor="ctr"/>
+          <a:lstStyle/>
+          <a:p>
+            <a:pPr algn="ctr"/>
+            <a:r>
+              <a:rPr lang="en-US" sz="1600" dirty="0"/>
+              <a:t>Query 1</a:t>
+            </a:r>
+          </a:p>
+        </p:txBody>
+      </p:sp>
+      <p:sp>
+        <p:nvSpPr>
+          <p:cNvPr id="18" name="Arrow: Left 17"/>
+          <p:cNvSpPr/>
+          <p:nvPr/>
+        </p:nvSpPr>
+        <p:spPr>
+          <a:xfrm rot="5400000">
+            <a:off x="5189001" y="3924852"/>
+            <a:ext cx="346228" cy="221941"/>
+          </a:xfrm>
+          <a:prstGeom prst="leftArrow">
+            <a:avLst/>
+          </a:prstGeom>
+        </p:spPr>
+        <p:style>
+          <a:lnRef idx="2">
+            <a:schemeClr val="accent1">
+              <a:shade val="50000"/>
+            </a:schemeClr>
+          </a:lnRef>
+          <a:fillRef idx="1">
+            <a:schemeClr val="accent1"/>
+          </a:fillRef>
+          <a:effectRef idx="0">
+            <a:schemeClr val="accent1"/>
+          </a:effectRef>
+          <a:fontRef idx="minor">
+            <a:schemeClr val="lt1"/>
+          </a:fontRef>
+        </p:style>
+        <p:txBody>
+          <a:bodyPr rtlCol="0" anchor="ctr"/>
+          <a:lstStyle/>
+          <a:p>
+            <a:pPr algn="ctr"/>
+            <a:endParaRPr lang="en-GB"/>
+          </a:p>
+        </p:txBody>
+      </p:sp>
+      <p:sp>
+        <p:nvSpPr>
+          <p:cNvPr id="19" name="Rectangle: Folded Corner 18"/>
+          <p:cNvSpPr/>
+          <p:nvPr/>
+        </p:nvSpPr>
+        <p:spPr>
+          <a:xfrm>
+            <a:off x="4691850" y="4280371"/>
+            <a:ext cx="1198486" cy="229993"/>
+          </a:xfrm>
+          <a:prstGeom prst="foldedCorner">
+            <a:avLst/>
+          </a:prstGeom>
+        </p:spPr>
+        <p:style>
+          <a:lnRef idx="2">
+            <a:schemeClr val="accent1">
+              <a:shade val="50000"/>
+            </a:schemeClr>
+          </a:lnRef>
+          <a:fillRef idx="1">
+            <a:schemeClr val="accent1"/>
+          </a:fillRef>
+          <a:effectRef idx="0">
+            <a:schemeClr val="accent1"/>
+          </a:effectRef>
+          <a:fontRef idx="minor">
+            <a:schemeClr val="lt1"/>
+          </a:fontRef>
+        </p:style>
+        <p:txBody>
+          <a:bodyPr rtlCol="0" anchor="ctr"/>
+          <a:lstStyle/>
+          <a:p>
+            <a:pPr algn="ctr"/>
+            <a:r>
+              <a:rPr lang="en-US" sz="1600" dirty="0"/>
+              <a:t>Query 2</a:t>
+            </a:r>
+          </a:p>
+        </p:txBody>
+      </p:sp>
+      <p:sp>
+        <p:nvSpPr>
+          <p:cNvPr id="20" name="Arrow: Left 19"/>
+          <p:cNvSpPr/>
+          <p:nvPr/>
+        </p:nvSpPr>
+        <p:spPr>
+          <a:xfrm rot="5400000">
+            <a:off x="6445193" y="3924851"/>
+            <a:ext cx="346228" cy="221941"/>
+          </a:xfrm>
+          <a:prstGeom prst="leftArrow">
+            <a:avLst/>
+          </a:prstGeom>
+        </p:spPr>
+        <p:style>
+          <a:lnRef idx="2">
+            <a:schemeClr val="accent1">
+              <a:shade val="50000"/>
+            </a:schemeClr>
+          </a:lnRef>
+          <a:fillRef idx="1">
+            <a:schemeClr val="accent1"/>
+          </a:fillRef>
+          <a:effectRef idx="0">
+            <a:schemeClr val="accent1"/>
+          </a:effectRef>
+          <a:fontRef idx="minor">
+            <a:schemeClr val="lt1"/>
+          </a:fontRef>
+        </p:style>
+        <p:txBody>
+          <a:bodyPr rtlCol="0" anchor="ctr"/>
+          <a:lstStyle/>
+          <a:p>
+            <a:pPr algn="ctr"/>
+            <a:endParaRPr lang="en-GB"/>
+          </a:p>
+        </p:txBody>
+      </p:sp>
+      <p:sp>
+        <p:nvSpPr>
+          <p:cNvPr id="21" name="Rectangle: Folded Corner 20"/>
+          <p:cNvSpPr/>
+          <p:nvPr/>
+        </p:nvSpPr>
+        <p:spPr>
+          <a:xfrm>
+            <a:off x="5948041" y="4280370"/>
+            <a:ext cx="1442619" cy="229993"/>
+          </a:xfrm>
+          <a:prstGeom prst="foldedCorner">
+            <a:avLst/>
+          </a:prstGeom>
+        </p:spPr>
+        <p:style>
+          <a:lnRef idx="2">
+            <a:schemeClr val="accent1">
+              <a:shade val="50000"/>
+            </a:schemeClr>
+          </a:lnRef>
+          <a:fillRef idx="1">
+            <a:schemeClr val="accent1"/>
+          </a:fillRef>
+          <a:effectRef idx="0">
+            <a:schemeClr val="accent1"/>
+          </a:effectRef>
+          <a:fontRef idx="minor">
+            <a:schemeClr val="lt1"/>
+          </a:fontRef>
+        </p:style>
+        <p:txBody>
+          <a:bodyPr rtlCol="0" anchor="ctr"/>
+          <a:lstStyle/>
+          <a:p>
+            <a:pPr algn="ctr"/>
+            <a:r>
+              <a:rPr lang="en-US" sz="1600" dirty="0"/>
+              <a:t>Q1+Q2</a:t>
+            </a:r>
+          </a:p>
+        </p:txBody>
+      </p:sp>
+      <p:pic>
+        <p:nvPicPr>
+          <p:cNvPr id="23" name="Picture 22"/>
+          <p:cNvPicPr>
+            <a:picLocks noChangeAspect="1"/>
+          </p:cNvPicPr>
+          <p:nvPr/>
+        </p:nvPicPr>
+        <p:blipFill>
+          <a:blip r:embed="rId2" cstate="print">
+            <a:extLst>
+              <a:ext uri="{28A0092B-C50C-407E-A947-70E740481C1C}">
+                <a14:useLocalDpi xmlns:a14="http://schemas.microsoft.com/office/drawing/2010/main" val="0"/>
+              </a:ext>
+            </a:extLst>
+          </a:blip>
+          <a:stretch>
+            <a:fillRect/>
+          </a:stretch>
+        </p:blipFill>
+        <p:spPr>
+          <a:xfrm>
+            <a:off x="5033578" y="5103910"/>
+            <a:ext cx="710335" cy="710335"/>
+          </a:xfrm>
+          <a:prstGeom prst="rect">
+            <a:avLst/>
+          </a:prstGeom>
+        </p:spPr>
+      </p:pic>
+      <p:sp>
+        <p:nvSpPr>
+          <p:cNvPr id="24" name="TextBox 23"/>
+          <p:cNvSpPr txBox="1"/>
+          <p:nvPr/>
+        </p:nvSpPr>
+        <p:spPr>
+          <a:xfrm>
+            <a:off x="3515557" y="5708849"/>
+            <a:ext cx="3990514" cy="369332"/>
+          </a:xfrm>
+          <a:prstGeom prst="rect">
+            <a:avLst/>
+          </a:prstGeom>
+          <a:noFill/>
+        </p:spPr>
+        <p:txBody>
+          <a:bodyPr wrap="square" rtlCol="0">
+            <a:spAutoFit/>
+          </a:bodyPr>
+          <a:lstStyle/>
+          <a:p>
+            <a:r>
+              <a:rPr lang="en-US" dirty="0"/>
+              <a:t>User Account</a:t>
+            </a:r>
+            <a:r>
+              <a:rPr lang="en-GB" dirty="0"/>
+              <a:t> with read access to server</a:t>
+            </a:r>
+            <a:endParaRPr lang="en-US" dirty="0"/>
+          </a:p>
+        </p:txBody>
+      </p:sp>
+      <p:sp>
+        <p:nvSpPr>
+          <p:cNvPr id="25" name="Rectangle: Folded Corner 24"/>
+          <p:cNvSpPr/>
+          <p:nvPr/>
+        </p:nvSpPr>
+        <p:spPr>
+          <a:xfrm>
+            <a:off x="142043" y="4745180"/>
+            <a:ext cx="2476870" cy="226318"/>
+          </a:xfrm>
+          <a:prstGeom prst="foldedCorner">
+            <a:avLst/>
+          </a:prstGeom>
+        </p:spPr>
+        <p:style>
+          <a:lnRef idx="2">
+            <a:schemeClr val="accent1">
+              <a:shade val="50000"/>
+            </a:schemeClr>
+          </a:lnRef>
+          <a:fillRef idx="1">
+            <a:schemeClr val="accent1"/>
+          </a:fillRef>
+          <a:effectRef idx="0">
+            <a:schemeClr val="accent1"/>
+          </a:effectRef>
+          <a:fontRef idx="minor">
+            <a:schemeClr val="lt1"/>
+          </a:fontRef>
+        </p:style>
+        <p:txBody>
+          <a:bodyPr rtlCol="0" anchor="ctr"/>
+          <a:lstStyle/>
+          <a:p>
+            <a:pPr algn="ctr"/>
+            <a:r>
+              <a:rPr lang="en-US" sz="1600" dirty="0"/>
+              <a:t>Inclusion Criteria (UNION)</a:t>
+            </a:r>
+            <a:endParaRPr lang="en-GB" sz="1100" dirty="0"/>
+          </a:p>
+        </p:txBody>
+      </p:sp>
+    </p:spTree>
+    <p:extLst>
+      <p:ext uri="{BB962C8B-B14F-4D97-AF65-F5344CB8AC3E}">
+        <p14:creationId xmlns:p14="http://schemas.microsoft.com/office/powerpoint/2010/main" val="3902096882"/>
+      </p:ext>
+    </p:extLst>
+  </p:cSld>
+  <p:clrMapOvr>
+    <a:masterClrMapping/>
+  </p:clrMapOvr>
+</p:sld>
+</file>
+
+<file path=ppt/slides/slide5.xml><?xml version="1.0" encoding="utf-8"?>
+<p:sld xmlns:a="http://schemas.openxmlformats.org/drawingml/2006/main" xmlns:r="http://schemas.openxmlformats.org/officeDocument/2006/relationships" xmlns:p="http://schemas.openxmlformats.org/presentationml/2006/main">
+  <p:cSld>
+    <p:spTree>
+      <p:nvGrpSpPr>
+        <p:cNvPr id="1" name=""/>
+        <p:cNvGrpSpPr/>
+        <p:nvPr/>
+      </p:nvGrpSpPr>
+      <p:grpSpPr>
+        <a:xfrm>
+          <a:off x="0" y="0"/>
+          <a:ext cx="0" cy="0"/>
+          <a:chOff x="0" y="0"/>
+          <a:chExt cx="0" cy="0"/>
+        </a:xfrm>
+      </p:grpSpPr>
+      <p:sp>
+        <p:nvSpPr>
+          <p:cNvPr id="2" name="Title 1"/>
+          <p:cNvSpPr>
+            <a:spLocks noGrp="1"/>
+          </p:cNvSpPr>
+          <p:nvPr>
+            <p:ph type="title"/>
+          </p:nvPr>
+        </p:nvSpPr>
+        <p:spPr/>
+        <p:txBody>
+          <a:bodyPr/>
+          <a:lstStyle/>
+          <a:p>
+            <a:r>
+              <a:rPr lang="en-US" dirty="0"/>
+              <a:t>Physical Diagram – Complex Case (2 servers)</a:t>
+            </a:r>
+            <a:endParaRPr lang="en-GB" dirty="0"/>
+          </a:p>
+        </p:txBody>
+      </p:sp>
+      <p:sp>
+        <p:nvSpPr>
+          <p:cNvPr id="5" name="Cylinder 4"/>
+          <p:cNvSpPr/>
+          <p:nvPr/>
+        </p:nvSpPr>
+        <p:spPr>
+          <a:xfrm>
+            <a:off x="1597980" y="1548645"/>
+            <a:ext cx="2139518" cy="1753848"/>
+          </a:xfrm>
+          <a:prstGeom prst="can">
+            <a:avLst/>
+          </a:prstGeom>
+        </p:spPr>
+        <p:style>
+          <a:lnRef idx="2">
+            <a:schemeClr val="accent1">
+              <a:shade val="50000"/>
+            </a:schemeClr>
+          </a:lnRef>
+          <a:fillRef idx="1">
+            <a:schemeClr val="accent1"/>
+          </a:fillRef>
+          <a:effectRef idx="0">
+            <a:schemeClr val="accent1"/>
+          </a:effectRef>
+          <a:fontRef idx="minor">
+            <a:schemeClr val="lt1"/>
+          </a:fontRef>
+        </p:style>
+        <p:txBody>
+          <a:bodyPr rtlCol="0" anchor="ctr"/>
+          <a:lstStyle/>
+          <a:p>
+            <a:pPr algn="ctr"/>
+            <a:r>
+              <a:rPr lang="en-US" dirty="0"/>
+              <a:t>Database Server</a:t>
+            </a:r>
+            <a:endParaRPr lang="en-GB" dirty="0"/>
+          </a:p>
+        </p:txBody>
+      </p:sp>
+      <p:sp>
+        <p:nvSpPr>
+          <p:cNvPr id="7" name="Cylinder 6"/>
+          <p:cNvSpPr/>
+          <p:nvPr/>
+        </p:nvSpPr>
+        <p:spPr>
+          <a:xfrm>
+            <a:off x="1597980" y="2898559"/>
+            <a:ext cx="2139518" cy="807867"/>
+          </a:xfrm>
+          <a:prstGeom prst="can">
+            <a:avLst/>
+          </a:prstGeom>
+        </p:spPr>
+        <p:style>
+          <a:lnRef idx="2">
+            <a:schemeClr val="accent1">
+              <a:shade val="50000"/>
+            </a:schemeClr>
+          </a:lnRef>
+          <a:fillRef idx="1">
+            <a:schemeClr val="accent1"/>
+          </a:fillRef>
+          <a:effectRef idx="0">
+            <a:schemeClr val="accent1"/>
+          </a:effectRef>
+          <a:fontRef idx="minor">
+            <a:schemeClr val="lt1"/>
+          </a:fontRef>
+        </p:style>
+        <p:txBody>
+          <a:bodyPr rtlCol="0" anchor="ctr"/>
+          <a:lstStyle/>
+          <a:p>
+            <a:pPr algn="ctr"/>
+            <a:r>
+              <a:rPr lang="en-US" dirty="0"/>
+              <a:t>Database 1</a:t>
+            </a:r>
+            <a:endParaRPr lang="en-GB" dirty="0"/>
+          </a:p>
+        </p:txBody>
+      </p:sp>
+      <p:sp>
+        <p:nvSpPr>
+          <p:cNvPr id="18" name="Cylinder 17"/>
+          <p:cNvSpPr/>
+          <p:nvPr/>
+        </p:nvSpPr>
+        <p:spPr>
+          <a:xfrm>
+            <a:off x="4403327" y="1166593"/>
+            <a:ext cx="2139518" cy="1753848"/>
+          </a:xfrm>
+          <a:prstGeom prst="can">
+            <a:avLst/>
+          </a:prstGeom>
+        </p:spPr>
+        <p:style>
+          <a:lnRef idx="2">
+            <a:schemeClr val="accent1">
+              <a:shade val="50000"/>
+            </a:schemeClr>
+          </a:lnRef>
+          <a:fillRef idx="1">
+            <a:schemeClr val="accent1"/>
+          </a:fillRef>
+          <a:effectRef idx="0">
+            <a:schemeClr val="accent1"/>
+          </a:effectRef>
+          <a:fontRef idx="minor">
+            <a:schemeClr val="lt1"/>
+          </a:fontRef>
+        </p:style>
+        <p:txBody>
+          <a:bodyPr rtlCol="0" anchor="ctr"/>
+          <a:lstStyle/>
+          <a:p>
+            <a:pPr algn="ctr"/>
+            <a:r>
+              <a:rPr lang="en-US" dirty="0"/>
+              <a:t>Caching Server</a:t>
+            </a:r>
+            <a:endParaRPr lang="en-GB" dirty="0"/>
+          </a:p>
+        </p:txBody>
+      </p:sp>
+      <p:sp>
+        <p:nvSpPr>
+          <p:cNvPr id="19" name="Cylinder 18"/>
+          <p:cNvSpPr/>
+          <p:nvPr/>
+        </p:nvSpPr>
+        <p:spPr>
+          <a:xfrm>
+            <a:off x="4403327" y="2516507"/>
+            <a:ext cx="2139518" cy="807867"/>
+          </a:xfrm>
+          <a:prstGeom prst="can">
+            <a:avLst/>
+          </a:prstGeom>
+        </p:spPr>
+        <p:style>
+          <a:lnRef idx="2">
+            <a:schemeClr val="accent1">
+              <a:shade val="50000"/>
+            </a:schemeClr>
+          </a:lnRef>
+          <a:fillRef idx="1">
+            <a:schemeClr val="accent1"/>
+          </a:fillRef>
+          <a:effectRef idx="0">
+            <a:schemeClr val="accent1"/>
+          </a:effectRef>
+          <a:fontRef idx="minor">
+            <a:schemeClr val="lt1"/>
+          </a:fontRef>
+        </p:style>
+        <p:txBody>
+          <a:bodyPr rtlCol="0" anchor="ctr"/>
+          <a:lstStyle/>
+          <a:p>
+            <a:pPr algn="ctr"/>
+            <a:r>
+              <a:rPr lang="en-US" dirty="0"/>
+              <a:t>Cache Database</a:t>
+            </a:r>
+            <a:endParaRPr lang="en-GB" dirty="0"/>
+          </a:p>
+        </p:txBody>
+      </p:sp>
+      <p:sp>
+        <p:nvSpPr>
+          <p:cNvPr id="20" name="Cylinder 19"/>
+          <p:cNvSpPr/>
+          <p:nvPr/>
+        </p:nvSpPr>
+        <p:spPr>
+          <a:xfrm>
+            <a:off x="7302625" y="1501663"/>
+            <a:ext cx="2139518" cy="1753848"/>
+          </a:xfrm>
+          <a:prstGeom prst="can">
+            <a:avLst/>
+          </a:prstGeom>
+        </p:spPr>
+        <p:style>
+          <a:lnRef idx="2">
+            <a:schemeClr val="accent1">
+              <a:shade val="50000"/>
+            </a:schemeClr>
+          </a:lnRef>
+          <a:fillRef idx="1">
+            <a:schemeClr val="accent1"/>
+          </a:fillRef>
+          <a:effectRef idx="0">
+            <a:schemeClr val="accent1"/>
+          </a:effectRef>
+          <a:fontRef idx="minor">
+            <a:schemeClr val="lt1"/>
+          </a:fontRef>
+        </p:style>
+        <p:txBody>
+          <a:bodyPr rtlCol="0" anchor="ctr"/>
+          <a:lstStyle/>
+          <a:p>
+            <a:pPr algn="ctr"/>
+            <a:r>
+              <a:rPr lang="en-US" dirty="0"/>
+              <a:t>Database Server</a:t>
+            </a:r>
+            <a:endParaRPr lang="en-GB" dirty="0"/>
+          </a:p>
+        </p:txBody>
+      </p:sp>
+      <p:sp>
+        <p:nvSpPr>
+          <p:cNvPr id="21" name="Cylinder 20"/>
+          <p:cNvSpPr/>
+          <p:nvPr/>
+        </p:nvSpPr>
+        <p:spPr>
+          <a:xfrm>
+            <a:off x="7302625" y="2851577"/>
+            <a:ext cx="2139518" cy="807867"/>
+          </a:xfrm>
+          <a:prstGeom prst="can">
+            <a:avLst/>
+          </a:prstGeom>
+        </p:spPr>
+        <p:style>
+          <a:lnRef idx="2">
+            <a:schemeClr val="accent1">
+              <a:shade val="50000"/>
+            </a:schemeClr>
+          </a:lnRef>
+          <a:fillRef idx="1">
+            <a:schemeClr val="accent1"/>
+          </a:fillRef>
+          <a:effectRef idx="0">
+            <a:schemeClr val="accent1"/>
+          </a:effectRef>
+          <a:fontRef idx="minor">
+            <a:schemeClr val="lt1"/>
+          </a:fontRef>
+        </p:style>
+        <p:txBody>
+          <a:bodyPr rtlCol="0" anchor="ctr"/>
+          <a:lstStyle/>
+          <a:p>
+            <a:pPr algn="ctr"/>
+            <a:r>
+              <a:rPr lang="en-US" dirty="0"/>
+              <a:t>Database 2</a:t>
+            </a:r>
+            <a:endParaRPr lang="en-GB" dirty="0"/>
+          </a:p>
+        </p:txBody>
+      </p:sp>
+      <p:pic>
+        <p:nvPicPr>
+          <p:cNvPr id="22" name="Picture 21"/>
+          <p:cNvPicPr>
+            <a:picLocks noChangeAspect="1"/>
+          </p:cNvPicPr>
+          <p:nvPr/>
+        </p:nvPicPr>
+        <p:blipFill>
+          <a:blip r:embed="rId2" cstate="print">
+            <a:extLst>
+              <a:ext uri="{28A0092B-C50C-407E-A947-70E740481C1C}">
+                <a14:useLocalDpi xmlns:a14="http://schemas.microsoft.com/office/drawing/2010/main" val="0"/>
+              </a:ext>
+            </a:extLst>
+          </a:blip>
+          <a:stretch>
+            <a:fillRect/>
+          </a:stretch>
+        </p:blipFill>
+        <p:spPr>
+          <a:xfrm>
+            <a:off x="2032925" y="4832624"/>
+            <a:ext cx="710335" cy="710335"/>
+          </a:xfrm>
+          <a:prstGeom prst="rect">
+            <a:avLst/>
+          </a:prstGeom>
+        </p:spPr>
+      </p:pic>
+      <p:sp>
+        <p:nvSpPr>
+          <p:cNvPr id="23" name="TextBox 22"/>
+          <p:cNvSpPr txBox="1"/>
+          <p:nvPr/>
+        </p:nvSpPr>
+        <p:spPr>
+          <a:xfrm>
+            <a:off x="514904" y="5437563"/>
+            <a:ext cx="2756516" cy="923330"/>
+          </a:xfrm>
+          <a:prstGeom prst="rect">
+            <a:avLst/>
+          </a:prstGeom>
+          <a:noFill/>
+        </p:spPr>
+        <p:txBody>
+          <a:bodyPr wrap="square" rtlCol="0">
+            <a:spAutoFit/>
+          </a:bodyPr>
+          <a:lstStyle/>
+          <a:p>
+            <a:r>
+              <a:rPr lang="en-US" dirty="0"/>
+              <a:t>User Account</a:t>
+            </a:r>
+            <a:r>
+              <a:rPr lang="en-GB" dirty="0"/>
+              <a:t> with:</a:t>
+            </a:r>
+          </a:p>
+          <a:p>
+            <a:r>
+              <a:rPr lang="en-GB" dirty="0"/>
+              <a:t> read access to database1</a:t>
+            </a:r>
+          </a:p>
+          <a:p>
+            <a:r>
+              <a:rPr lang="en-US" dirty="0"/>
+              <a:t> write access to cache</a:t>
+            </a:r>
+          </a:p>
+        </p:txBody>
+      </p:sp>
+      <p:pic>
+        <p:nvPicPr>
+          <p:cNvPr id="24" name="Picture 23"/>
+          <p:cNvPicPr>
+            <a:picLocks noChangeAspect="1"/>
+          </p:cNvPicPr>
+          <p:nvPr/>
+        </p:nvPicPr>
+        <p:blipFill>
+          <a:blip r:embed="rId2" cstate="print">
+            <a:extLst>
+              <a:ext uri="{28A0092B-C50C-407E-A947-70E740481C1C}">
+                <a14:useLocalDpi xmlns:a14="http://schemas.microsoft.com/office/drawing/2010/main" val="0"/>
+              </a:ext>
+            </a:extLst>
+          </a:blip>
+          <a:stretch>
+            <a:fillRect/>
+          </a:stretch>
+        </p:blipFill>
+        <p:spPr>
+          <a:xfrm>
+            <a:off x="8203648" y="4820333"/>
+            <a:ext cx="710335" cy="710335"/>
+          </a:xfrm>
+          <a:prstGeom prst="rect">
+            <a:avLst/>
+          </a:prstGeom>
+        </p:spPr>
+      </p:pic>
+      <p:sp>
+        <p:nvSpPr>
+          <p:cNvPr id="25" name="TextBox 24"/>
+          <p:cNvSpPr txBox="1"/>
+          <p:nvPr/>
+        </p:nvSpPr>
+        <p:spPr>
+          <a:xfrm>
+            <a:off x="6685627" y="5425272"/>
+            <a:ext cx="2756516" cy="923330"/>
+          </a:xfrm>
+          <a:prstGeom prst="rect">
+            <a:avLst/>
+          </a:prstGeom>
+          <a:noFill/>
+        </p:spPr>
+        <p:txBody>
+          <a:bodyPr wrap="square" rtlCol="0">
+            <a:spAutoFit/>
+          </a:bodyPr>
+          <a:lstStyle/>
+          <a:p>
+            <a:r>
+              <a:rPr lang="en-US" dirty="0"/>
+              <a:t>User Account</a:t>
+            </a:r>
+            <a:r>
+              <a:rPr lang="en-GB" dirty="0"/>
+              <a:t> with:</a:t>
+            </a:r>
+          </a:p>
+          <a:p>
+            <a:r>
+              <a:rPr lang="en-GB" dirty="0"/>
+              <a:t> read access to database2</a:t>
+            </a:r>
+          </a:p>
+          <a:p>
+            <a:r>
+              <a:rPr lang="en-US" dirty="0"/>
+              <a:t> write access to cache</a:t>
+            </a:r>
+          </a:p>
+        </p:txBody>
+      </p:sp>
+      <p:sp>
+        <p:nvSpPr>
+          <p:cNvPr id="26" name="Rectangle 25"/>
+          <p:cNvSpPr/>
+          <p:nvPr/>
+        </p:nvSpPr>
+        <p:spPr>
+          <a:xfrm>
+            <a:off x="1740022" y="4428690"/>
+            <a:ext cx="1731147" cy="338811"/>
+          </a:xfrm>
+          <a:prstGeom prst="rect">
+            <a:avLst/>
+          </a:prstGeom>
+        </p:spPr>
+        <p:style>
+          <a:lnRef idx="2">
+            <a:schemeClr val="accent1">
+              <a:shade val="50000"/>
+            </a:schemeClr>
+          </a:lnRef>
+          <a:fillRef idx="1">
+            <a:schemeClr val="accent1"/>
+          </a:fillRef>
+          <a:effectRef idx="0">
+            <a:schemeClr val="accent1"/>
+          </a:effectRef>
+          <a:fontRef idx="minor">
+            <a:schemeClr val="lt1"/>
+          </a:fontRef>
+        </p:style>
+        <p:txBody>
+          <a:bodyPr rtlCol="0" anchor="ctr"/>
+          <a:lstStyle/>
+          <a:p>
+            <a:pPr algn="ctr"/>
+            <a:r>
+              <a:rPr lang="en-US" dirty="0"/>
+              <a:t>RDMP Software</a:t>
+            </a:r>
+            <a:endParaRPr lang="en-GB" dirty="0"/>
+          </a:p>
+        </p:txBody>
+      </p:sp>
+      <p:sp>
+        <p:nvSpPr>
+          <p:cNvPr id="27" name="Arrow: Left 26"/>
+          <p:cNvSpPr/>
+          <p:nvPr/>
+        </p:nvSpPr>
+        <p:spPr>
+          <a:xfrm rot="5400000">
+            <a:off x="2237173" y="3818247"/>
+            <a:ext cx="346228" cy="221941"/>
+          </a:xfrm>
+          <a:prstGeom prst="leftArrow">
+            <a:avLst/>
+          </a:prstGeom>
+        </p:spPr>
+        <p:style>
+          <a:lnRef idx="2">
+            <a:schemeClr val="accent1">
+              <a:shade val="50000"/>
+            </a:schemeClr>
+          </a:lnRef>
+          <a:fillRef idx="1">
+            <a:schemeClr val="accent1"/>
+          </a:fillRef>
+          <a:effectRef idx="0">
+            <a:schemeClr val="accent1"/>
+          </a:effectRef>
+          <a:fontRef idx="minor">
+            <a:schemeClr val="lt1"/>
+          </a:fontRef>
+        </p:style>
+        <p:txBody>
+          <a:bodyPr rtlCol="0" anchor="ctr"/>
+          <a:lstStyle/>
+          <a:p>
+            <a:pPr algn="ctr"/>
+            <a:endParaRPr lang="en-GB"/>
+          </a:p>
+        </p:txBody>
+      </p:sp>
+      <p:sp>
+        <p:nvSpPr>
+          <p:cNvPr id="28" name="Rectangle: Folded Corner 27"/>
+          <p:cNvSpPr/>
+          <p:nvPr/>
+        </p:nvSpPr>
+        <p:spPr>
+          <a:xfrm>
+            <a:off x="1740022" y="4173766"/>
+            <a:ext cx="1198486" cy="229993"/>
+          </a:xfrm>
+          <a:prstGeom prst="foldedCorner">
+            <a:avLst/>
+          </a:prstGeom>
+        </p:spPr>
+        <p:style>
+          <a:lnRef idx="2">
+            <a:schemeClr val="accent1">
+              <a:shade val="50000"/>
+            </a:schemeClr>
+          </a:lnRef>
+          <a:fillRef idx="1">
+            <a:schemeClr val="accent1"/>
+          </a:fillRef>
+          <a:effectRef idx="0">
+            <a:schemeClr val="accent1"/>
+          </a:effectRef>
+          <a:fontRef idx="minor">
+            <a:schemeClr val="lt1"/>
+          </a:fontRef>
+        </p:style>
+        <p:txBody>
+          <a:bodyPr rtlCol="0" anchor="ctr"/>
+          <a:lstStyle/>
+          <a:p>
+            <a:pPr algn="ctr"/>
+            <a:r>
+              <a:rPr lang="en-US" sz="1600" dirty="0"/>
+              <a:t>Query 1</a:t>
+            </a:r>
+          </a:p>
+        </p:txBody>
+      </p:sp>
+      <p:sp>
+        <p:nvSpPr>
+          <p:cNvPr id="29" name="Arrow: Left 28"/>
+          <p:cNvSpPr/>
+          <p:nvPr/>
+        </p:nvSpPr>
+        <p:spPr>
+          <a:xfrm rot="5400000">
+            <a:off x="4567564" y="3828968"/>
+            <a:ext cx="346228" cy="221941"/>
+          </a:xfrm>
+          <a:prstGeom prst="leftArrow">
+            <a:avLst/>
+          </a:prstGeom>
+        </p:spPr>
+        <p:style>
+          <a:lnRef idx="2">
+            <a:schemeClr val="accent1">
+              <a:shade val="50000"/>
+            </a:schemeClr>
+          </a:lnRef>
+          <a:fillRef idx="1">
+            <a:schemeClr val="accent1"/>
+          </a:fillRef>
+          <a:effectRef idx="0">
+            <a:schemeClr val="accent1"/>
+          </a:effectRef>
+          <a:fontRef idx="minor">
+            <a:schemeClr val="lt1"/>
+          </a:fontRef>
+        </p:style>
+        <p:txBody>
+          <a:bodyPr rtlCol="0" anchor="ctr"/>
+          <a:lstStyle/>
+          <a:p>
+            <a:pPr algn="ctr"/>
+            <a:endParaRPr lang="en-GB"/>
+          </a:p>
+        </p:txBody>
+      </p:sp>
+      <p:sp>
+        <p:nvSpPr>
+          <p:cNvPr id="30" name="Rectangle: Folded Corner 29"/>
+          <p:cNvSpPr/>
+          <p:nvPr/>
+        </p:nvSpPr>
+        <p:spPr>
+          <a:xfrm>
+            <a:off x="3555508" y="4173450"/>
+            <a:ext cx="1198486" cy="229993"/>
+          </a:xfrm>
+          <a:prstGeom prst="foldedCorner">
+            <a:avLst/>
+          </a:prstGeom>
+        </p:spPr>
+        <p:style>
+          <a:lnRef idx="2">
+            <a:schemeClr val="accent1">
+              <a:shade val="50000"/>
+            </a:schemeClr>
+          </a:lnRef>
+          <a:fillRef idx="1">
+            <a:schemeClr val="accent1"/>
+          </a:fillRef>
+          <a:effectRef idx="0">
+            <a:schemeClr val="accent1"/>
+          </a:effectRef>
+          <a:fontRef idx="minor">
+            <a:schemeClr val="lt1"/>
+          </a:fontRef>
+        </p:style>
+        <p:txBody>
+          <a:bodyPr rtlCol="0" anchor="ctr"/>
+          <a:lstStyle/>
+          <a:p>
+            <a:pPr algn="ctr"/>
+            <a:r>
+              <a:rPr lang="en-US" sz="1600" dirty="0"/>
+              <a:t>Query 2</a:t>
+            </a:r>
+          </a:p>
+        </p:txBody>
+      </p:sp>
+      <p:sp>
+        <p:nvSpPr>
+          <p:cNvPr id="32" name="Rectangle: Folded Corner 31"/>
+          <p:cNvSpPr/>
+          <p:nvPr/>
+        </p:nvSpPr>
+        <p:spPr>
+          <a:xfrm>
+            <a:off x="3555508" y="4456998"/>
+            <a:ext cx="1442619" cy="229993"/>
+          </a:xfrm>
+          <a:prstGeom prst="foldedCorner">
+            <a:avLst/>
+          </a:prstGeom>
+        </p:spPr>
+        <p:style>
+          <a:lnRef idx="2">
+            <a:schemeClr val="accent1">
+              <a:shade val="50000"/>
+            </a:schemeClr>
+          </a:lnRef>
+          <a:fillRef idx="1">
+            <a:schemeClr val="accent1"/>
+          </a:fillRef>
+          <a:effectRef idx="0">
+            <a:schemeClr val="accent1"/>
+          </a:effectRef>
+          <a:fontRef idx="minor">
+            <a:schemeClr val="lt1"/>
+          </a:fontRef>
+        </p:style>
+        <p:txBody>
+          <a:bodyPr rtlCol="0" anchor="ctr"/>
+          <a:lstStyle/>
+          <a:p>
+            <a:pPr algn="ctr"/>
+            <a:r>
+              <a:rPr lang="en-US" sz="1600" dirty="0"/>
+              <a:t>UNION Q1+Q2</a:t>
+            </a:r>
+          </a:p>
+        </p:txBody>
+      </p:sp>
+      <p:sp>
+        <p:nvSpPr>
+          <p:cNvPr id="33" name="Cross 32"/>
+          <p:cNvSpPr/>
+          <p:nvPr/>
+        </p:nvSpPr>
+        <p:spPr>
+          <a:xfrm rot="18900000">
+            <a:off x="4567034" y="3434023"/>
+            <a:ext cx="359548" cy="346229"/>
+          </a:xfrm>
+          <a:prstGeom prst="plus">
+            <a:avLst>
+              <a:gd name="adj" fmla="val 37821"/>
+            </a:avLst>
+          </a:prstGeom>
+        </p:spPr>
+        <p:style>
+          <a:lnRef idx="2">
+            <a:schemeClr val="accent1">
+              <a:shade val="50000"/>
+            </a:schemeClr>
+          </a:lnRef>
+          <a:fillRef idx="1">
+            <a:schemeClr val="accent1"/>
+          </a:fillRef>
+          <a:effectRef idx="0">
+            <a:schemeClr val="accent1"/>
+          </a:effectRef>
+          <a:fontRef idx="minor">
+            <a:schemeClr val="lt1"/>
+          </a:fontRef>
+        </p:style>
+        <p:txBody>
+          <a:bodyPr rtlCol="0" anchor="ctr"/>
+          <a:lstStyle/>
+          <a:p>
+            <a:pPr algn="ctr"/>
+            <a:endParaRPr lang="en-GB"/>
+          </a:p>
+        </p:txBody>
+      </p:sp>
+      <p:sp>
+        <p:nvSpPr>
+          <p:cNvPr id="34" name="Arrow: Left 33"/>
+          <p:cNvSpPr/>
+          <p:nvPr/>
+        </p:nvSpPr>
+        <p:spPr>
+          <a:xfrm rot="8703795">
+            <a:off x="2923008" y="3580145"/>
+            <a:ext cx="1518829" cy="221941"/>
+          </a:xfrm>
+          <a:prstGeom prst="leftArrow">
+            <a:avLst/>
+          </a:prstGeom>
+        </p:spPr>
+        <p:style>
+          <a:lnRef idx="2">
+            <a:schemeClr val="accent1">
+              <a:shade val="50000"/>
+            </a:schemeClr>
+          </a:lnRef>
+          <a:fillRef idx="1">
+            <a:schemeClr val="accent1"/>
+          </a:fillRef>
+          <a:effectRef idx="0">
+            <a:schemeClr val="accent1"/>
+          </a:effectRef>
+          <a:fontRef idx="minor">
+            <a:schemeClr val="lt1"/>
+          </a:fontRef>
+        </p:style>
+        <p:txBody>
+          <a:bodyPr rtlCol="0" anchor="ctr"/>
+          <a:lstStyle/>
+          <a:p>
+            <a:pPr algn="ctr"/>
+            <a:endParaRPr lang="en-GB"/>
+          </a:p>
+        </p:txBody>
+      </p:sp>
+      <p:sp>
+        <p:nvSpPr>
+          <p:cNvPr id="35" name="TextBox 34"/>
+          <p:cNvSpPr txBox="1"/>
+          <p:nvPr/>
+        </p:nvSpPr>
+        <p:spPr>
+          <a:xfrm>
+            <a:off x="4232368" y="4721114"/>
+            <a:ext cx="2419969" cy="369332"/>
+          </a:xfrm>
+          <a:prstGeom prst="rect">
+            <a:avLst/>
+          </a:prstGeom>
+          <a:noFill/>
+        </p:spPr>
+        <p:txBody>
+          <a:bodyPr wrap="square" rtlCol="0">
+            <a:spAutoFit/>
+          </a:bodyPr>
+          <a:lstStyle/>
+          <a:p>
+            <a:r>
+              <a:rPr lang="en-US" dirty="0"/>
+              <a:t>Cached identifiers only</a:t>
+            </a:r>
+            <a:endParaRPr lang="en-GB" dirty="0"/>
+          </a:p>
+        </p:txBody>
+      </p:sp>
+      <p:sp>
+        <p:nvSpPr>
+          <p:cNvPr id="36" name="Rectangle 35"/>
+          <p:cNvSpPr/>
+          <p:nvPr/>
+        </p:nvSpPr>
+        <p:spPr>
+          <a:xfrm>
+            <a:off x="7591917" y="4401645"/>
+            <a:ext cx="1731147" cy="338811"/>
+          </a:xfrm>
+          <a:prstGeom prst="rect">
+            <a:avLst/>
+          </a:prstGeom>
+        </p:spPr>
+        <p:style>
+          <a:lnRef idx="2">
+            <a:schemeClr val="accent1">
+              <a:shade val="50000"/>
+            </a:schemeClr>
+          </a:lnRef>
+          <a:fillRef idx="1">
+            <a:schemeClr val="accent1"/>
+          </a:fillRef>
+          <a:effectRef idx="0">
+            <a:schemeClr val="accent1"/>
+          </a:effectRef>
+          <a:fontRef idx="minor">
+            <a:schemeClr val="lt1"/>
+          </a:fontRef>
+        </p:style>
+        <p:txBody>
+          <a:bodyPr rtlCol="0" anchor="ctr"/>
+          <a:lstStyle/>
+          <a:p>
+            <a:pPr algn="ctr"/>
+            <a:r>
+              <a:rPr lang="en-US" dirty="0"/>
+              <a:t>RDMP Software</a:t>
+            </a:r>
+            <a:endParaRPr lang="en-GB" dirty="0"/>
+          </a:p>
+        </p:txBody>
+      </p:sp>
+      <p:sp>
+        <p:nvSpPr>
+          <p:cNvPr id="37" name="Rectangle: Folded Corner 36"/>
+          <p:cNvSpPr/>
+          <p:nvPr/>
+        </p:nvSpPr>
+        <p:spPr>
+          <a:xfrm>
+            <a:off x="6064959" y="4216493"/>
+            <a:ext cx="1198486" cy="229993"/>
+          </a:xfrm>
+          <a:prstGeom prst="foldedCorner">
+            <a:avLst/>
+          </a:prstGeom>
+        </p:spPr>
+        <p:style>
+          <a:lnRef idx="2">
+            <a:schemeClr val="accent1">
+              <a:shade val="50000"/>
+            </a:schemeClr>
+          </a:lnRef>
+          <a:fillRef idx="1">
+            <a:schemeClr val="accent1"/>
+          </a:fillRef>
+          <a:effectRef idx="0">
+            <a:schemeClr val="accent1"/>
+          </a:effectRef>
+          <a:fontRef idx="minor">
+            <a:schemeClr val="lt1"/>
+          </a:fontRef>
+        </p:style>
+        <p:txBody>
+          <a:bodyPr rtlCol="0" anchor="ctr"/>
+          <a:lstStyle/>
+          <a:p>
+            <a:pPr algn="ctr"/>
+            <a:r>
+              <a:rPr lang="en-US" sz="1600" dirty="0"/>
+              <a:t>Query 1</a:t>
+            </a:r>
+          </a:p>
+        </p:txBody>
+      </p:sp>
+      <p:sp>
+        <p:nvSpPr>
+          <p:cNvPr id="38" name="Rectangle: Folded Corner 37"/>
+          <p:cNvSpPr/>
+          <p:nvPr/>
+        </p:nvSpPr>
+        <p:spPr>
+          <a:xfrm>
+            <a:off x="7591917" y="4138442"/>
+            <a:ext cx="1198486" cy="229993"/>
+          </a:xfrm>
+          <a:prstGeom prst="foldedCorner">
+            <a:avLst/>
+          </a:prstGeom>
+        </p:spPr>
+        <p:style>
+          <a:lnRef idx="2">
+            <a:schemeClr val="accent1">
+              <a:shade val="50000"/>
+            </a:schemeClr>
+          </a:lnRef>
+          <a:fillRef idx="1">
+            <a:schemeClr val="accent1"/>
+          </a:fillRef>
+          <a:effectRef idx="0">
+            <a:schemeClr val="accent1"/>
+          </a:effectRef>
+          <a:fontRef idx="minor">
+            <a:schemeClr val="lt1"/>
+          </a:fontRef>
+        </p:style>
+        <p:txBody>
+          <a:bodyPr rtlCol="0" anchor="ctr"/>
+          <a:lstStyle/>
+          <a:p>
+            <a:pPr algn="ctr"/>
+            <a:r>
+              <a:rPr lang="en-US" sz="1600" dirty="0"/>
+              <a:t>Query 2</a:t>
+            </a:r>
+          </a:p>
+        </p:txBody>
+      </p:sp>
+      <p:sp>
+        <p:nvSpPr>
+          <p:cNvPr id="39" name="Rectangle: Folded Corner 38"/>
+          <p:cNvSpPr/>
+          <p:nvPr/>
+        </p:nvSpPr>
+        <p:spPr>
+          <a:xfrm>
+            <a:off x="6064959" y="4507036"/>
+            <a:ext cx="1442619" cy="229993"/>
+          </a:xfrm>
+          <a:prstGeom prst="foldedCorner">
+            <a:avLst/>
+          </a:prstGeom>
+        </p:spPr>
+        <p:style>
+          <a:lnRef idx="2">
+            <a:schemeClr val="accent1">
+              <a:shade val="50000"/>
+            </a:schemeClr>
+          </a:lnRef>
+          <a:fillRef idx="1">
+            <a:schemeClr val="accent1"/>
+          </a:fillRef>
+          <a:effectRef idx="0">
+            <a:schemeClr val="accent1"/>
+          </a:effectRef>
+          <a:fontRef idx="minor">
+            <a:schemeClr val="lt1"/>
+          </a:fontRef>
+        </p:style>
+        <p:txBody>
+          <a:bodyPr rtlCol="0" anchor="ctr"/>
+          <a:lstStyle/>
+          <a:p>
+            <a:pPr algn="ctr"/>
+            <a:r>
+              <a:rPr lang="en-US" sz="1600" dirty="0"/>
+              <a:t>UNION Q1+Q2</a:t>
+            </a:r>
+          </a:p>
+        </p:txBody>
+      </p:sp>
+      <p:sp>
+        <p:nvSpPr>
+          <p:cNvPr id="40" name="Arrow: Left 39"/>
+          <p:cNvSpPr/>
+          <p:nvPr/>
+        </p:nvSpPr>
+        <p:spPr>
+          <a:xfrm rot="5400000">
+            <a:off x="6114071" y="3892327"/>
+            <a:ext cx="346228" cy="221941"/>
+          </a:xfrm>
+          <a:prstGeom prst="leftArrow">
+            <a:avLst/>
+          </a:prstGeom>
+        </p:spPr>
+        <p:style>
+          <a:lnRef idx="2">
+            <a:schemeClr val="accent1">
+              <a:shade val="50000"/>
+            </a:schemeClr>
+          </a:lnRef>
+          <a:fillRef idx="1">
+            <a:schemeClr val="accent1"/>
+          </a:fillRef>
+          <a:effectRef idx="0">
+            <a:schemeClr val="accent1"/>
+          </a:effectRef>
+          <a:fontRef idx="minor">
+            <a:schemeClr val="lt1"/>
+          </a:fontRef>
+        </p:style>
+        <p:txBody>
+          <a:bodyPr rtlCol="0" anchor="ctr"/>
+          <a:lstStyle/>
+          <a:p>
+            <a:pPr algn="ctr"/>
+            <a:endParaRPr lang="en-GB"/>
+          </a:p>
+        </p:txBody>
+      </p:sp>
+      <p:sp>
+        <p:nvSpPr>
+          <p:cNvPr id="41" name="Cross 40"/>
+          <p:cNvSpPr/>
+          <p:nvPr/>
+        </p:nvSpPr>
+        <p:spPr>
+          <a:xfrm rot="18900000">
+            <a:off x="6113541" y="3497382"/>
+            <a:ext cx="359548" cy="346229"/>
+          </a:xfrm>
+          <a:prstGeom prst="plus">
+            <a:avLst>
+              <a:gd name="adj" fmla="val 37821"/>
+            </a:avLst>
+          </a:prstGeom>
+        </p:spPr>
+        <p:style>
+          <a:lnRef idx="2">
+            <a:schemeClr val="accent1">
+              <a:shade val="50000"/>
+            </a:schemeClr>
+          </a:lnRef>
+          <a:fillRef idx="1">
+            <a:schemeClr val="accent1"/>
+          </a:fillRef>
+          <a:effectRef idx="0">
+            <a:schemeClr val="accent1"/>
+          </a:effectRef>
+          <a:fontRef idx="minor">
+            <a:schemeClr val="lt1"/>
+          </a:fontRef>
+        </p:style>
+        <p:txBody>
+          <a:bodyPr rtlCol="0" anchor="ctr"/>
+          <a:lstStyle/>
+          <a:p>
+            <a:pPr algn="ctr"/>
+            <a:endParaRPr lang="en-GB"/>
+          </a:p>
+        </p:txBody>
+      </p:sp>
+      <p:sp>
+        <p:nvSpPr>
+          <p:cNvPr id="42" name="Arrow: Left 41"/>
+          <p:cNvSpPr/>
+          <p:nvPr/>
+        </p:nvSpPr>
+        <p:spPr>
+          <a:xfrm rot="5400000">
+            <a:off x="8030534" y="3811865"/>
+            <a:ext cx="346228" cy="221941"/>
+          </a:xfrm>
+          <a:prstGeom prst="leftArrow">
+            <a:avLst/>
+          </a:prstGeom>
+        </p:spPr>
+        <p:style>
+          <a:lnRef idx="2">
+            <a:schemeClr val="accent1">
+              <a:shade val="50000"/>
+            </a:schemeClr>
+          </a:lnRef>
+          <a:fillRef idx="1">
+            <a:schemeClr val="accent1"/>
+          </a:fillRef>
+          <a:effectRef idx="0">
+            <a:schemeClr val="accent1"/>
+          </a:effectRef>
+          <a:fontRef idx="minor">
+            <a:schemeClr val="lt1"/>
+          </a:fontRef>
+        </p:style>
+        <p:txBody>
+          <a:bodyPr rtlCol="0" anchor="ctr"/>
+          <a:lstStyle/>
+          <a:p>
+            <a:pPr algn="ctr"/>
+            <a:endParaRPr lang="en-GB"/>
+          </a:p>
+        </p:txBody>
+      </p:sp>
+      <p:sp>
+        <p:nvSpPr>
+          <p:cNvPr id="43" name="Arrow: Left 42"/>
+          <p:cNvSpPr/>
+          <p:nvPr/>
+        </p:nvSpPr>
+        <p:spPr>
+          <a:xfrm rot="2704728">
+            <a:off x="6486002" y="3447010"/>
+            <a:ext cx="1518829" cy="221941"/>
+          </a:xfrm>
+          <a:prstGeom prst="leftArrow">
+            <a:avLst/>
+          </a:prstGeom>
+        </p:spPr>
+        <p:style>
+          <a:lnRef idx="2">
+            <a:schemeClr val="accent1">
+              <a:shade val="50000"/>
+            </a:schemeClr>
+          </a:lnRef>
+          <a:fillRef idx="1">
+            <a:schemeClr val="accent1"/>
+          </a:fillRef>
+          <a:effectRef idx="0">
+            <a:schemeClr val="accent1"/>
+          </a:effectRef>
+          <a:fontRef idx="minor">
+            <a:schemeClr val="lt1"/>
+          </a:fontRef>
+        </p:style>
+        <p:txBody>
+          <a:bodyPr rtlCol="0" anchor="ctr"/>
+          <a:lstStyle/>
+          <a:p>
+            <a:pPr algn="ctr"/>
+            <a:endParaRPr lang="en-GB"/>
+          </a:p>
+        </p:txBody>
+      </p:sp>
+    </p:spTree>
+    <p:extLst>
+      <p:ext uri="{BB962C8B-B14F-4D97-AF65-F5344CB8AC3E}">
+        <p14:creationId xmlns:p14="http://schemas.microsoft.com/office/powerpoint/2010/main" val="2883764160"/>
+      </p:ext>
+    </p:extLst>
+  </p:cSld>
+  <p:clrMapOvr>
+    <a:masterClrMapping/>
+  </p:clrMapOvr>
+</p:sld>
+</file>
+
+<file path=ppt/slides/slide6.xml><?xml version="1.0" encoding="utf-8"?>
+<p:sld xmlns:a="http://schemas.openxmlformats.org/drawingml/2006/main" xmlns:r="http://schemas.openxmlformats.org/officeDocument/2006/relationships" xmlns:p="http://schemas.openxmlformats.org/presentationml/2006/main">
+  <p:cSld>
+    <p:spTree>
+      <p:nvGrpSpPr>
+        <p:cNvPr id="1" name=""/>
+        <p:cNvGrpSpPr/>
+        <p:nvPr/>
+      </p:nvGrpSpPr>
+      <p:grpSpPr>
+        <a:xfrm>
+          <a:off x="0" y="0"/>
+          <a:ext cx="0" cy="0"/>
+          <a:chOff x="0" y="0"/>
+          <a:chExt cx="0" cy="0"/>
+        </a:xfrm>
+      </p:grpSpPr>
+      <p:sp>
+        <p:nvSpPr>
+          <p:cNvPr id="2" name="Title 1"/>
+          <p:cNvSpPr>
+            <a:spLocks noGrp="1"/>
+          </p:cNvSpPr>
+          <p:nvPr>
+            <p:ph type="title"/>
+          </p:nvPr>
+        </p:nvSpPr>
+        <p:spPr/>
+        <p:txBody>
+          <a:bodyPr/>
+          <a:lstStyle/>
+          <a:p>
+            <a:r>
+              <a:rPr lang="en-US" dirty="0"/>
+              <a:t>Complex Case 2 - Restrictions</a:t>
+            </a:r>
+            <a:endParaRPr lang="en-GB" dirty="0"/>
+          </a:p>
+        </p:txBody>
+      </p:sp>
+      <p:sp>
+        <p:nvSpPr>
+          <p:cNvPr id="3" name="Content Placeholder 2"/>
+          <p:cNvSpPr>
+            <a:spLocks noGrp="1"/>
+          </p:cNvSpPr>
+          <p:nvPr>
+            <p:ph idx="1"/>
+          </p:nvPr>
+        </p:nvSpPr>
+        <p:spPr>
+          <a:xfrm>
+            <a:off x="838200" y="1637010"/>
+            <a:ext cx="10515600" cy="4351338"/>
+          </a:xfrm>
+        </p:spPr>
+        <p:txBody>
+          <a:bodyPr>
+            <a:normAutofit fontScale="92500" lnSpcReduction="10000"/>
+          </a:bodyPr>
+          <a:lstStyle/>
+          <a:p>
+            <a:pPr marL="0" indent="0">
+              <a:buNone/>
+            </a:pPr>
+            <a:r>
+              <a:rPr lang="en-US" dirty="0"/>
+              <a:t>All users:</a:t>
+            </a:r>
+          </a:p>
+          <a:p>
+            <a:r>
+              <a:rPr lang="en-US" dirty="0"/>
+              <a:t>Share access to the same ‘query building configuration’ </a:t>
+            </a:r>
+          </a:p>
+          <a:p>
+            <a:r>
+              <a:rPr lang="en-US" dirty="0"/>
+              <a:t>Cannot execute queries for which they do not have access to the underlying database/server</a:t>
+            </a:r>
+          </a:p>
+          <a:p>
+            <a:r>
+              <a:rPr lang="en-US" dirty="0"/>
+              <a:t>Can execute queries which have cached results</a:t>
+            </a:r>
+          </a:p>
+          <a:p>
+            <a:r>
+              <a:rPr lang="en-US" dirty="0"/>
+              <a:t>Cannot modify any queries which are cached*</a:t>
+            </a:r>
+          </a:p>
+          <a:p>
+            <a:r>
+              <a:rPr lang="en-US" dirty="0"/>
+              <a:t>Cache only stores identifiers</a:t>
+            </a:r>
+          </a:p>
+          <a:p>
+            <a:pPr marL="0" indent="0">
+              <a:buNone/>
+            </a:pPr>
+            <a:r>
+              <a:rPr lang="en-US" dirty="0"/>
+              <a:t>Added benefit</a:t>
+            </a:r>
+          </a:p>
+          <a:p>
+            <a:r>
+              <a:rPr lang="en-US" dirty="0"/>
+              <a:t>Queries can run on a ‘substitution layer’ or any magic number strategy</a:t>
+            </a:r>
+          </a:p>
+          <a:p>
+            <a:r>
+              <a:rPr lang="en-US" dirty="0"/>
+              <a:t>There can be multiple cache databases for different projects if required</a:t>
+            </a:r>
+          </a:p>
+        </p:txBody>
+      </p:sp>
+      <p:sp>
+        <p:nvSpPr>
+          <p:cNvPr id="4" name="TextBox 3"/>
+          <p:cNvSpPr txBox="1"/>
+          <p:nvPr/>
+        </p:nvSpPr>
+        <p:spPr>
+          <a:xfrm>
+            <a:off x="873341" y="5934670"/>
+            <a:ext cx="10445318" cy="923330"/>
+          </a:xfrm>
+          <a:prstGeom prst="rect">
+            <a:avLst/>
+          </a:prstGeom>
+          <a:noFill/>
+        </p:spPr>
+        <p:txBody>
+          <a:bodyPr wrap="square" rtlCol="0">
+            <a:spAutoFit/>
+          </a:bodyPr>
+          <a:lstStyle/>
+          <a:p>
+            <a:r>
+              <a:rPr lang="en-US" i="1" dirty="0"/>
+              <a:t>Cached queries have SQL executed stored and versioned such that any change invalidates the cached identifier list.  In future we can add read-only decorations to the UI too if we want to prevent users accidentally invalidating cached results</a:t>
+            </a:r>
+            <a:endParaRPr lang="en-GB" i="1" dirty="0"/>
+          </a:p>
+        </p:txBody>
+      </p:sp>
+    </p:spTree>
+    <p:extLst>
+      <p:ext uri="{BB962C8B-B14F-4D97-AF65-F5344CB8AC3E}">
+        <p14:creationId xmlns:p14="http://schemas.microsoft.com/office/powerpoint/2010/main" val="3380575569"/>
       </p:ext>
     </p:extLst>
   </p:cSld>

</xml_diff>

<commit_message>
Simpler worked example for cohort creation showing workflow
</commit_message>
<xml_diff>
--- a/Documentation/CohortGeneration.pptx
+++ b/Documentation/CohortGeneration.pptx
@@ -5,7 +5,7 @@
     <p:sldMasterId id="2147483648" r:id="rId1"/>
   </p:sldMasterIdLst>
   <p:notesMasterIdLst>
-    <p:notesMasterId r:id="rId8"/>
+    <p:notesMasterId r:id="rId17"/>
   </p:notesMasterIdLst>
   <p:sldIdLst>
     <p:sldId id="256" r:id="rId2"/>
@@ -14,6 +14,15 @@
     <p:sldId id="259" r:id="rId5"/>
     <p:sldId id="260" r:id="rId6"/>
     <p:sldId id="261" r:id="rId7"/>
+    <p:sldId id="263" r:id="rId8"/>
+    <p:sldId id="266" r:id="rId9"/>
+    <p:sldId id="264" r:id="rId10"/>
+    <p:sldId id="267" r:id="rId11"/>
+    <p:sldId id="268" r:id="rId12"/>
+    <p:sldId id="269" r:id="rId13"/>
+    <p:sldId id="265" r:id="rId14"/>
+    <p:sldId id="270" r:id="rId15"/>
+    <p:sldId id="271" r:id="rId16"/>
   </p:sldIdLst>
   <p:sldSz cx="12192000" cy="6858000"/>
   <p:notesSz cx="6858000" cy="9144000"/>
@@ -113,6 +122,33 @@
     </a:lvl9pPr>
   </p:defaultTextStyle>
   <p:extLst>
+    <p:ext uri="{521415D9-36F7-43E2-AB2F-B90AF26B5E84}">
+      <p14:sectionLst xmlns:p14="http://schemas.microsoft.com/office/powerpoint/2010/main">
+        <p14:section name="Default Section" id="{4C02BD7C-A78F-47F6-AB11-C75334F38197}">
+          <p14:sldIdLst>
+            <p14:sldId id="256"/>
+            <p14:sldId id="257"/>
+            <p14:sldId id="258"/>
+            <p14:sldId id="259"/>
+            <p14:sldId id="260"/>
+            <p14:sldId id="261"/>
+          </p14:sldIdLst>
+        </p14:section>
+        <p14:section name="Simpler workthrough" id="{DBD142CE-6DD3-4D58-9A98-F12788E9E14C}">
+          <p14:sldIdLst>
+            <p14:sldId id="263"/>
+            <p14:sldId id="266"/>
+            <p14:sldId id="264"/>
+            <p14:sldId id="267"/>
+            <p14:sldId id="268"/>
+            <p14:sldId id="269"/>
+            <p14:sldId id="265"/>
+            <p14:sldId id="270"/>
+            <p14:sldId id="271"/>
+          </p14:sldIdLst>
+        </p14:section>
+      </p14:sectionLst>
+    </p:ext>
     <p:ext uri="{EFAFB233-063F-42B5-8137-9DF3F51BA10A}">
       <p15:sldGuideLst xmlns:p15="http://schemas.microsoft.com/office/powerpoint/2012/main"/>
     </p:ext>
@@ -202,7 +238,7 @@
           <a:p>
             <a:fld id="{E6799723-5C7A-4148-A580-1582FB869D21}" type="datetimeFigureOut">
               <a:rPr lang="en-GB" smtClean="0"/>
-              <a:t>15/08/2017</a:t>
+              <a:t>31/07/2018</a:t>
             </a:fld>
             <a:endParaRPr lang="en-GB"/>
           </a:p>
@@ -685,7 +721,7 @@
           <a:p>
             <a:fld id="{A4B2E03E-B9F4-48CD-BEDC-03BA93144C1F}" type="datetimeFigureOut">
               <a:rPr lang="en-GB" smtClean="0"/>
-              <a:t>15/08/2017</a:t>
+              <a:t>31/07/2018</a:t>
             </a:fld>
             <a:endParaRPr lang="en-GB"/>
           </a:p>
@@ -855,7 +891,7 @@
           <a:p>
             <a:fld id="{A4B2E03E-B9F4-48CD-BEDC-03BA93144C1F}" type="datetimeFigureOut">
               <a:rPr lang="en-GB" smtClean="0"/>
-              <a:t>15/08/2017</a:t>
+              <a:t>31/07/2018</a:t>
             </a:fld>
             <a:endParaRPr lang="en-GB"/>
           </a:p>
@@ -1035,7 +1071,7 @@
           <a:p>
             <a:fld id="{A4B2E03E-B9F4-48CD-BEDC-03BA93144C1F}" type="datetimeFigureOut">
               <a:rPr lang="en-GB" smtClean="0"/>
-              <a:t>15/08/2017</a:t>
+              <a:t>31/07/2018</a:t>
             </a:fld>
             <a:endParaRPr lang="en-GB"/>
           </a:p>
@@ -1205,7 +1241,7 @@
           <a:p>
             <a:fld id="{A4B2E03E-B9F4-48CD-BEDC-03BA93144C1F}" type="datetimeFigureOut">
               <a:rPr lang="en-GB" smtClean="0"/>
-              <a:t>15/08/2017</a:t>
+              <a:t>31/07/2018</a:t>
             </a:fld>
             <a:endParaRPr lang="en-GB"/>
           </a:p>
@@ -1451,7 +1487,7 @@
           <a:p>
             <a:fld id="{A4B2E03E-B9F4-48CD-BEDC-03BA93144C1F}" type="datetimeFigureOut">
               <a:rPr lang="en-GB" smtClean="0"/>
-              <a:t>15/08/2017</a:t>
+              <a:t>31/07/2018</a:t>
             </a:fld>
             <a:endParaRPr lang="en-GB"/>
           </a:p>
@@ -1683,7 +1719,7 @@
           <a:p>
             <a:fld id="{A4B2E03E-B9F4-48CD-BEDC-03BA93144C1F}" type="datetimeFigureOut">
               <a:rPr lang="en-GB" smtClean="0"/>
-              <a:t>15/08/2017</a:t>
+              <a:t>31/07/2018</a:t>
             </a:fld>
             <a:endParaRPr lang="en-GB"/>
           </a:p>
@@ -2050,7 +2086,7 @@
           <a:p>
             <a:fld id="{A4B2E03E-B9F4-48CD-BEDC-03BA93144C1F}" type="datetimeFigureOut">
               <a:rPr lang="en-GB" smtClean="0"/>
-              <a:t>15/08/2017</a:t>
+              <a:t>31/07/2018</a:t>
             </a:fld>
             <a:endParaRPr lang="en-GB"/>
           </a:p>
@@ -2168,7 +2204,7 @@
           <a:p>
             <a:fld id="{A4B2E03E-B9F4-48CD-BEDC-03BA93144C1F}" type="datetimeFigureOut">
               <a:rPr lang="en-GB" smtClean="0"/>
-              <a:t>15/08/2017</a:t>
+              <a:t>31/07/2018</a:t>
             </a:fld>
             <a:endParaRPr lang="en-GB"/>
           </a:p>
@@ -2263,7 +2299,7 @@
           <a:p>
             <a:fld id="{A4B2E03E-B9F4-48CD-BEDC-03BA93144C1F}" type="datetimeFigureOut">
               <a:rPr lang="en-GB" smtClean="0"/>
-              <a:t>15/08/2017</a:t>
+              <a:t>31/07/2018</a:t>
             </a:fld>
             <a:endParaRPr lang="en-GB"/>
           </a:p>
@@ -2540,7 +2576,7 @@
           <a:p>
             <a:fld id="{A4B2E03E-B9F4-48CD-BEDC-03BA93144C1F}" type="datetimeFigureOut">
               <a:rPr lang="en-GB" smtClean="0"/>
-              <a:t>15/08/2017</a:t>
+              <a:t>31/07/2018</a:t>
             </a:fld>
             <a:endParaRPr lang="en-GB"/>
           </a:p>
@@ -2793,7 +2829,7 @@
           <a:p>
             <a:fld id="{A4B2E03E-B9F4-48CD-BEDC-03BA93144C1F}" type="datetimeFigureOut">
               <a:rPr lang="en-GB" smtClean="0"/>
-              <a:t>15/08/2017</a:t>
+              <a:t>31/07/2018</a:t>
             </a:fld>
             <a:endParaRPr lang="en-GB"/>
           </a:p>
@@ -3006,7 +3042,7 @@
           <a:p>
             <a:fld id="{A4B2E03E-B9F4-48CD-BEDC-03BA93144C1F}" type="datetimeFigureOut">
               <a:rPr lang="en-GB" smtClean="0"/>
-              <a:t>15/08/2017</a:t>
+              <a:t>31/07/2018</a:t>
             </a:fld>
             <a:endParaRPr lang="en-GB"/>
           </a:p>
@@ -3470,6 +3506,1302 @@
 </p:sld>
 </file>
 
+<file path=ppt/slides/slide10.xml><?xml version="1.0" encoding="utf-8"?>
+<p:sld xmlns:a="http://schemas.openxmlformats.org/drawingml/2006/main" xmlns:r="http://schemas.openxmlformats.org/officeDocument/2006/relationships" xmlns:p="http://schemas.openxmlformats.org/presentationml/2006/main">
+  <p:cSld>
+    <p:spTree>
+      <p:nvGrpSpPr>
+        <p:cNvPr id="1" name=""/>
+        <p:cNvGrpSpPr/>
+        <p:nvPr/>
+      </p:nvGrpSpPr>
+      <p:grpSpPr>
+        <a:xfrm>
+          <a:off x="0" y="0"/>
+          <a:ext cx="0" cy="0"/>
+          <a:chOff x="0" y="0"/>
+          <a:chExt cx="0" cy="0"/>
+        </a:xfrm>
+      </p:grpSpPr>
+      <p:pic>
+        <p:nvPicPr>
+          <p:cNvPr id="5" name="Picture 4">
+            <a:extLst>
+              <a:ext uri="{FF2B5EF4-FFF2-40B4-BE49-F238E27FC236}">
+                <a16:creationId xmlns:a16="http://schemas.microsoft.com/office/drawing/2014/main" id="{70D498BB-17DD-4485-91F7-63F304671044}"/>
+              </a:ext>
+            </a:extLst>
+          </p:cNvPr>
+          <p:cNvPicPr>
+            <a:picLocks noChangeAspect="1"/>
+          </p:cNvPicPr>
+          <p:nvPr/>
+        </p:nvPicPr>
+        <p:blipFill>
+          <a:blip r:embed="rId2"/>
+          <a:stretch>
+            <a:fillRect/>
+          </a:stretch>
+        </p:blipFill>
+        <p:spPr>
+          <a:xfrm>
+            <a:off x="2929015" y="4428311"/>
+            <a:ext cx="6572442" cy="2064564"/>
+          </a:xfrm>
+          <a:prstGeom prst="rect">
+            <a:avLst/>
+          </a:prstGeom>
+        </p:spPr>
+      </p:pic>
+      <p:sp>
+        <p:nvSpPr>
+          <p:cNvPr id="2" name="Title 1">
+            <a:extLst>
+              <a:ext uri="{FF2B5EF4-FFF2-40B4-BE49-F238E27FC236}">
+                <a16:creationId xmlns:a16="http://schemas.microsoft.com/office/drawing/2014/main" id="{CE1997BA-4875-48C2-8087-4FA853F5BA4E}"/>
+              </a:ext>
+            </a:extLst>
+          </p:cNvPr>
+          <p:cNvSpPr>
+            <a:spLocks noGrp="1"/>
+          </p:cNvSpPr>
+          <p:nvPr>
+            <p:ph type="title"/>
+          </p:nvPr>
+        </p:nvSpPr>
+        <p:spPr/>
+        <p:txBody>
+          <a:bodyPr>
+            <a:normAutofit/>
+          </a:bodyPr>
+          <a:lstStyle/>
+          <a:p>
+            <a:pPr algn="ctr"/>
+            <a:r>
+              <a:rPr lang="en-US" sz="2800"/>
+              <a:t>Check each set(s) by combining with existing graph(s)</a:t>
+            </a:r>
+            <a:endParaRPr lang="en-GB" sz="2800"/>
+          </a:p>
+        </p:txBody>
+      </p:sp>
+      <p:sp>
+        <p:nvSpPr>
+          <p:cNvPr id="3" name="Oval 2">
+            <a:extLst>
+              <a:ext uri="{FF2B5EF4-FFF2-40B4-BE49-F238E27FC236}">
+                <a16:creationId xmlns:a16="http://schemas.microsoft.com/office/drawing/2014/main" id="{2BDAF33B-E6A1-4DCB-85DF-327DE13497EB}"/>
+              </a:ext>
+            </a:extLst>
+          </p:cNvPr>
+          <p:cNvSpPr/>
+          <p:nvPr/>
+        </p:nvSpPr>
+        <p:spPr>
+          <a:xfrm>
+            <a:off x="287200" y="1235906"/>
+            <a:ext cx="1644242" cy="1644242"/>
+          </a:xfrm>
+          <a:prstGeom prst="ellipse">
+            <a:avLst/>
+          </a:prstGeom>
+          <a:noFill/>
+          <a:effectLst>
+            <a:glow rad="139700">
+              <a:schemeClr val="accent6">
+                <a:satMod val="175000"/>
+                <a:alpha val="40000"/>
+              </a:schemeClr>
+            </a:glow>
+          </a:effectLst>
+        </p:spPr>
+        <p:style>
+          <a:lnRef idx="2">
+            <a:schemeClr val="dk1"/>
+          </a:lnRef>
+          <a:fillRef idx="1">
+            <a:schemeClr val="lt1"/>
+          </a:fillRef>
+          <a:effectRef idx="0">
+            <a:schemeClr val="dk1"/>
+          </a:effectRef>
+          <a:fontRef idx="minor">
+            <a:schemeClr val="dk1"/>
+          </a:fontRef>
+        </p:style>
+        <p:txBody>
+          <a:bodyPr rtlCol="0" anchor="ctr"/>
+          <a:lstStyle/>
+          <a:p>
+            <a:pPr algn="ctr"/>
+            <a:endParaRPr lang="en-GB"/>
+          </a:p>
+        </p:txBody>
+      </p:sp>
+      <p:sp>
+        <p:nvSpPr>
+          <p:cNvPr id="4" name="TextBox 3">
+            <a:extLst>
+              <a:ext uri="{FF2B5EF4-FFF2-40B4-BE49-F238E27FC236}">
+                <a16:creationId xmlns:a16="http://schemas.microsoft.com/office/drawing/2014/main" id="{B42D2A4E-DE7D-44D4-8A58-CB486B3EAC70}"/>
+              </a:ext>
+            </a:extLst>
+          </p:cNvPr>
+          <p:cNvSpPr txBox="1"/>
+          <p:nvPr/>
+        </p:nvSpPr>
+        <p:spPr>
+          <a:xfrm>
+            <a:off x="335096" y="1781677"/>
+            <a:ext cx="1493615" cy="738664"/>
+          </a:xfrm>
+          <a:prstGeom prst="rect">
+            <a:avLst/>
+          </a:prstGeom>
+          <a:noFill/>
+        </p:spPr>
+        <p:txBody>
+          <a:bodyPr wrap="none" rtlCol="0">
+            <a:spAutoFit/>
+          </a:bodyPr>
+          <a:lstStyle/>
+          <a:p>
+            <a:pPr algn="ctr"/>
+            <a:r>
+              <a:rPr lang="en-US" sz="1400"/>
+              <a:t>Biochemistry</a:t>
+            </a:r>
+          </a:p>
+          <a:p>
+            <a:pPr algn="ctr"/>
+            <a:r>
+              <a:rPr lang="en-US" sz="1400"/>
+              <a:t>People with UREA</a:t>
+            </a:r>
+          </a:p>
+          <a:p>
+            <a:pPr algn="ctr"/>
+            <a:r>
+              <a:rPr lang="en-US" sz="1400"/>
+              <a:t>Tests over 100</a:t>
+            </a:r>
+            <a:endParaRPr lang="en-GB" sz="1400"/>
+          </a:p>
+        </p:txBody>
+      </p:sp>
+      <p:pic>
+        <p:nvPicPr>
+          <p:cNvPr id="6" name="Picture 5">
+            <a:extLst>
+              <a:ext uri="{FF2B5EF4-FFF2-40B4-BE49-F238E27FC236}">
+                <a16:creationId xmlns:a16="http://schemas.microsoft.com/office/drawing/2014/main" id="{EB53B2A1-6C82-42C5-928A-8DF066737A66}"/>
+              </a:ext>
+            </a:extLst>
+          </p:cNvPr>
+          <p:cNvPicPr>
+            <a:picLocks noChangeAspect="1"/>
+          </p:cNvPicPr>
+          <p:nvPr/>
+        </p:nvPicPr>
+        <p:blipFill>
+          <a:blip r:embed="rId3"/>
+          <a:stretch>
+            <a:fillRect/>
+          </a:stretch>
+        </p:blipFill>
+        <p:spPr>
+          <a:xfrm>
+            <a:off x="2482442" y="1374895"/>
+            <a:ext cx="7870996" cy="2849229"/>
+          </a:xfrm>
+          <a:prstGeom prst="rect">
+            <a:avLst/>
+          </a:prstGeom>
+        </p:spPr>
+      </p:pic>
+      <p:sp>
+        <p:nvSpPr>
+          <p:cNvPr id="8" name="TextBox 7">
+            <a:extLst>
+              <a:ext uri="{FF2B5EF4-FFF2-40B4-BE49-F238E27FC236}">
+                <a16:creationId xmlns:a16="http://schemas.microsoft.com/office/drawing/2014/main" id="{C1B4BF25-B1BE-4D4F-A31E-876ED1953C30}"/>
+              </a:ext>
+            </a:extLst>
+          </p:cNvPr>
+          <p:cNvSpPr txBox="1"/>
+          <p:nvPr/>
+        </p:nvSpPr>
+        <p:spPr>
+          <a:xfrm>
+            <a:off x="467992" y="2971137"/>
+            <a:ext cx="1437701" cy="369332"/>
+          </a:xfrm>
+          <a:prstGeom prst="rect">
+            <a:avLst/>
+          </a:prstGeom>
+          <a:noFill/>
+        </p:spPr>
+        <p:txBody>
+          <a:bodyPr wrap="none" rtlCol="0">
+            <a:spAutoFit/>
+          </a:bodyPr>
+          <a:lstStyle/>
+          <a:p>
+            <a:r>
+              <a:rPr lang="en-US"/>
+              <a:t>Count = 7104</a:t>
+            </a:r>
+            <a:endParaRPr lang="en-GB"/>
+          </a:p>
+        </p:txBody>
+      </p:sp>
+    </p:spTree>
+    <p:extLst>
+      <p:ext uri="{BB962C8B-B14F-4D97-AF65-F5344CB8AC3E}">
+        <p14:creationId xmlns:p14="http://schemas.microsoft.com/office/powerpoint/2010/main" val="4016702716"/>
+      </p:ext>
+    </p:extLst>
+  </p:cSld>
+  <p:clrMapOvr>
+    <a:masterClrMapping/>
+  </p:clrMapOvr>
+</p:sld>
+</file>
+
+<file path=ppt/slides/slide11.xml><?xml version="1.0" encoding="utf-8"?>
+<p:sld xmlns:a="http://schemas.openxmlformats.org/drawingml/2006/main" xmlns:r="http://schemas.openxmlformats.org/officeDocument/2006/relationships" xmlns:p="http://schemas.openxmlformats.org/presentationml/2006/main">
+  <p:cSld>
+    <p:spTree>
+      <p:nvGrpSpPr>
+        <p:cNvPr id="1" name=""/>
+        <p:cNvGrpSpPr/>
+        <p:nvPr/>
+      </p:nvGrpSpPr>
+      <p:grpSpPr>
+        <a:xfrm>
+          <a:off x="0" y="0"/>
+          <a:ext cx="0" cy="0"/>
+          <a:chOff x="0" y="0"/>
+          <a:chExt cx="0" cy="0"/>
+        </a:xfrm>
+      </p:grpSpPr>
+      <p:sp>
+        <p:nvSpPr>
+          <p:cNvPr id="2" name="Title 1">
+            <a:extLst>
+              <a:ext uri="{FF2B5EF4-FFF2-40B4-BE49-F238E27FC236}">
+                <a16:creationId xmlns:a16="http://schemas.microsoft.com/office/drawing/2014/main" id="{06BE9252-0EBB-4209-BEB2-AAA5BF55FEBB}"/>
+              </a:ext>
+            </a:extLst>
+          </p:cNvPr>
+          <p:cNvSpPr>
+            <a:spLocks noGrp="1"/>
+          </p:cNvSpPr>
+          <p:nvPr>
+            <p:ph type="title"/>
+          </p:nvPr>
+        </p:nvSpPr>
+        <p:spPr/>
+        <p:txBody>
+          <a:bodyPr/>
+          <a:lstStyle/>
+          <a:p>
+            <a:r>
+              <a:rPr lang="en-US" sz="2800"/>
+              <a:t>Check each set(s) by viewing sample of matched records</a:t>
+            </a:r>
+            <a:endParaRPr lang="en-GB" sz="2800"/>
+          </a:p>
+        </p:txBody>
+      </p:sp>
+      <p:pic>
+        <p:nvPicPr>
+          <p:cNvPr id="3" name="Picture 2">
+            <a:extLst>
+              <a:ext uri="{FF2B5EF4-FFF2-40B4-BE49-F238E27FC236}">
+                <a16:creationId xmlns:a16="http://schemas.microsoft.com/office/drawing/2014/main" id="{50FF6AAD-5E33-45E6-9511-2F96C5AFA929}"/>
+              </a:ext>
+            </a:extLst>
+          </p:cNvPr>
+          <p:cNvPicPr>
+            <a:picLocks noChangeAspect="1"/>
+          </p:cNvPicPr>
+          <p:nvPr/>
+        </p:nvPicPr>
+        <p:blipFill>
+          <a:blip r:embed="rId2"/>
+          <a:stretch>
+            <a:fillRect/>
+          </a:stretch>
+        </p:blipFill>
+        <p:spPr>
+          <a:xfrm>
+            <a:off x="1877671" y="3710866"/>
+            <a:ext cx="10229561" cy="3133039"/>
+          </a:xfrm>
+          <a:prstGeom prst="rect">
+            <a:avLst/>
+          </a:prstGeom>
+        </p:spPr>
+      </p:pic>
+      <p:sp>
+        <p:nvSpPr>
+          <p:cNvPr id="4" name="Oval 3">
+            <a:extLst>
+              <a:ext uri="{FF2B5EF4-FFF2-40B4-BE49-F238E27FC236}">
+                <a16:creationId xmlns:a16="http://schemas.microsoft.com/office/drawing/2014/main" id="{FB949BFF-705E-4B34-A97A-734C59D7A0C1}"/>
+              </a:ext>
+            </a:extLst>
+          </p:cNvPr>
+          <p:cNvSpPr/>
+          <p:nvPr/>
+        </p:nvSpPr>
+        <p:spPr>
+          <a:xfrm>
+            <a:off x="136280" y="1771152"/>
+            <a:ext cx="1644242" cy="1644242"/>
+          </a:xfrm>
+          <a:prstGeom prst="ellipse">
+            <a:avLst/>
+          </a:prstGeom>
+          <a:noFill/>
+          <a:effectLst>
+            <a:glow rad="139700">
+              <a:schemeClr val="accent6">
+                <a:satMod val="175000"/>
+                <a:alpha val="40000"/>
+              </a:schemeClr>
+            </a:glow>
+          </a:effectLst>
+        </p:spPr>
+        <p:style>
+          <a:lnRef idx="2">
+            <a:schemeClr val="dk1"/>
+          </a:lnRef>
+          <a:fillRef idx="1">
+            <a:schemeClr val="lt1"/>
+          </a:fillRef>
+          <a:effectRef idx="0">
+            <a:schemeClr val="dk1"/>
+          </a:effectRef>
+          <a:fontRef idx="minor">
+            <a:schemeClr val="dk1"/>
+          </a:fontRef>
+        </p:style>
+        <p:txBody>
+          <a:bodyPr rtlCol="0" anchor="ctr"/>
+          <a:lstStyle/>
+          <a:p>
+            <a:pPr algn="ctr"/>
+            <a:endParaRPr lang="en-GB"/>
+          </a:p>
+        </p:txBody>
+      </p:sp>
+      <p:sp>
+        <p:nvSpPr>
+          <p:cNvPr id="5" name="TextBox 4">
+            <a:extLst>
+              <a:ext uri="{FF2B5EF4-FFF2-40B4-BE49-F238E27FC236}">
+                <a16:creationId xmlns:a16="http://schemas.microsoft.com/office/drawing/2014/main" id="{EC99E198-3AB9-474E-884C-C1637EFFA89C}"/>
+              </a:ext>
+            </a:extLst>
+          </p:cNvPr>
+          <p:cNvSpPr txBox="1"/>
+          <p:nvPr/>
+        </p:nvSpPr>
+        <p:spPr>
+          <a:xfrm>
+            <a:off x="184176" y="2316923"/>
+            <a:ext cx="1493615" cy="738664"/>
+          </a:xfrm>
+          <a:prstGeom prst="rect">
+            <a:avLst/>
+          </a:prstGeom>
+          <a:noFill/>
+        </p:spPr>
+        <p:txBody>
+          <a:bodyPr wrap="none" rtlCol="0">
+            <a:spAutoFit/>
+          </a:bodyPr>
+          <a:lstStyle/>
+          <a:p>
+            <a:pPr algn="ctr"/>
+            <a:r>
+              <a:rPr lang="en-US" sz="1400"/>
+              <a:t>Biochemistry</a:t>
+            </a:r>
+          </a:p>
+          <a:p>
+            <a:pPr algn="ctr"/>
+            <a:r>
+              <a:rPr lang="en-US" sz="1400"/>
+              <a:t>People with UREA</a:t>
+            </a:r>
+          </a:p>
+          <a:p>
+            <a:pPr algn="ctr"/>
+            <a:r>
+              <a:rPr lang="en-US" sz="1400"/>
+              <a:t>Tests over 100</a:t>
+            </a:r>
+            <a:endParaRPr lang="en-GB" sz="1400"/>
+          </a:p>
+        </p:txBody>
+      </p:sp>
+      <p:sp>
+        <p:nvSpPr>
+          <p:cNvPr id="6" name="TextBox 5">
+            <a:extLst>
+              <a:ext uri="{FF2B5EF4-FFF2-40B4-BE49-F238E27FC236}">
+                <a16:creationId xmlns:a16="http://schemas.microsoft.com/office/drawing/2014/main" id="{6F15F1FA-AA80-46CA-8C8E-FD2B2F9C7CA1}"/>
+              </a:ext>
+            </a:extLst>
+          </p:cNvPr>
+          <p:cNvSpPr txBox="1"/>
+          <p:nvPr/>
+        </p:nvSpPr>
+        <p:spPr>
+          <a:xfrm>
+            <a:off x="317072" y="3506383"/>
+            <a:ext cx="1437701" cy="369332"/>
+          </a:xfrm>
+          <a:prstGeom prst="rect">
+            <a:avLst/>
+          </a:prstGeom>
+          <a:noFill/>
+        </p:spPr>
+        <p:txBody>
+          <a:bodyPr wrap="none" rtlCol="0">
+            <a:spAutoFit/>
+          </a:bodyPr>
+          <a:lstStyle/>
+          <a:p>
+            <a:r>
+              <a:rPr lang="en-US"/>
+              <a:t>Count = 7104</a:t>
+            </a:r>
+            <a:endParaRPr lang="en-GB"/>
+          </a:p>
+        </p:txBody>
+      </p:sp>
+    </p:spTree>
+    <p:extLst>
+      <p:ext uri="{BB962C8B-B14F-4D97-AF65-F5344CB8AC3E}">
+        <p14:creationId xmlns:p14="http://schemas.microsoft.com/office/powerpoint/2010/main" val="3872199317"/>
+      </p:ext>
+    </p:extLst>
+  </p:cSld>
+  <p:clrMapOvr>
+    <a:masterClrMapping/>
+  </p:clrMapOvr>
+</p:sld>
+</file>
+
+<file path=ppt/slides/slide12.xml><?xml version="1.0" encoding="utf-8"?>
+<p:sld xmlns:a="http://schemas.openxmlformats.org/drawingml/2006/main" xmlns:r="http://schemas.openxmlformats.org/officeDocument/2006/relationships" xmlns:p="http://schemas.openxmlformats.org/presentationml/2006/main">
+  <p:cSld>
+    <p:spTree>
+      <p:nvGrpSpPr>
+        <p:cNvPr id="1" name=""/>
+        <p:cNvGrpSpPr/>
+        <p:nvPr/>
+      </p:nvGrpSpPr>
+      <p:grpSpPr>
+        <a:xfrm>
+          <a:off x="0" y="0"/>
+          <a:ext cx="0" cy="0"/>
+          <a:chOff x="0" y="0"/>
+          <a:chExt cx="0" cy="0"/>
+        </a:xfrm>
+      </p:grpSpPr>
+      <p:sp>
+        <p:nvSpPr>
+          <p:cNvPr id="2" name="Title 1">
+            <a:extLst>
+              <a:ext uri="{FF2B5EF4-FFF2-40B4-BE49-F238E27FC236}">
+                <a16:creationId xmlns:a16="http://schemas.microsoft.com/office/drawing/2014/main" id="{4AD1D827-B02F-4752-BE3B-3CCCC99189AC}"/>
+              </a:ext>
+            </a:extLst>
+          </p:cNvPr>
+          <p:cNvSpPr>
+            <a:spLocks noGrp="1"/>
+          </p:cNvSpPr>
+          <p:nvPr>
+            <p:ph type="title"/>
+          </p:nvPr>
+        </p:nvSpPr>
+        <p:spPr/>
+        <p:txBody>
+          <a:bodyPr/>
+          <a:lstStyle/>
+          <a:p>
+            <a:r>
+              <a:rPr lang="en-US"/>
+              <a:t>Combine sets to answer final question</a:t>
+            </a:r>
+            <a:endParaRPr lang="en-GB"/>
+          </a:p>
+        </p:txBody>
+      </p:sp>
+      <p:pic>
+        <p:nvPicPr>
+          <p:cNvPr id="3" name="Picture 2">
+            <a:extLst>
+              <a:ext uri="{FF2B5EF4-FFF2-40B4-BE49-F238E27FC236}">
+                <a16:creationId xmlns:a16="http://schemas.microsoft.com/office/drawing/2014/main" id="{9E9F24B1-F42C-429E-8B3F-B3CBEAED7959}"/>
+              </a:ext>
+            </a:extLst>
+          </p:cNvPr>
+          <p:cNvPicPr>
+            <a:picLocks noChangeAspect="1"/>
+          </p:cNvPicPr>
+          <p:nvPr/>
+        </p:nvPicPr>
+        <p:blipFill>
+          <a:blip r:embed="rId2"/>
+          <a:stretch>
+            <a:fillRect/>
+          </a:stretch>
+        </p:blipFill>
+        <p:spPr>
+          <a:xfrm>
+            <a:off x="140380" y="1524005"/>
+            <a:ext cx="5824991" cy="5333995"/>
+          </a:xfrm>
+          <a:prstGeom prst="rect">
+            <a:avLst/>
+          </a:prstGeom>
+        </p:spPr>
+      </p:pic>
+      <p:sp>
+        <p:nvSpPr>
+          <p:cNvPr id="4" name="TextBox 3">
+            <a:extLst>
+              <a:ext uri="{FF2B5EF4-FFF2-40B4-BE49-F238E27FC236}">
+                <a16:creationId xmlns:a16="http://schemas.microsoft.com/office/drawing/2014/main" id="{FC0B3055-B282-4940-A899-3ABD858902AE}"/>
+              </a:ext>
+            </a:extLst>
+          </p:cNvPr>
+          <p:cNvSpPr txBox="1"/>
+          <p:nvPr/>
+        </p:nvSpPr>
+        <p:spPr>
+          <a:xfrm>
+            <a:off x="5471886" y="1690688"/>
+            <a:ext cx="6473371" cy="923330"/>
+          </a:xfrm>
+          <a:prstGeom prst="rect">
+            <a:avLst/>
+          </a:prstGeom>
+          <a:noFill/>
+        </p:spPr>
+        <p:txBody>
+          <a:bodyPr wrap="square" rtlCol="0">
+            <a:spAutoFit/>
+          </a:bodyPr>
+          <a:lstStyle/>
+          <a:p>
+            <a:pPr marL="285750" indent="-285750">
+              <a:buFont typeface="Arial" panose="020B0604020202020204" pitchFamily="34" charset="0"/>
+              <a:buChar char="•"/>
+            </a:pPr>
+            <a:r>
+              <a:rPr lang="en-US"/>
+              <a:t>People  who have a UREA test over 100</a:t>
+            </a:r>
+          </a:p>
+          <a:p>
+            <a:pPr marL="285750" indent="-285750">
+              <a:buFont typeface="Arial" panose="020B0604020202020204" pitchFamily="34" charset="0"/>
+              <a:buChar char="•"/>
+            </a:pPr>
+            <a:r>
+              <a:rPr lang="en-US"/>
+              <a:t>Who have never had a Sodium (NA) test</a:t>
+            </a:r>
+          </a:p>
+          <a:p>
+            <a:pPr marL="285750" indent="-285750">
+              <a:buFont typeface="Arial" panose="020B0604020202020204" pitchFamily="34" charset="0"/>
+              <a:buChar char="•"/>
+            </a:pPr>
+            <a:r>
+              <a:rPr lang="en-US"/>
+              <a:t>And have never been resident in Fife</a:t>
+            </a:r>
+            <a:endParaRPr lang="en-GB"/>
+          </a:p>
+        </p:txBody>
+      </p:sp>
+      <p:sp>
+        <p:nvSpPr>
+          <p:cNvPr id="5" name="Rectangle 4">
+            <a:extLst>
+              <a:ext uri="{FF2B5EF4-FFF2-40B4-BE49-F238E27FC236}">
+                <a16:creationId xmlns:a16="http://schemas.microsoft.com/office/drawing/2014/main" id="{D52FCF66-E8F6-4D62-8AB0-C4C407BB1C52}"/>
+              </a:ext>
+            </a:extLst>
+          </p:cNvPr>
+          <p:cNvSpPr/>
+          <p:nvPr/>
+        </p:nvSpPr>
+        <p:spPr>
+          <a:xfrm>
+            <a:off x="-1716620" y="1229023"/>
+            <a:ext cx="5318480" cy="923330"/>
+          </a:xfrm>
+          <a:prstGeom prst="rect">
+            <a:avLst/>
+          </a:prstGeom>
+        </p:spPr>
+        <p:txBody>
+          <a:bodyPr wrap="square">
+            <a:spAutoFit/>
+          </a:bodyPr>
+          <a:lstStyle/>
+          <a:p>
+            <a:pPr algn="ctr"/>
+            <a:r>
+              <a:rPr lang="en-US"/>
+              <a:t>Biochemistry</a:t>
+            </a:r>
+          </a:p>
+          <a:p>
+            <a:pPr algn="ctr"/>
+            <a:r>
+              <a:rPr lang="en-US"/>
+              <a:t>People with UREA</a:t>
+            </a:r>
+          </a:p>
+          <a:p>
+            <a:pPr algn="ctr"/>
+            <a:r>
+              <a:rPr lang="en-US"/>
+              <a:t>Tests over 100</a:t>
+            </a:r>
+            <a:endParaRPr lang="en-GB"/>
+          </a:p>
+        </p:txBody>
+      </p:sp>
+      <p:sp>
+        <p:nvSpPr>
+          <p:cNvPr id="6" name="TextBox 5">
+            <a:extLst>
+              <a:ext uri="{FF2B5EF4-FFF2-40B4-BE49-F238E27FC236}">
+                <a16:creationId xmlns:a16="http://schemas.microsoft.com/office/drawing/2014/main" id="{1AD3DF3A-8D0A-4A47-87FE-5AFC52B4AA83}"/>
+              </a:ext>
+            </a:extLst>
+          </p:cNvPr>
+          <p:cNvSpPr txBox="1"/>
+          <p:nvPr/>
+        </p:nvSpPr>
+        <p:spPr>
+          <a:xfrm>
+            <a:off x="5006854" y="4435927"/>
+            <a:ext cx="930063" cy="600164"/>
+          </a:xfrm>
+          <a:prstGeom prst="rect">
+            <a:avLst/>
+          </a:prstGeom>
+          <a:noFill/>
+        </p:spPr>
+        <p:txBody>
+          <a:bodyPr wrap="none" rtlCol="0">
+            <a:spAutoFit/>
+          </a:bodyPr>
+          <a:lstStyle/>
+          <a:p>
+            <a:r>
+              <a:rPr lang="en-US" sz="1100"/>
+              <a:t>Biochemistry</a:t>
+            </a:r>
+          </a:p>
+          <a:p>
+            <a:r>
+              <a:rPr lang="en-US" sz="1100"/>
+              <a:t>People with </a:t>
+            </a:r>
+          </a:p>
+          <a:p>
+            <a:r>
+              <a:rPr lang="en-US" sz="1100"/>
+              <a:t>Sodium tests</a:t>
+            </a:r>
+            <a:endParaRPr lang="en-GB" sz="1100"/>
+          </a:p>
+        </p:txBody>
+      </p:sp>
+      <p:sp>
+        <p:nvSpPr>
+          <p:cNvPr id="7" name="TextBox 6">
+            <a:extLst>
+              <a:ext uri="{FF2B5EF4-FFF2-40B4-BE49-F238E27FC236}">
+                <a16:creationId xmlns:a16="http://schemas.microsoft.com/office/drawing/2014/main" id="{45D7F842-1C2C-4667-8731-9D69A3DA1D82}"/>
+              </a:ext>
+            </a:extLst>
+          </p:cNvPr>
+          <p:cNvSpPr txBox="1"/>
+          <p:nvPr/>
+        </p:nvSpPr>
+        <p:spPr>
+          <a:xfrm>
+            <a:off x="140380" y="5725133"/>
+            <a:ext cx="930063" cy="600164"/>
+          </a:xfrm>
+          <a:prstGeom prst="rect">
+            <a:avLst/>
+          </a:prstGeom>
+          <a:noFill/>
+        </p:spPr>
+        <p:txBody>
+          <a:bodyPr wrap="none" rtlCol="0">
+            <a:spAutoFit/>
+          </a:bodyPr>
+          <a:lstStyle/>
+          <a:p>
+            <a:r>
+              <a:rPr lang="en-US" sz="1100"/>
+              <a:t>Biochemistry</a:t>
+            </a:r>
+          </a:p>
+          <a:p>
+            <a:r>
+              <a:rPr lang="en-US" sz="1100"/>
+              <a:t>People with </a:t>
+            </a:r>
+          </a:p>
+          <a:p>
+            <a:r>
+              <a:rPr lang="en-US" sz="1100"/>
+              <a:t>Sodium tests</a:t>
+            </a:r>
+            <a:endParaRPr lang="en-GB" sz="1100"/>
+          </a:p>
+        </p:txBody>
+      </p:sp>
+      <p:pic>
+        <p:nvPicPr>
+          <p:cNvPr id="9" name="Picture 8">
+            <a:extLst>
+              <a:ext uri="{FF2B5EF4-FFF2-40B4-BE49-F238E27FC236}">
+                <a16:creationId xmlns:a16="http://schemas.microsoft.com/office/drawing/2014/main" id="{287B397A-ED85-46E0-A1F6-9929FAF0BB52}"/>
+              </a:ext>
+            </a:extLst>
+          </p:cNvPr>
+          <p:cNvPicPr>
+            <a:picLocks noChangeAspect="1"/>
+          </p:cNvPicPr>
+          <p:nvPr/>
+        </p:nvPicPr>
+        <p:blipFill>
+          <a:blip r:embed="rId3"/>
+          <a:stretch>
+            <a:fillRect/>
+          </a:stretch>
+        </p:blipFill>
+        <p:spPr>
+          <a:xfrm>
+            <a:off x="4828147" y="5373911"/>
+            <a:ext cx="7363853" cy="1381318"/>
+          </a:xfrm>
+          <a:prstGeom prst="rect">
+            <a:avLst/>
+          </a:prstGeom>
+        </p:spPr>
+      </p:pic>
+      <p:sp>
+        <p:nvSpPr>
+          <p:cNvPr id="10" name="TextBox 9">
+            <a:extLst>
+              <a:ext uri="{FF2B5EF4-FFF2-40B4-BE49-F238E27FC236}">
+                <a16:creationId xmlns:a16="http://schemas.microsoft.com/office/drawing/2014/main" id="{84410498-FE78-479B-8C5F-8C27C155AA16}"/>
+              </a:ext>
+            </a:extLst>
+          </p:cNvPr>
+          <p:cNvSpPr txBox="1"/>
+          <p:nvPr/>
+        </p:nvSpPr>
+        <p:spPr>
+          <a:xfrm>
+            <a:off x="1593373" y="2978301"/>
+            <a:ext cx="1517210" cy="369332"/>
+          </a:xfrm>
+          <a:prstGeom prst="rect">
+            <a:avLst/>
+          </a:prstGeom>
+          <a:noFill/>
+        </p:spPr>
+        <p:txBody>
+          <a:bodyPr wrap="none" rtlCol="0">
+            <a:spAutoFit/>
+          </a:bodyPr>
+          <a:lstStyle/>
+          <a:p>
+            <a:r>
+              <a:rPr lang="en-US"/>
+              <a:t>5,975 Patients</a:t>
+            </a:r>
+            <a:endParaRPr lang="en-GB"/>
+          </a:p>
+        </p:txBody>
+      </p:sp>
+    </p:spTree>
+    <p:extLst>
+      <p:ext uri="{BB962C8B-B14F-4D97-AF65-F5344CB8AC3E}">
+        <p14:creationId xmlns:p14="http://schemas.microsoft.com/office/powerpoint/2010/main" val="1558505030"/>
+      </p:ext>
+    </p:extLst>
+  </p:cSld>
+  <p:clrMapOvr>
+    <a:masterClrMapping/>
+  </p:clrMapOvr>
+</p:sld>
+</file>
+
+<file path=ppt/slides/slide13.xml><?xml version="1.0" encoding="utf-8"?>
+<p:sld xmlns:a="http://schemas.openxmlformats.org/drawingml/2006/main" xmlns:r="http://schemas.openxmlformats.org/officeDocument/2006/relationships" xmlns:p="http://schemas.openxmlformats.org/presentationml/2006/main">
+  <p:cSld>
+    <p:spTree>
+      <p:nvGrpSpPr>
+        <p:cNvPr id="1" name=""/>
+        <p:cNvGrpSpPr/>
+        <p:nvPr/>
+      </p:nvGrpSpPr>
+      <p:grpSpPr>
+        <a:xfrm>
+          <a:off x="0" y="0"/>
+          <a:ext cx="0" cy="0"/>
+          <a:chOff x="0" y="0"/>
+          <a:chExt cx="0" cy="0"/>
+        </a:xfrm>
+      </p:grpSpPr>
+      <p:sp>
+        <p:nvSpPr>
+          <p:cNvPr id="3" name="Title 1">
+            <a:extLst>
+              <a:ext uri="{FF2B5EF4-FFF2-40B4-BE49-F238E27FC236}">
+                <a16:creationId xmlns:a16="http://schemas.microsoft.com/office/drawing/2014/main" id="{A4C9F07B-A795-485B-9417-D8FF5A1F43D3}"/>
+              </a:ext>
+            </a:extLst>
+          </p:cNvPr>
+          <p:cNvSpPr>
+            <a:spLocks noGrp="1"/>
+          </p:cNvSpPr>
+          <p:nvPr>
+            <p:ph type="title"/>
+          </p:nvPr>
+        </p:nvSpPr>
+        <p:spPr>
+          <a:xfrm>
+            <a:off x="838200" y="365125"/>
+            <a:ext cx="10515600" cy="1325563"/>
+          </a:xfrm>
+        </p:spPr>
+        <p:txBody>
+          <a:bodyPr/>
+          <a:lstStyle/>
+          <a:p>
+            <a:pPr algn="ctr"/>
+            <a:r>
+              <a:rPr lang="en-US"/>
+              <a:t>Run Graphs on Final Matched Patients</a:t>
+            </a:r>
+            <a:endParaRPr lang="en-GB"/>
+          </a:p>
+        </p:txBody>
+      </p:sp>
+      <p:pic>
+        <p:nvPicPr>
+          <p:cNvPr id="2" name="Picture 1">
+            <a:extLst>
+              <a:ext uri="{FF2B5EF4-FFF2-40B4-BE49-F238E27FC236}">
+                <a16:creationId xmlns:a16="http://schemas.microsoft.com/office/drawing/2014/main" id="{0AB796C5-179E-4E7D-96EB-B9C858F3692A}"/>
+              </a:ext>
+            </a:extLst>
+          </p:cNvPr>
+          <p:cNvPicPr>
+            <a:picLocks noChangeAspect="1"/>
+          </p:cNvPicPr>
+          <p:nvPr/>
+        </p:nvPicPr>
+        <p:blipFill>
+          <a:blip r:embed="rId2"/>
+          <a:stretch>
+            <a:fillRect/>
+          </a:stretch>
+        </p:blipFill>
+        <p:spPr>
+          <a:xfrm>
+            <a:off x="1530220" y="1387884"/>
+            <a:ext cx="9321282" cy="4790304"/>
+          </a:xfrm>
+          <a:prstGeom prst="rect">
+            <a:avLst/>
+          </a:prstGeom>
+        </p:spPr>
+      </p:pic>
+      <p:sp>
+        <p:nvSpPr>
+          <p:cNvPr id="5" name="TextBox 4">
+            <a:extLst>
+              <a:ext uri="{FF2B5EF4-FFF2-40B4-BE49-F238E27FC236}">
+                <a16:creationId xmlns:a16="http://schemas.microsoft.com/office/drawing/2014/main" id="{A1B74E92-9C74-421A-B707-FA2E61646E87}"/>
+              </a:ext>
+            </a:extLst>
+          </p:cNvPr>
+          <p:cNvSpPr txBox="1"/>
+          <p:nvPr/>
+        </p:nvSpPr>
+        <p:spPr>
+          <a:xfrm>
+            <a:off x="2433931" y="6123543"/>
+            <a:ext cx="2493696" cy="369332"/>
+          </a:xfrm>
+          <a:prstGeom prst="rect">
+            <a:avLst/>
+          </a:prstGeom>
+          <a:noFill/>
+        </p:spPr>
+        <p:txBody>
+          <a:bodyPr wrap="none" rtlCol="0">
+            <a:spAutoFit/>
+          </a:bodyPr>
+          <a:lstStyle/>
+          <a:p>
+            <a:r>
+              <a:rPr lang="en-US"/>
+              <a:t>All Biochemistry Records</a:t>
+            </a:r>
+            <a:endParaRPr lang="en-GB"/>
+          </a:p>
+        </p:txBody>
+      </p:sp>
+      <p:sp>
+        <p:nvSpPr>
+          <p:cNvPr id="6" name="TextBox 5">
+            <a:extLst>
+              <a:ext uri="{FF2B5EF4-FFF2-40B4-BE49-F238E27FC236}">
+                <a16:creationId xmlns:a16="http://schemas.microsoft.com/office/drawing/2014/main" id="{9643D4FB-2AAC-45AF-998C-0EDA6221DDF9}"/>
+              </a:ext>
+            </a:extLst>
+          </p:cNvPr>
+          <p:cNvSpPr txBox="1"/>
+          <p:nvPr/>
+        </p:nvSpPr>
+        <p:spPr>
+          <a:xfrm>
+            <a:off x="6280764" y="6164421"/>
+            <a:ext cx="4570738" cy="369332"/>
+          </a:xfrm>
+          <a:prstGeom prst="rect">
+            <a:avLst/>
+          </a:prstGeom>
+          <a:noFill/>
+        </p:spPr>
+        <p:txBody>
+          <a:bodyPr wrap="none" rtlCol="0">
+            <a:spAutoFit/>
+          </a:bodyPr>
+          <a:lstStyle/>
+          <a:p>
+            <a:r>
+              <a:rPr lang="en-US"/>
+              <a:t>Biochemistry records of patients in final cohort</a:t>
+            </a:r>
+            <a:endParaRPr lang="en-GB"/>
+          </a:p>
+        </p:txBody>
+      </p:sp>
+    </p:spTree>
+    <p:extLst>
+      <p:ext uri="{BB962C8B-B14F-4D97-AF65-F5344CB8AC3E}">
+        <p14:creationId xmlns:p14="http://schemas.microsoft.com/office/powerpoint/2010/main" val="3279893822"/>
+      </p:ext>
+    </p:extLst>
+  </p:cSld>
+  <p:clrMapOvr>
+    <a:masterClrMapping/>
+  </p:clrMapOvr>
+</p:sld>
+</file>
+
+<file path=ppt/slides/slide14.xml><?xml version="1.0" encoding="utf-8"?>
+<p:sld xmlns:a="http://schemas.openxmlformats.org/drawingml/2006/main" xmlns:r="http://schemas.openxmlformats.org/officeDocument/2006/relationships" xmlns:p="http://schemas.openxmlformats.org/presentationml/2006/main">
+  <p:cSld>
+    <p:spTree>
+      <p:nvGrpSpPr>
+        <p:cNvPr id="1" name=""/>
+        <p:cNvGrpSpPr/>
+        <p:nvPr/>
+      </p:nvGrpSpPr>
+      <p:grpSpPr>
+        <a:xfrm>
+          <a:off x="0" y="0"/>
+          <a:ext cx="0" cy="0"/>
+          <a:chOff x="0" y="0"/>
+          <a:chExt cx="0" cy="0"/>
+        </a:xfrm>
+      </p:grpSpPr>
+      <p:sp>
+        <p:nvSpPr>
+          <p:cNvPr id="2" name="Title 1">
+            <a:extLst>
+              <a:ext uri="{FF2B5EF4-FFF2-40B4-BE49-F238E27FC236}">
+                <a16:creationId xmlns:a16="http://schemas.microsoft.com/office/drawing/2014/main" id="{FE341572-7E57-4757-8778-5A5FFE8C8582}"/>
+              </a:ext>
+            </a:extLst>
+          </p:cNvPr>
+          <p:cNvSpPr>
+            <a:spLocks noGrp="1"/>
+          </p:cNvSpPr>
+          <p:nvPr>
+            <p:ph type="title"/>
+          </p:nvPr>
+        </p:nvSpPr>
+        <p:spPr/>
+        <p:txBody>
+          <a:bodyPr/>
+          <a:lstStyle/>
+          <a:p>
+            <a:pPr algn="ctr"/>
+            <a:r>
+              <a:rPr lang="en-US"/>
+              <a:t>Run Graphs on Final Matched Patients</a:t>
+            </a:r>
+            <a:endParaRPr lang="en-GB"/>
+          </a:p>
+        </p:txBody>
+      </p:sp>
+      <p:pic>
+        <p:nvPicPr>
+          <p:cNvPr id="5" name="Picture 4">
+            <a:extLst>
+              <a:ext uri="{FF2B5EF4-FFF2-40B4-BE49-F238E27FC236}">
+                <a16:creationId xmlns:a16="http://schemas.microsoft.com/office/drawing/2014/main" id="{DCD91877-8EED-46D7-B5E5-315FCF1942C9}"/>
+              </a:ext>
+            </a:extLst>
+          </p:cNvPr>
+          <p:cNvPicPr>
+            <a:picLocks noChangeAspect="1"/>
+          </p:cNvPicPr>
+          <p:nvPr/>
+        </p:nvPicPr>
+        <p:blipFill>
+          <a:blip r:embed="rId2"/>
+          <a:stretch>
+            <a:fillRect/>
+          </a:stretch>
+        </p:blipFill>
+        <p:spPr>
+          <a:xfrm>
+            <a:off x="1595097" y="1386868"/>
+            <a:ext cx="9001806" cy="4671470"/>
+          </a:xfrm>
+          <a:prstGeom prst="rect">
+            <a:avLst/>
+          </a:prstGeom>
+        </p:spPr>
+      </p:pic>
+      <p:sp>
+        <p:nvSpPr>
+          <p:cNvPr id="7" name="TextBox 6">
+            <a:extLst>
+              <a:ext uri="{FF2B5EF4-FFF2-40B4-BE49-F238E27FC236}">
+                <a16:creationId xmlns:a16="http://schemas.microsoft.com/office/drawing/2014/main" id="{032F7F9F-6C81-4495-8481-39D2069C2DE8}"/>
+              </a:ext>
+            </a:extLst>
+          </p:cNvPr>
+          <p:cNvSpPr txBox="1"/>
+          <p:nvPr/>
+        </p:nvSpPr>
+        <p:spPr>
+          <a:xfrm>
+            <a:off x="2433931" y="6123543"/>
+            <a:ext cx="2474845" cy="369332"/>
+          </a:xfrm>
+          <a:prstGeom prst="rect">
+            <a:avLst/>
+          </a:prstGeom>
+          <a:noFill/>
+        </p:spPr>
+        <p:txBody>
+          <a:bodyPr wrap="none" rtlCol="0">
+            <a:spAutoFit/>
+          </a:bodyPr>
+          <a:lstStyle/>
+          <a:p>
+            <a:r>
+              <a:rPr lang="en-US"/>
+              <a:t>All Demography Records</a:t>
+            </a:r>
+            <a:endParaRPr lang="en-GB"/>
+          </a:p>
+        </p:txBody>
+      </p:sp>
+      <p:sp>
+        <p:nvSpPr>
+          <p:cNvPr id="8" name="TextBox 7">
+            <a:extLst>
+              <a:ext uri="{FF2B5EF4-FFF2-40B4-BE49-F238E27FC236}">
+                <a16:creationId xmlns:a16="http://schemas.microsoft.com/office/drawing/2014/main" id="{79850677-6EA9-45BD-B4B2-3854761B3301}"/>
+              </a:ext>
+            </a:extLst>
+          </p:cNvPr>
+          <p:cNvSpPr txBox="1"/>
+          <p:nvPr/>
+        </p:nvSpPr>
+        <p:spPr>
+          <a:xfrm>
+            <a:off x="6280764" y="6164421"/>
+            <a:ext cx="4560031" cy="369332"/>
+          </a:xfrm>
+          <a:prstGeom prst="rect">
+            <a:avLst/>
+          </a:prstGeom>
+          <a:noFill/>
+        </p:spPr>
+        <p:txBody>
+          <a:bodyPr wrap="none" rtlCol="0">
+            <a:spAutoFit/>
+          </a:bodyPr>
+          <a:lstStyle/>
+          <a:p>
+            <a:r>
+              <a:rPr lang="en-US"/>
+              <a:t>Demography records of patients in final cohort</a:t>
+            </a:r>
+            <a:endParaRPr lang="en-GB"/>
+          </a:p>
+        </p:txBody>
+      </p:sp>
+    </p:spTree>
+    <p:extLst>
+      <p:ext uri="{BB962C8B-B14F-4D97-AF65-F5344CB8AC3E}">
+        <p14:creationId xmlns:p14="http://schemas.microsoft.com/office/powerpoint/2010/main" val="1376639511"/>
+      </p:ext>
+    </p:extLst>
+  </p:cSld>
+  <p:clrMapOvr>
+    <a:masterClrMapping/>
+  </p:clrMapOvr>
+</p:sld>
+</file>
+
+<file path=ppt/slides/slide15.xml><?xml version="1.0" encoding="utf-8"?>
+<p:sld xmlns:a="http://schemas.openxmlformats.org/drawingml/2006/main" xmlns:r="http://schemas.openxmlformats.org/officeDocument/2006/relationships" xmlns:p="http://schemas.openxmlformats.org/presentationml/2006/main">
+  <p:cSld>
+    <p:spTree>
+      <p:nvGrpSpPr>
+        <p:cNvPr id="1" name=""/>
+        <p:cNvGrpSpPr/>
+        <p:nvPr/>
+      </p:nvGrpSpPr>
+      <p:grpSpPr>
+        <a:xfrm>
+          <a:off x="0" y="0"/>
+          <a:ext cx="0" cy="0"/>
+          <a:chOff x="0" y="0"/>
+          <a:chExt cx="0" cy="0"/>
+        </a:xfrm>
+      </p:grpSpPr>
+      <p:sp>
+        <p:nvSpPr>
+          <p:cNvPr id="2" name="Title 1">
+            <a:extLst>
+              <a:ext uri="{FF2B5EF4-FFF2-40B4-BE49-F238E27FC236}">
+                <a16:creationId xmlns:a16="http://schemas.microsoft.com/office/drawing/2014/main" id="{FB87DE5C-544C-467A-8DF8-7F3ABDBA6284}"/>
+              </a:ext>
+            </a:extLst>
+          </p:cNvPr>
+          <p:cNvSpPr>
+            <a:spLocks noGrp="1"/>
+          </p:cNvSpPr>
+          <p:nvPr>
+            <p:ph type="title"/>
+          </p:nvPr>
+        </p:nvSpPr>
+        <p:spPr/>
+        <p:txBody>
+          <a:bodyPr/>
+          <a:lstStyle/>
+          <a:p>
+            <a:pPr algn="ctr"/>
+            <a:r>
+              <a:rPr lang="en-US"/>
+              <a:t>DLS Example</a:t>
+            </a:r>
+            <a:endParaRPr lang="en-GB"/>
+          </a:p>
+        </p:txBody>
+      </p:sp>
+      <p:sp>
+        <p:nvSpPr>
+          <p:cNvPr id="3" name="Content Placeholder 2">
+            <a:extLst>
+              <a:ext uri="{FF2B5EF4-FFF2-40B4-BE49-F238E27FC236}">
+                <a16:creationId xmlns:a16="http://schemas.microsoft.com/office/drawing/2014/main" id="{248FAED9-1048-450E-9E7E-43FEC9BC1AAC}"/>
+              </a:ext>
+            </a:extLst>
+          </p:cNvPr>
+          <p:cNvSpPr>
+            <a:spLocks noGrp="1"/>
+          </p:cNvSpPr>
+          <p:nvPr>
+            <p:ph idx="1"/>
+          </p:nvPr>
+        </p:nvSpPr>
+        <p:spPr/>
+        <p:txBody>
+          <a:bodyPr/>
+          <a:lstStyle/>
+          <a:p>
+            <a:endParaRPr lang="en-GB"/>
+          </a:p>
+        </p:txBody>
+      </p:sp>
+      <p:pic>
+        <p:nvPicPr>
+          <p:cNvPr id="4" name="Picture 3">
+            <a:extLst>
+              <a:ext uri="{FF2B5EF4-FFF2-40B4-BE49-F238E27FC236}">
+                <a16:creationId xmlns:a16="http://schemas.microsoft.com/office/drawing/2014/main" id="{243E120A-E3ED-4C38-B2D6-18A1E3E94028}"/>
+              </a:ext>
+            </a:extLst>
+          </p:cNvPr>
+          <p:cNvPicPr>
+            <a:picLocks noChangeAspect="1"/>
+          </p:cNvPicPr>
+          <p:nvPr/>
+        </p:nvPicPr>
+        <p:blipFill>
+          <a:blip r:embed="rId2"/>
+          <a:stretch>
+            <a:fillRect/>
+          </a:stretch>
+        </p:blipFill>
+        <p:spPr>
+          <a:xfrm>
+            <a:off x="838200" y="1740601"/>
+            <a:ext cx="10786242" cy="5117399"/>
+          </a:xfrm>
+          <a:prstGeom prst="rect">
+            <a:avLst/>
+          </a:prstGeom>
+        </p:spPr>
+      </p:pic>
+    </p:spTree>
+    <p:extLst>
+      <p:ext uri="{BB962C8B-B14F-4D97-AF65-F5344CB8AC3E}">
+        <p14:creationId xmlns:p14="http://schemas.microsoft.com/office/powerpoint/2010/main" val="2468800823"/>
+      </p:ext>
+    </p:extLst>
+  </p:cSld>
+  <p:clrMapOvr>
+    <a:masterClrMapping/>
+  </p:clrMapOvr>
+</p:sld>
+</file>
+
 <file path=ppt/slides/slide2.xml><?xml version="1.0" encoding="utf-8"?>
 <p:sld xmlns:a="http://schemas.openxmlformats.org/drawingml/2006/main" xmlns:r="http://schemas.openxmlformats.org/officeDocument/2006/relationships" xmlns:p="http://schemas.openxmlformats.org/presentationml/2006/main">
   <p:cSld>
@@ -6216,6 +7548,1506 @@
     <p:extLst>
       <p:ext uri="{BB962C8B-B14F-4D97-AF65-F5344CB8AC3E}">
         <p14:creationId xmlns:p14="http://schemas.microsoft.com/office/powerpoint/2010/main" val="3380575569"/>
+      </p:ext>
+    </p:extLst>
+  </p:cSld>
+  <p:clrMapOvr>
+    <a:masterClrMapping/>
+  </p:clrMapOvr>
+</p:sld>
+</file>
+
+<file path=ppt/slides/slide7.xml><?xml version="1.0" encoding="utf-8"?>
+<p:sld xmlns:a="http://schemas.openxmlformats.org/drawingml/2006/main" xmlns:r="http://schemas.openxmlformats.org/officeDocument/2006/relationships" xmlns:p="http://schemas.openxmlformats.org/presentationml/2006/main">
+  <p:cSld>
+    <p:spTree>
+      <p:nvGrpSpPr>
+        <p:cNvPr id="1" name=""/>
+        <p:cNvGrpSpPr/>
+        <p:nvPr/>
+      </p:nvGrpSpPr>
+      <p:grpSpPr>
+        <a:xfrm>
+          <a:off x="0" y="0"/>
+          <a:ext cx="0" cy="0"/>
+          <a:chOff x="0" y="0"/>
+          <a:chExt cx="0" cy="0"/>
+        </a:xfrm>
+      </p:grpSpPr>
+      <p:sp>
+        <p:nvSpPr>
+          <p:cNvPr id="4" name="Oval 3">
+            <a:extLst>
+              <a:ext uri="{FF2B5EF4-FFF2-40B4-BE49-F238E27FC236}">
+                <a16:creationId xmlns:a16="http://schemas.microsoft.com/office/drawing/2014/main" id="{10237B3E-94EC-487A-9005-6484D12BA64B}"/>
+              </a:ext>
+            </a:extLst>
+          </p:cNvPr>
+          <p:cNvSpPr/>
+          <p:nvPr/>
+        </p:nvSpPr>
+        <p:spPr>
+          <a:xfrm>
+            <a:off x="953025" y="1377949"/>
+            <a:ext cx="1644242" cy="1644242"/>
+          </a:xfrm>
+          <a:prstGeom prst="ellipse">
+            <a:avLst/>
+          </a:prstGeom>
+          <a:noFill/>
+          <a:effectLst>
+            <a:glow rad="139700">
+              <a:schemeClr val="accent6">
+                <a:satMod val="175000"/>
+                <a:alpha val="40000"/>
+              </a:schemeClr>
+            </a:glow>
+          </a:effectLst>
+        </p:spPr>
+        <p:style>
+          <a:lnRef idx="2">
+            <a:schemeClr val="dk1"/>
+          </a:lnRef>
+          <a:fillRef idx="1">
+            <a:schemeClr val="lt1"/>
+          </a:fillRef>
+          <a:effectRef idx="0">
+            <a:schemeClr val="dk1"/>
+          </a:effectRef>
+          <a:fontRef idx="minor">
+            <a:schemeClr val="dk1"/>
+          </a:fontRef>
+        </p:style>
+        <p:txBody>
+          <a:bodyPr rtlCol="0" anchor="ctr"/>
+          <a:lstStyle/>
+          <a:p>
+            <a:pPr algn="ctr"/>
+            <a:endParaRPr lang="en-GB"/>
+          </a:p>
+        </p:txBody>
+      </p:sp>
+      <p:sp>
+        <p:nvSpPr>
+          <p:cNvPr id="5" name="Oval 4">
+            <a:extLst>
+              <a:ext uri="{FF2B5EF4-FFF2-40B4-BE49-F238E27FC236}">
+                <a16:creationId xmlns:a16="http://schemas.microsoft.com/office/drawing/2014/main" id="{B7AA9A62-B63A-4022-B575-904DF59A41D3}"/>
+              </a:ext>
+            </a:extLst>
+          </p:cNvPr>
+          <p:cNvSpPr/>
+          <p:nvPr/>
+        </p:nvSpPr>
+        <p:spPr>
+          <a:xfrm>
+            <a:off x="1132949" y="3305012"/>
+            <a:ext cx="1400962" cy="1400962"/>
+          </a:xfrm>
+          <a:prstGeom prst="ellipse">
+            <a:avLst/>
+          </a:prstGeom>
+          <a:noFill/>
+          <a:effectLst>
+            <a:glow rad="228600">
+              <a:schemeClr val="accent2">
+                <a:satMod val="175000"/>
+                <a:alpha val="40000"/>
+              </a:schemeClr>
+            </a:glow>
+          </a:effectLst>
+        </p:spPr>
+        <p:style>
+          <a:lnRef idx="2">
+            <a:schemeClr val="dk1"/>
+          </a:lnRef>
+          <a:fillRef idx="1">
+            <a:schemeClr val="lt1"/>
+          </a:fillRef>
+          <a:effectRef idx="0">
+            <a:schemeClr val="dk1"/>
+          </a:effectRef>
+          <a:fontRef idx="minor">
+            <a:schemeClr val="dk1"/>
+          </a:fontRef>
+        </p:style>
+        <p:txBody>
+          <a:bodyPr rtlCol="0" anchor="ctr"/>
+          <a:lstStyle/>
+          <a:p>
+            <a:pPr algn="ctr"/>
+            <a:endParaRPr lang="en-GB"/>
+          </a:p>
+        </p:txBody>
+      </p:sp>
+      <p:sp>
+        <p:nvSpPr>
+          <p:cNvPr id="6" name="Oval 5">
+            <a:extLst>
+              <a:ext uri="{FF2B5EF4-FFF2-40B4-BE49-F238E27FC236}">
+                <a16:creationId xmlns:a16="http://schemas.microsoft.com/office/drawing/2014/main" id="{2BC74221-A8B5-482F-9917-4A3D5CD17F2C}"/>
+              </a:ext>
+            </a:extLst>
+          </p:cNvPr>
+          <p:cNvSpPr/>
+          <p:nvPr/>
+        </p:nvSpPr>
+        <p:spPr>
+          <a:xfrm>
+            <a:off x="1132949" y="5091913"/>
+            <a:ext cx="1400962" cy="1400962"/>
+          </a:xfrm>
+          <a:prstGeom prst="ellipse">
+            <a:avLst/>
+          </a:prstGeom>
+          <a:noFill/>
+          <a:effectLst>
+            <a:glow rad="228600">
+              <a:schemeClr val="accent5">
+                <a:satMod val="175000"/>
+                <a:alpha val="40000"/>
+              </a:schemeClr>
+            </a:glow>
+          </a:effectLst>
+        </p:spPr>
+        <p:style>
+          <a:lnRef idx="2">
+            <a:schemeClr val="dk1"/>
+          </a:lnRef>
+          <a:fillRef idx="1">
+            <a:schemeClr val="lt1"/>
+          </a:fillRef>
+          <a:effectRef idx="0">
+            <a:schemeClr val="dk1"/>
+          </a:effectRef>
+          <a:fontRef idx="minor">
+            <a:schemeClr val="dk1"/>
+          </a:fontRef>
+        </p:style>
+        <p:txBody>
+          <a:bodyPr rtlCol="0" anchor="ctr"/>
+          <a:lstStyle/>
+          <a:p>
+            <a:pPr algn="ctr"/>
+            <a:endParaRPr lang="en-GB"/>
+          </a:p>
+        </p:txBody>
+      </p:sp>
+      <p:sp>
+        <p:nvSpPr>
+          <p:cNvPr id="8" name="TextBox 7">
+            <a:extLst>
+              <a:ext uri="{FF2B5EF4-FFF2-40B4-BE49-F238E27FC236}">
+                <a16:creationId xmlns:a16="http://schemas.microsoft.com/office/drawing/2014/main" id="{221A61D3-B596-46B7-9271-206ACBEF1C25}"/>
+              </a:ext>
+            </a:extLst>
+          </p:cNvPr>
+          <p:cNvSpPr txBox="1"/>
+          <p:nvPr/>
+        </p:nvSpPr>
+        <p:spPr>
+          <a:xfrm>
+            <a:off x="1074665" y="2015404"/>
+            <a:ext cx="1459246" cy="369332"/>
+          </a:xfrm>
+          <a:prstGeom prst="rect">
+            <a:avLst/>
+          </a:prstGeom>
+          <a:noFill/>
+        </p:spPr>
+        <p:txBody>
+          <a:bodyPr wrap="none" rtlCol="0">
+            <a:spAutoFit/>
+          </a:bodyPr>
+          <a:lstStyle/>
+          <a:p>
+            <a:r>
+              <a:rPr lang="en-US"/>
+              <a:t>Biochemistry</a:t>
+            </a:r>
+            <a:endParaRPr lang="en-GB"/>
+          </a:p>
+        </p:txBody>
+      </p:sp>
+      <p:sp>
+        <p:nvSpPr>
+          <p:cNvPr id="9" name="TextBox 8">
+            <a:extLst>
+              <a:ext uri="{FF2B5EF4-FFF2-40B4-BE49-F238E27FC236}">
+                <a16:creationId xmlns:a16="http://schemas.microsoft.com/office/drawing/2014/main" id="{D37D8F0B-D8DD-4EE7-9F64-A3EA6AD7EEE0}"/>
+              </a:ext>
+            </a:extLst>
+          </p:cNvPr>
+          <p:cNvSpPr txBox="1"/>
+          <p:nvPr/>
+        </p:nvSpPr>
+        <p:spPr>
+          <a:xfrm>
+            <a:off x="1293890" y="3851604"/>
+            <a:ext cx="1137363" cy="307777"/>
+          </a:xfrm>
+          <a:prstGeom prst="rect">
+            <a:avLst/>
+          </a:prstGeom>
+          <a:noFill/>
+        </p:spPr>
+        <p:txBody>
+          <a:bodyPr wrap="none" rtlCol="0">
+            <a:spAutoFit/>
+          </a:bodyPr>
+          <a:lstStyle/>
+          <a:p>
+            <a:r>
+              <a:rPr lang="en-US" sz="1400"/>
+              <a:t>Biochemistry</a:t>
+            </a:r>
+            <a:endParaRPr lang="en-GB" sz="1400"/>
+          </a:p>
+        </p:txBody>
+      </p:sp>
+      <p:sp>
+        <p:nvSpPr>
+          <p:cNvPr id="10" name="TextBox 9">
+            <a:extLst>
+              <a:ext uri="{FF2B5EF4-FFF2-40B4-BE49-F238E27FC236}">
+                <a16:creationId xmlns:a16="http://schemas.microsoft.com/office/drawing/2014/main" id="{7591D5D2-4CF8-45FB-89A1-BDAA124F156D}"/>
+              </a:ext>
+            </a:extLst>
+          </p:cNvPr>
+          <p:cNvSpPr txBox="1"/>
+          <p:nvPr/>
+        </p:nvSpPr>
+        <p:spPr>
+          <a:xfrm>
+            <a:off x="1264748" y="5638505"/>
+            <a:ext cx="1120243" cy="307777"/>
+          </a:xfrm>
+          <a:prstGeom prst="rect">
+            <a:avLst/>
+          </a:prstGeom>
+          <a:noFill/>
+        </p:spPr>
+        <p:txBody>
+          <a:bodyPr wrap="none" rtlCol="0">
+            <a:spAutoFit/>
+          </a:bodyPr>
+          <a:lstStyle/>
+          <a:p>
+            <a:r>
+              <a:rPr lang="en-US" sz="1400"/>
+              <a:t>Demography</a:t>
+            </a:r>
+            <a:endParaRPr lang="en-GB" sz="1400"/>
+          </a:p>
+        </p:txBody>
+      </p:sp>
+      <p:sp>
+        <p:nvSpPr>
+          <p:cNvPr id="11" name="Title 10">
+            <a:extLst>
+              <a:ext uri="{FF2B5EF4-FFF2-40B4-BE49-F238E27FC236}">
+                <a16:creationId xmlns:a16="http://schemas.microsoft.com/office/drawing/2014/main" id="{057A705E-24A6-4415-82CE-387A9068B72C}"/>
+              </a:ext>
+            </a:extLst>
+          </p:cNvPr>
+          <p:cNvSpPr>
+            <a:spLocks noGrp="1"/>
+          </p:cNvSpPr>
+          <p:nvPr>
+            <p:ph type="title"/>
+          </p:nvPr>
+        </p:nvSpPr>
+        <p:spPr>
+          <a:xfrm>
+            <a:off x="838200" y="365125"/>
+            <a:ext cx="10515600" cy="1325563"/>
+          </a:xfrm>
+        </p:spPr>
+        <p:txBody>
+          <a:bodyPr/>
+          <a:lstStyle/>
+          <a:p>
+            <a:pPr algn="ctr"/>
+            <a:r>
+              <a:rPr lang="en-US"/>
+              <a:t>Define starting dataset(s)</a:t>
+            </a:r>
+            <a:endParaRPr lang="en-GB"/>
+          </a:p>
+        </p:txBody>
+      </p:sp>
+      <p:cxnSp>
+        <p:nvCxnSpPr>
+          <p:cNvPr id="13" name="Straight Arrow Connector 12">
+            <a:extLst>
+              <a:ext uri="{FF2B5EF4-FFF2-40B4-BE49-F238E27FC236}">
+                <a16:creationId xmlns:a16="http://schemas.microsoft.com/office/drawing/2014/main" id="{0C6D4A09-3F52-4B6B-8553-777DB9488CD6}"/>
+              </a:ext>
+            </a:extLst>
+          </p:cNvPr>
+          <p:cNvCxnSpPr/>
+          <p:nvPr/>
+        </p:nvCxnSpPr>
+        <p:spPr>
+          <a:xfrm>
+            <a:off x="2857500" y="2143125"/>
+            <a:ext cx="3924300" cy="0"/>
+          </a:xfrm>
+          <a:prstGeom prst="straightConnector1">
+            <a:avLst/>
+          </a:prstGeom>
+          <a:ln>
+            <a:tailEnd type="triangle"/>
+          </a:ln>
+        </p:spPr>
+        <p:style>
+          <a:lnRef idx="1">
+            <a:schemeClr val="accent1"/>
+          </a:lnRef>
+          <a:fillRef idx="0">
+            <a:schemeClr val="accent1"/>
+          </a:fillRef>
+          <a:effectRef idx="0">
+            <a:schemeClr val="accent1"/>
+          </a:effectRef>
+          <a:fontRef idx="minor">
+            <a:schemeClr val="tx1"/>
+          </a:fontRef>
+        </p:style>
+      </p:cxnSp>
+      <p:sp>
+        <p:nvSpPr>
+          <p:cNvPr id="14" name="TextBox 13">
+            <a:extLst>
+              <a:ext uri="{FF2B5EF4-FFF2-40B4-BE49-F238E27FC236}">
+                <a16:creationId xmlns:a16="http://schemas.microsoft.com/office/drawing/2014/main" id="{301F9F2F-1D06-40EB-B377-3C32E4D43417}"/>
+              </a:ext>
+            </a:extLst>
+          </p:cNvPr>
+          <p:cNvSpPr txBox="1"/>
+          <p:nvPr/>
+        </p:nvSpPr>
+        <p:spPr>
+          <a:xfrm>
+            <a:off x="3105150" y="1690688"/>
+            <a:ext cx="3596177" cy="369332"/>
+          </a:xfrm>
+          <a:prstGeom prst="rect">
+            <a:avLst/>
+          </a:prstGeom>
+          <a:noFill/>
+        </p:spPr>
+        <p:txBody>
+          <a:bodyPr wrap="none" rtlCol="0">
+            <a:spAutoFit/>
+          </a:bodyPr>
+          <a:lstStyle/>
+          <a:p>
+            <a:r>
+              <a:rPr lang="en-US"/>
+              <a:t>Select distinct chi from Biochemistry</a:t>
+            </a:r>
+            <a:endParaRPr lang="en-GB"/>
+          </a:p>
+        </p:txBody>
+      </p:sp>
+      <p:sp>
+        <p:nvSpPr>
+          <p:cNvPr id="15" name="TextBox 14">
+            <a:extLst>
+              <a:ext uri="{FF2B5EF4-FFF2-40B4-BE49-F238E27FC236}">
+                <a16:creationId xmlns:a16="http://schemas.microsoft.com/office/drawing/2014/main" id="{ACABADCB-5ED2-4A7D-8DFF-144236BD229D}"/>
+              </a:ext>
+            </a:extLst>
+          </p:cNvPr>
+          <p:cNvSpPr txBox="1"/>
+          <p:nvPr/>
+        </p:nvSpPr>
+        <p:spPr>
+          <a:xfrm>
+            <a:off x="3885420" y="2327791"/>
+            <a:ext cx="1868460" cy="369332"/>
+          </a:xfrm>
+          <a:prstGeom prst="rect">
+            <a:avLst/>
+          </a:prstGeom>
+          <a:noFill/>
+        </p:spPr>
+        <p:txBody>
+          <a:bodyPr wrap="none" rtlCol="0">
+            <a:spAutoFit/>
+          </a:bodyPr>
+          <a:lstStyle/>
+          <a:p>
+            <a:r>
+              <a:rPr lang="en-US"/>
+              <a:t>List of unique chis</a:t>
+            </a:r>
+            <a:endParaRPr lang="en-GB"/>
+          </a:p>
+        </p:txBody>
+      </p:sp>
+      <p:cxnSp>
+        <p:nvCxnSpPr>
+          <p:cNvPr id="16" name="Straight Arrow Connector 15">
+            <a:extLst>
+              <a:ext uri="{FF2B5EF4-FFF2-40B4-BE49-F238E27FC236}">
+                <a16:creationId xmlns:a16="http://schemas.microsoft.com/office/drawing/2014/main" id="{53344CBE-F08B-439B-8AE5-2737D12A3B5F}"/>
+              </a:ext>
+            </a:extLst>
+          </p:cNvPr>
+          <p:cNvCxnSpPr>
+            <a:cxnSpLocks/>
+          </p:cNvCxnSpPr>
+          <p:nvPr/>
+        </p:nvCxnSpPr>
+        <p:spPr>
+          <a:xfrm flipH="1" flipV="1">
+            <a:off x="2847975" y="2299216"/>
+            <a:ext cx="3924300" cy="12515"/>
+          </a:xfrm>
+          <a:prstGeom prst="straightConnector1">
+            <a:avLst/>
+          </a:prstGeom>
+          <a:ln>
+            <a:tailEnd type="triangle"/>
+          </a:ln>
+        </p:spPr>
+        <p:style>
+          <a:lnRef idx="1">
+            <a:schemeClr val="accent1"/>
+          </a:lnRef>
+          <a:fillRef idx="0">
+            <a:schemeClr val="accent1"/>
+          </a:fillRef>
+          <a:effectRef idx="0">
+            <a:schemeClr val="accent1"/>
+          </a:effectRef>
+          <a:fontRef idx="minor">
+            <a:schemeClr val="tx1"/>
+          </a:fontRef>
+        </p:style>
+      </p:cxnSp>
+      <p:cxnSp>
+        <p:nvCxnSpPr>
+          <p:cNvPr id="17" name="Straight Arrow Connector 16">
+            <a:extLst>
+              <a:ext uri="{FF2B5EF4-FFF2-40B4-BE49-F238E27FC236}">
+                <a16:creationId xmlns:a16="http://schemas.microsoft.com/office/drawing/2014/main" id="{93AB0E1E-21A9-49CD-BEFF-58A29C057607}"/>
+              </a:ext>
+            </a:extLst>
+          </p:cNvPr>
+          <p:cNvCxnSpPr/>
+          <p:nvPr/>
+        </p:nvCxnSpPr>
+        <p:spPr>
+          <a:xfrm>
+            <a:off x="2857500" y="3990775"/>
+            <a:ext cx="3924300" cy="0"/>
+          </a:xfrm>
+          <a:prstGeom prst="straightConnector1">
+            <a:avLst/>
+          </a:prstGeom>
+          <a:ln>
+            <a:tailEnd type="triangle"/>
+          </a:ln>
+        </p:spPr>
+        <p:style>
+          <a:lnRef idx="1">
+            <a:schemeClr val="accent1"/>
+          </a:lnRef>
+          <a:fillRef idx="0">
+            <a:schemeClr val="accent1"/>
+          </a:fillRef>
+          <a:effectRef idx="0">
+            <a:schemeClr val="accent1"/>
+          </a:effectRef>
+          <a:fontRef idx="minor">
+            <a:schemeClr val="tx1"/>
+          </a:fontRef>
+        </p:style>
+      </p:cxnSp>
+      <p:sp>
+        <p:nvSpPr>
+          <p:cNvPr id="18" name="TextBox 17">
+            <a:extLst>
+              <a:ext uri="{FF2B5EF4-FFF2-40B4-BE49-F238E27FC236}">
+                <a16:creationId xmlns:a16="http://schemas.microsoft.com/office/drawing/2014/main" id="{00B691F1-DE5B-48FF-B868-68355B56B896}"/>
+              </a:ext>
+            </a:extLst>
+          </p:cNvPr>
+          <p:cNvSpPr txBox="1"/>
+          <p:nvPr/>
+        </p:nvSpPr>
+        <p:spPr>
+          <a:xfrm>
+            <a:off x="3105150" y="3538338"/>
+            <a:ext cx="3596177" cy="369332"/>
+          </a:xfrm>
+          <a:prstGeom prst="rect">
+            <a:avLst/>
+          </a:prstGeom>
+          <a:noFill/>
+        </p:spPr>
+        <p:txBody>
+          <a:bodyPr wrap="none" rtlCol="0">
+            <a:spAutoFit/>
+          </a:bodyPr>
+          <a:lstStyle/>
+          <a:p>
+            <a:r>
+              <a:rPr lang="en-US"/>
+              <a:t>Select distinct chi from Biochemistry</a:t>
+            </a:r>
+            <a:endParaRPr lang="en-GB"/>
+          </a:p>
+        </p:txBody>
+      </p:sp>
+      <p:sp>
+        <p:nvSpPr>
+          <p:cNvPr id="19" name="TextBox 18">
+            <a:extLst>
+              <a:ext uri="{FF2B5EF4-FFF2-40B4-BE49-F238E27FC236}">
+                <a16:creationId xmlns:a16="http://schemas.microsoft.com/office/drawing/2014/main" id="{573D28ED-E65D-4381-BB08-ABAA6A7F8632}"/>
+              </a:ext>
+            </a:extLst>
+          </p:cNvPr>
+          <p:cNvSpPr txBox="1"/>
+          <p:nvPr/>
+        </p:nvSpPr>
+        <p:spPr>
+          <a:xfrm>
+            <a:off x="3885420" y="4175441"/>
+            <a:ext cx="1868460" cy="369332"/>
+          </a:xfrm>
+          <a:prstGeom prst="rect">
+            <a:avLst/>
+          </a:prstGeom>
+          <a:noFill/>
+        </p:spPr>
+        <p:txBody>
+          <a:bodyPr wrap="none" rtlCol="0">
+            <a:spAutoFit/>
+          </a:bodyPr>
+          <a:lstStyle/>
+          <a:p>
+            <a:r>
+              <a:rPr lang="en-US"/>
+              <a:t>List of unique chis</a:t>
+            </a:r>
+            <a:endParaRPr lang="en-GB"/>
+          </a:p>
+        </p:txBody>
+      </p:sp>
+      <p:cxnSp>
+        <p:nvCxnSpPr>
+          <p:cNvPr id="20" name="Straight Arrow Connector 19">
+            <a:extLst>
+              <a:ext uri="{FF2B5EF4-FFF2-40B4-BE49-F238E27FC236}">
+                <a16:creationId xmlns:a16="http://schemas.microsoft.com/office/drawing/2014/main" id="{466E31D7-9B3D-42F0-B2BA-7C8ED6B84D03}"/>
+              </a:ext>
+            </a:extLst>
+          </p:cNvPr>
+          <p:cNvCxnSpPr>
+            <a:cxnSpLocks/>
+          </p:cNvCxnSpPr>
+          <p:nvPr/>
+        </p:nvCxnSpPr>
+        <p:spPr>
+          <a:xfrm flipH="1" flipV="1">
+            <a:off x="2847975" y="4146866"/>
+            <a:ext cx="3924300" cy="12515"/>
+          </a:xfrm>
+          <a:prstGeom prst="straightConnector1">
+            <a:avLst/>
+          </a:prstGeom>
+          <a:ln>
+            <a:tailEnd type="triangle"/>
+          </a:ln>
+        </p:spPr>
+        <p:style>
+          <a:lnRef idx="1">
+            <a:schemeClr val="accent1"/>
+          </a:lnRef>
+          <a:fillRef idx="0">
+            <a:schemeClr val="accent1"/>
+          </a:fillRef>
+          <a:effectRef idx="0">
+            <a:schemeClr val="accent1"/>
+          </a:effectRef>
+          <a:fontRef idx="minor">
+            <a:schemeClr val="tx1"/>
+          </a:fontRef>
+        </p:style>
+      </p:cxnSp>
+      <p:cxnSp>
+        <p:nvCxnSpPr>
+          <p:cNvPr id="21" name="Straight Arrow Connector 20">
+            <a:extLst>
+              <a:ext uri="{FF2B5EF4-FFF2-40B4-BE49-F238E27FC236}">
+                <a16:creationId xmlns:a16="http://schemas.microsoft.com/office/drawing/2014/main" id="{258A8A89-C0CB-4E7C-90AE-76EF6443DE9B}"/>
+              </a:ext>
+            </a:extLst>
+          </p:cNvPr>
+          <p:cNvCxnSpPr/>
+          <p:nvPr/>
+        </p:nvCxnSpPr>
+        <p:spPr>
+          <a:xfrm>
+            <a:off x="2907807" y="5838425"/>
+            <a:ext cx="3924300" cy="0"/>
+          </a:xfrm>
+          <a:prstGeom prst="straightConnector1">
+            <a:avLst/>
+          </a:prstGeom>
+          <a:ln>
+            <a:tailEnd type="triangle"/>
+          </a:ln>
+        </p:spPr>
+        <p:style>
+          <a:lnRef idx="1">
+            <a:schemeClr val="accent1"/>
+          </a:lnRef>
+          <a:fillRef idx="0">
+            <a:schemeClr val="accent1"/>
+          </a:fillRef>
+          <a:effectRef idx="0">
+            <a:schemeClr val="accent1"/>
+          </a:effectRef>
+          <a:fontRef idx="minor">
+            <a:schemeClr val="tx1"/>
+          </a:fontRef>
+        </p:style>
+      </p:cxnSp>
+      <p:sp>
+        <p:nvSpPr>
+          <p:cNvPr id="22" name="TextBox 21">
+            <a:extLst>
+              <a:ext uri="{FF2B5EF4-FFF2-40B4-BE49-F238E27FC236}">
+                <a16:creationId xmlns:a16="http://schemas.microsoft.com/office/drawing/2014/main" id="{3D1EA4C9-E45B-46C5-8240-84BA75E4518B}"/>
+              </a:ext>
+            </a:extLst>
+          </p:cNvPr>
+          <p:cNvSpPr txBox="1"/>
+          <p:nvPr/>
+        </p:nvSpPr>
+        <p:spPr>
+          <a:xfrm>
+            <a:off x="3155457" y="5385988"/>
+            <a:ext cx="3577326" cy="369332"/>
+          </a:xfrm>
+          <a:prstGeom prst="rect">
+            <a:avLst/>
+          </a:prstGeom>
+          <a:noFill/>
+        </p:spPr>
+        <p:txBody>
+          <a:bodyPr wrap="none" rtlCol="0">
+            <a:spAutoFit/>
+          </a:bodyPr>
+          <a:lstStyle/>
+          <a:p>
+            <a:r>
+              <a:rPr lang="en-US"/>
+              <a:t>Select distinct chi from Demography</a:t>
+            </a:r>
+            <a:endParaRPr lang="en-GB"/>
+          </a:p>
+        </p:txBody>
+      </p:sp>
+      <p:sp>
+        <p:nvSpPr>
+          <p:cNvPr id="23" name="TextBox 22">
+            <a:extLst>
+              <a:ext uri="{FF2B5EF4-FFF2-40B4-BE49-F238E27FC236}">
+                <a16:creationId xmlns:a16="http://schemas.microsoft.com/office/drawing/2014/main" id="{7C594BFE-0EBE-42A8-8B1A-E7C2249F1F83}"/>
+              </a:ext>
+            </a:extLst>
+          </p:cNvPr>
+          <p:cNvSpPr txBox="1"/>
+          <p:nvPr/>
+        </p:nvSpPr>
+        <p:spPr>
+          <a:xfrm>
+            <a:off x="3935727" y="6023091"/>
+            <a:ext cx="1868460" cy="369332"/>
+          </a:xfrm>
+          <a:prstGeom prst="rect">
+            <a:avLst/>
+          </a:prstGeom>
+          <a:noFill/>
+        </p:spPr>
+        <p:txBody>
+          <a:bodyPr wrap="none" rtlCol="0">
+            <a:spAutoFit/>
+          </a:bodyPr>
+          <a:lstStyle/>
+          <a:p>
+            <a:r>
+              <a:rPr lang="en-US"/>
+              <a:t>List of unique chis</a:t>
+            </a:r>
+            <a:endParaRPr lang="en-GB"/>
+          </a:p>
+        </p:txBody>
+      </p:sp>
+      <p:cxnSp>
+        <p:nvCxnSpPr>
+          <p:cNvPr id="24" name="Straight Arrow Connector 23">
+            <a:extLst>
+              <a:ext uri="{FF2B5EF4-FFF2-40B4-BE49-F238E27FC236}">
+                <a16:creationId xmlns:a16="http://schemas.microsoft.com/office/drawing/2014/main" id="{B47B5FAE-5273-4DD8-92B1-3DD0B1D2AEE4}"/>
+              </a:ext>
+            </a:extLst>
+          </p:cNvPr>
+          <p:cNvCxnSpPr>
+            <a:cxnSpLocks/>
+          </p:cNvCxnSpPr>
+          <p:nvPr/>
+        </p:nvCxnSpPr>
+        <p:spPr>
+          <a:xfrm flipH="1" flipV="1">
+            <a:off x="2898282" y="5994516"/>
+            <a:ext cx="3924300" cy="12515"/>
+          </a:xfrm>
+          <a:prstGeom prst="straightConnector1">
+            <a:avLst/>
+          </a:prstGeom>
+          <a:ln>
+            <a:tailEnd type="triangle"/>
+          </a:ln>
+        </p:spPr>
+        <p:style>
+          <a:lnRef idx="1">
+            <a:schemeClr val="accent1"/>
+          </a:lnRef>
+          <a:fillRef idx="0">
+            <a:schemeClr val="accent1"/>
+          </a:fillRef>
+          <a:effectRef idx="0">
+            <a:schemeClr val="accent1"/>
+          </a:effectRef>
+          <a:fontRef idx="minor">
+            <a:schemeClr val="tx1"/>
+          </a:fontRef>
+        </p:style>
+      </p:cxnSp>
+    </p:spTree>
+    <p:extLst>
+      <p:ext uri="{BB962C8B-B14F-4D97-AF65-F5344CB8AC3E}">
+        <p14:creationId xmlns:p14="http://schemas.microsoft.com/office/powerpoint/2010/main" val="1796787201"/>
+      </p:ext>
+    </p:extLst>
+  </p:cSld>
+  <p:clrMapOvr>
+    <a:masterClrMapping/>
+  </p:clrMapOvr>
+</p:sld>
+</file>
+
+<file path=ppt/slides/slide8.xml><?xml version="1.0" encoding="utf-8"?>
+<p:sld xmlns:a="http://schemas.openxmlformats.org/drawingml/2006/main" xmlns:r="http://schemas.openxmlformats.org/officeDocument/2006/relationships" xmlns:p="http://schemas.openxmlformats.org/presentationml/2006/main">
+  <p:cSld>
+    <p:spTree>
+      <p:nvGrpSpPr>
+        <p:cNvPr id="1" name=""/>
+        <p:cNvGrpSpPr/>
+        <p:nvPr/>
+      </p:nvGrpSpPr>
+      <p:grpSpPr>
+        <a:xfrm>
+          <a:off x="0" y="0"/>
+          <a:ext cx="0" cy="0"/>
+          <a:chOff x="0" y="0"/>
+          <a:chExt cx="0" cy="0"/>
+        </a:xfrm>
+      </p:grpSpPr>
+      <p:sp>
+        <p:nvSpPr>
+          <p:cNvPr id="2" name="Title 1">
+            <a:extLst>
+              <a:ext uri="{FF2B5EF4-FFF2-40B4-BE49-F238E27FC236}">
+                <a16:creationId xmlns:a16="http://schemas.microsoft.com/office/drawing/2014/main" id="{CFB9A266-B22A-4EA6-858E-C0BAB3C5830F}"/>
+              </a:ext>
+            </a:extLst>
+          </p:cNvPr>
+          <p:cNvSpPr>
+            <a:spLocks noGrp="1"/>
+          </p:cNvSpPr>
+          <p:nvPr>
+            <p:ph type="title"/>
+          </p:nvPr>
+        </p:nvSpPr>
+        <p:spPr/>
+        <p:txBody>
+          <a:bodyPr/>
+          <a:lstStyle/>
+          <a:p>
+            <a:pPr algn="ctr"/>
+            <a:r>
+              <a:rPr lang="en-US"/>
+              <a:t>Create a simple graph for the dataset(s)</a:t>
+            </a:r>
+            <a:endParaRPr lang="en-GB"/>
+          </a:p>
+        </p:txBody>
+      </p:sp>
+      <p:pic>
+        <p:nvPicPr>
+          <p:cNvPr id="4" name="Picture 3">
+            <a:extLst>
+              <a:ext uri="{FF2B5EF4-FFF2-40B4-BE49-F238E27FC236}">
+                <a16:creationId xmlns:a16="http://schemas.microsoft.com/office/drawing/2014/main" id="{6A385112-E8F1-487B-B461-B9A2AA06D599}"/>
+              </a:ext>
+            </a:extLst>
+          </p:cNvPr>
+          <p:cNvPicPr>
+            <a:picLocks noChangeAspect="1"/>
+          </p:cNvPicPr>
+          <p:nvPr/>
+        </p:nvPicPr>
+        <p:blipFill>
+          <a:blip r:embed="rId2"/>
+          <a:stretch>
+            <a:fillRect/>
+          </a:stretch>
+        </p:blipFill>
+        <p:spPr>
+          <a:xfrm>
+            <a:off x="0" y="1791033"/>
+            <a:ext cx="4900629" cy="3123661"/>
+          </a:xfrm>
+          <a:prstGeom prst="rect">
+            <a:avLst/>
+          </a:prstGeom>
+        </p:spPr>
+      </p:pic>
+      <p:pic>
+        <p:nvPicPr>
+          <p:cNvPr id="6" name="Picture 5">
+            <a:extLst>
+              <a:ext uri="{FF2B5EF4-FFF2-40B4-BE49-F238E27FC236}">
+                <a16:creationId xmlns:a16="http://schemas.microsoft.com/office/drawing/2014/main" id="{180E9D06-1766-4F45-BB35-74A7820947EB}"/>
+              </a:ext>
+            </a:extLst>
+          </p:cNvPr>
+          <p:cNvPicPr>
+            <a:picLocks noChangeAspect="1"/>
+          </p:cNvPicPr>
+          <p:nvPr/>
+        </p:nvPicPr>
+        <p:blipFill>
+          <a:blip r:embed="rId3"/>
+          <a:stretch>
+            <a:fillRect/>
+          </a:stretch>
+        </p:blipFill>
+        <p:spPr>
+          <a:xfrm>
+            <a:off x="5226700" y="1690688"/>
+            <a:ext cx="7054077" cy="3615769"/>
+          </a:xfrm>
+          <a:prstGeom prst="rect">
+            <a:avLst/>
+          </a:prstGeom>
+        </p:spPr>
+      </p:pic>
+      <p:sp>
+        <p:nvSpPr>
+          <p:cNvPr id="7" name="TextBox 6">
+            <a:extLst>
+              <a:ext uri="{FF2B5EF4-FFF2-40B4-BE49-F238E27FC236}">
+                <a16:creationId xmlns:a16="http://schemas.microsoft.com/office/drawing/2014/main" id="{724C55E4-2F16-4EF6-9309-919A19FAB6E2}"/>
+              </a:ext>
+            </a:extLst>
+          </p:cNvPr>
+          <p:cNvSpPr txBox="1"/>
+          <p:nvPr/>
+        </p:nvSpPr>
+        <p:spPr>
+          <a:xfrm>
+            <a:off x="1429305" y="4937125"/>
+            <a:ext cx="1406347" cy="369332"/>
+          </a:xfrm>
+          <a:prstGeom prst="rect">
+            <a:avLst/>
+          </a:prstGeom>
+          <a:noFill/>
+        </p:spPr>
+        <p:txBody>
+          <a:bodyPr wrap="none" rtlCol="0">
+            <a:spAutoFit/>
+          </a:bodyPr>
+          <a:lstStyle/>
+          <a:p>
+            <a:r>
+              <a:rPr lang="en-US"/>
+              <a:t>Biochemistry</a:t>
+            </a:r>
+            <a:endParaRPr lang="en-GB"/>
+          </a:p>
+        </p:txBody>
+      </p:sp>
+      <p:sp>
+        <p:nvSpPr>
+          <p:cNvPr id="8" name="TextBox 7">
+            <a:extLst>
+              <a:ext uri="{FF2B5EF4-FFF2-40B4-BE49-F238E27FC236}">
+                <a16:creationId xmlns:a16="http://schemas.microsoft.com/office/drawing/2014/main" id="{69874AE7-182F-4678-A541-A5BEB3972035}"/>
+              </a:ext>
+            </a:extLst>
+          </p:cNvPr>
+          <p:cNvSpPr txBox="1"/>
+          <p:nvPr/>
+        </p:nvSpPr>
+        <p:spPr>
+          <a:xfrm>
+            <a:off x="8059990" y="4937125"/>
+            <a:ext cx="1387496" cy="369332"/>
+          </a:xfrm>
+          <a:prstGeom prst="rect">
+            <a:avLst/>
+          </a:prstGeom>
+          <a:noFill/>
+        </p:spPr>
+        <p:txBody>
+          <a:bodyPr wrap="none" rtlCol="0">
+            <a:spAutoFit/>
+          </a:bodyPr>
+          <a:lstStyle/>
+          <a:p>
+            <a:r>
+              <a:rPr lang="en-US"/>
+              <a:t>Demography</a:t>
+            </a:r>
+            <a:endParaRPr lang="en-GB"/>
+          </a:p>
+        </p:txBody>
+      </p:sp>
+    </p:spTree>
+    <p:extLst>
+      <p:ext uri="{BB962C8B-B14F-4D97-AF65-F5344CB8AC3E}">
+        <p14:creationId xmlns:p14="http://schemas.microsoft.com/office/powerpoint/2010/main" val="1315798188"/>
+      </p:ext>
+    </p:extLst>
+  </p:cSld>
+  <p:clrMapOvr>
+    <a:masterClrMapping/>
+  </p:clrMapOvr>
+</p:sld>
+</file>
+
+<file path=ppt/slides/slide9.xml><?xml version="1.0" encoding="utf-8"?>
+<p:sld xmlns:a="http://schemas.openxmlformats.org/drawingml/2006/main" xmlns:r="http://schemas.openxmlformats.org/officeDocument/2006/relationships" xmlns:p="http://schemas.openxmlformats.org/presentationml/2006/main">
+  <p:cSld>
+    <p:spTree>
+      <p:nvGrpSpPr>
+        <p:cNvPr id="1" name=""/>
+        <p:cNvGrpSpPr/>
+        <p:nvPr/>
+      </p:nvGrpSpPr>
+      <p:grpSpPr>
+        <a:xfrm>
+          <a:off x="0" y="0"/>
+          <a:ext cx="0" cy="0"/>
+          <a:chOff x="0" y="0"/>
+          <a:chExt cx="0" cy="0"/>
+        </a:xfrm>
+      </p:grpSpPr>
+      <p:sp>
+        <p:nvSpPr>
+          <p:cNvPr id="2" name="Title 1">
+            <a:extLst>
+              <a:ext uri="{FF2B5EF4-FFF2-40B4-BE49-F238E27FC236}">
+                <a16:creationId xmlns:a16="http://schemas.microsoft.com/office/drawing/2014/main" id="{66041FB6-DD4D-4946-9E79-28BED2D7450F}"/>
+              </a:ext>
+            </a:extLst>
+          </p:cNvPr>
+          <p:cNvSpPr>
+            <a:spLocks noGrp="1"/>
+          </p:cNvSpPr>
+          <p:nvPr>
+            <p:ph type="title"/>
+          </p:nvPr>
+        </p:nvSpPr>
+        <p:spPr>
+          <a:xfrm>
+            <a:off x="838200" y="365125"/>
+            <a:ext cx="10515600" cy="1325563"/>
+          </a:xfrm>
+        </p:spPr>
+        <p:txBody>
+          <a:bodyPr/>
+          <a:lstStyle/>
+          <a:p>
+            <a:pPr algn="ctr"/>
+            <a:r>
+              <a:rPr lang="en-US"/>
+              <a:t>Add filters and rename set</a:t>
+            </a:r>
+            <a:endParaRPr lang="en-GB"/>
+          </a:p>
+        </p:txBody>
+      </p:sp>
+      <p:sp>
+        <p:nvSpPr>
+          <p:cNvPr id="3" name="Oval 2">
+            <a:extLst>
+              <a:ext uri="{FF2B5EF4-FFF2-40B4-BE49-F238E27FC236}">
+                <a16:creationId xmlns:a16="http://schemas.microsoft.com/office/drawing/2014/main" id="{EBA6D551-0431-4AF8-B205-6F99298C8CD0}"/>
+              </a:ext>
+            </a:extLst>
+          </p:cNvPr>
+          <p:cNvSpPr/>
+          <p:nvPr/>
+        </p:nvSpPr>
+        <p:spPr>
+          <a:xfrm>
+            <a:off x="953025" y="1377949"/>
+            <a:ext cx="1644242" cy="1644242"/>
+          </a:xfrm>
+          <a:prstGeom prst="ellipse">
+            <a:avLst/>
+          </a:prstGeom>
+          <a:noFill/>
+          <a:effectLst>
+            <a:glow rad="139700">
+              <a:schemeClr val="accent6">
+                <a:satMod val="175000"/>
+                <a:alpha val="40000"/>
+              </a:schemeClr>
+            </a:glow>
+          </a:effectLst>
+        </p:spPr>
+        <p:style>
+          <a:lnRef idx="2">
+            <a:schemeClr val="dk1"/>
+          </a:lnRef>
+          <a:fillRef idx="1">
+            <a:schemeClr val="lt1"/>
+          </a:fillRef>
+          <a:effectRef idx="0">
+            <a:schemeClr val="dk1"/>
+          </a:effectRef>
+          <a:fontRef idx="minor">
+            <a:schemeClr val="dk1"/>
+          </a:fontRef>
+        </p:style>
+        <p:txBody>
+          <a:bodyPr rtlCol="0" anchor="ctr"/>
+          <a:lstStyle/>
+          <a:p>
+            <a:pPr algn="ctr"/>
+            <a:endParaRPr lang="en-GB"/>
+          </a:p>
+        </p:txBody>
+      </p:sp>
+      <p:sp>
+        <p:nvSpPr>
+          <p:cNvPr id="4" name="Oval 3">
+            <a:extLst>
+              <a:ext uri="{FF2B5EF4-FFF2-40B4-BE49-F238E27FC236}">
+                <a16:creationId xmlns:a16="http://schemas.microsoft.com/office/drawing/2014/main" id="{BD02AF69-93A6-49D3-BAC5-E959E45D20FA}"/>
+              </a:ext>
+            </a:extLst>
+          </p:cNvPr>
+          <p:cNvSpPr/>
+          <p:nvPr/>
+        </p:nvSpPr>
+        <p:spPr>
+          <a:xfrm>
+            <a:off x="1132949" y="3305012"/>
+            <a:ext cx="1400962" cy="1400962"/>
+          </a:xfrm>
+          <a:prstGeom prst="ellipse">
+            <a:avLst/>
+          </a:prstGeom>
+          <a:noFill/>
+          <a:effectLst>
+            <a:glow rad="228600">
+              <a:schemeClr val="accent2">
+                <a:satMod val="175000"/>
+                <a:alpha val="40000"/>
+              </a:schemeClr>
+            </a:glow>
+          </a:effectLst>
+        </p:spPr>
+        <p:style>
+          <a:lnRef idx="2">
+            <a:schemeClr val="dk1"/>
+          </a:lnRef>
+          <a:fillRef idx="1">
+            <a:schemeClr val="lt1"/>
+          </a:fillRef>
+          <a:effectRef idx="0">
+            <a:schemeClr val="dk1"/>
+          </a:effectRef>
+          <a:fontRef idx="minor">
+            <a:schemeClr val="dk1"/>
+          </a:fontRef>
+        </p:style>
+        <p:txBody>
+          <a:bodyPr rtlCol="0" anchor="ctr"/>
+          <a:lstStyle/>
+          <a:p>
+            <a:pPr algn="ctr"/>
+            <a:endParaRPr lang="en-GB"/>
+          </a:p>
+        </p:txBody>
+      </p:sp>
+      <p:sp>
+        <p:nvSpPr>
+          <p:cNvPr id="5" name="Oval 4">
+            <a:extLst>
+              <a:ext uri="{FF2B5EF4-FFF2-40B4-BE49-F238E27FC236}">
+                <a16:creationId xmlns:a16="http://schemas.microsoft.com/office/drawing/2014/main" id="{118F8010-60C9-48D8-BC23-21CE968A6A0F}"/>
+              </a:ext>
+            </a:extLst>
+          </p:cNvPr>
+          <p:cNvSpPr/>
+          <p:nvPr/>
+        </p:nvSpPr>
+        <p:spPr>
+          <a:xfrm>
+            <a:off x="1132949" y="5091913"/>
+            <a:ext cx="1400962" cy="1400962"/>
+          </a:xfrm>
+          <a:prstGeom prst="ellipse">
+            <a:avLst/>
+          </a:prstGeom>
+          <a:noFill/>
+          <a:effectLst>
+            <a:glow rad="228600">
+              <a:schemeClr val="accent5">
+                <a:satMod val="175000"/>
+                <a:alpha val="40000"/>
+              </a:schemeClr>
+            </a:glow>
+          </a:effectLst>
+        </p:spPr>
+        <p:style>
+          <a:lnRef idx="2">
+            <a:schemeClr val="dk1"/>
+          </a:lnRef>
+          <a:fillRef idx="1">
+            <a:schemeClr val="lt1"/>
+          </a:fillRef>
+          <a:effectRef idx="0">
+            <a:schemeClr val="dk1"/>
+          </a:effectRef>
+          <a:fontRef idx="minor">
+            <a:schemeClr val="dk1"/>
+          </a:fontRef>
+        </p:style>
+        <p:txBody>
+          <a:bodyPr rtlCol="0" anchor="ctr"/>
+          <a:lstStyle/>
+          <a:p>
+            <a:pPr algn="ctr"/>
+            <a:endParaRPr lang="en-GB"/>
+          </a:p>
+        </p:txBody>
+      </p:sp>
+      <p:sp>
+        <p:nvSpPr>
+          <p:cNvPr id="6" name="TextBox 5">
+            <a:extLst>
+              <a:ext uri="{FF2B5EF4-FFF2-40B4-BE49-F238E27FC236}">
+                <a16:creationId xmlns:a16="http://schemas.microsoft.com/office/drawing/2014/main" id="{4D57F034-8C15-4D7F-B04A-62EF385331E7}"/>
+              </a:ext>
+            </a:extLst>
+          </p:cNvPr>
+          <p:cNvSpPr txBox="1"/>
+          <p:nvPr/>
+        </p:nvSpPr>
+        <p:spPr>
+          <a:xfrm>
+            <a:off x="1000921" y="1923720"/>
+            <a:ext cx="1493615" cy="738664"/>
+          </a:xfrm>
+          <a:prstGeom prst="rect">
+            <a:avLst/>
+          </a:prstGeom>
+          <a:noFill/>
+        </p:spPr>
+        <p:txBody>
+          <a:bodyPr wrap="none" rtlCol="0">
+            <a:spAutoFit/>
+          </a:bodyPr>
+          <a:lstStyle/>
+          <a:p>
+            <a:pPr algn="ctr"/>
+            <a:r>
+              <a:rPr lang="en-US" sz="1400"/>
+              <a:t>Biochemistry</a:t>
+            </a:r>
+          </a:p>
+          <a:p>
+            <a:pPr algn="ctr"/>
+            <a:r>
+              <a:rPr lang="en-US" sz="1400"/>
+              <a:t>People with UREA</a:t>
+            </a:r>
+          </a:p>
+          <a:p>
+            <a:pPr algn="ctr"/>
+            <a:r>
+              <a:rPr lang="en-US" sz="1400"/>
+              <a:t>Tests over 100</a:t>
+            </a:r>
+            <a:endParaRPr lang="en-GB" sz="1400"/>
+          </a:p>
+        </p:txBody>
+      </p:sp>
+      <p:sp>
+        <p:nvSpPr>
+          <p:cNvPr id="7" name="TextBox 6">
+            <a:extLst>
+              <a:ext uri="{FF2B5EF4-FFF2-40B4-BE49-F238E27FC236}">
+                <a16:creationId xmlns:a16="http://schemas.microsoft.com/office/drawing/2014/main" id="{2DB7026B-B494-459A-9C43-D645942749CD}"/>
+              </a:ext>
+            </a:extLst>
+          </p:cNvPr>
+          <p:cNvSpPr txBox="1"/>
+          <p:nvPr/>
+        </p:nvSpPr>
+        <p:spPr>
+          <a:xfrm>
+            <a:off x="1368398" y="3756970"/>
+            <a:ext cx="930063" cy="600164"/>
+          </a:xfrm>
+          <a:prstGeom prst="rect">
+            <a:avLst/>
+          </a:prstGeom>
+          <a:noFill/>
+        </p:spPr>
+        <p:txBody>
+          <a:bodyPr wrap="none" rtlCol="0">
+            <a:spAutoFit/>
+          </a:bodyPr>
+          <a:lstStyle/>
+          <a:p>
+            <a:r>
+              <a:rPr lang="en-US" sz="1100"/>
+              <a:t>Biochemistry</a:t>
+            </a:r>
+          </a:p>
+          <a:p>
+            <a:r>
+              <a:rPr lang="en-US" sz="1100"/>
+              <a:t>People with </a:t>
+            </a:r>
+          </a:p>
+          <a:p>
+            <a:r>
+              <a:rPr lang="en-US" sz="1100"/>
+              <a:t>Sodium tests</a:t>
+            </a:r>
+            <a:endParaRPr lang="en-GB" sz="1100"/>
+          </a:p>
+        </p:txBody>
+      </p:sp>
+      <p:sp>
+        <p:nvSpPr>
+          <p:cNvPr id="8" name="TextBox 7">
+            <a:extLst>
+              <a:ext uri="{FF2B5EF4-FFF2-40B4-BE49-F238E27FC236}">
+                <a16:creationId xmlns:a16="http://schemas.microsoft.com/office/drawing/2014/main" id="{9C7DC4F6-A048-4E71-93E9-24600512C875}"/>
+              </a:ext>
+            </a:extLst>
+          </p:cNvPr>
+          <p:cNvSpPr txBox="1"/>
+          <p:nvPr/>
+        </p:nvSpPr>
+        <p:spPr>
+          <a:xfrm>
+            <a:off x="1214319" y="5480051"/>
+            <a:ext cx="1319592" cy="769441"/>
+          </a:xfrm>
+          <a:prstGeom prst="rect">
+            <a:avLst/>
+          </a:prstGeom>
+          <a:noFill/>
+        </p:spPr>
+        <p:txBody>
+          <a:bodyPr wrap="none" rtlCol="0">
+            <a:spAutoFit/>
+          </a:bodyPr>
+          <a:lstStyle/>
+          <a:p>
+            <a:r>
+              <a:rPr lang="en-US" sz="1100"/>
+              <a:t>People who have</a:t>
+            </a:r>
+          </a:p>
+          <a:p>
+            <a:r>
+              <a:rPr lang="en-US" sz="1100"/>
+              <a:t>Ever Been residents</a:t>
+            </a:r>
+          </a:p>
+          <a:p>
+            <a:pPr algn="ctr"/>
+            <a:r>
+              <a:rPr lang="en-US" sz="1100"/>
+              <a:t>Of Fife</a:t>
+            </a:r>
+          </a:p>
+          <a:p>
+            <a:endParaRPr lang="en-GB" sz="1100"/>
+          </a:p>
+        </p:txBody>
+      </p:sp>
+      <p:cxnSp>
+        <p:nvCxnSpPr>
+          <p:cNvPr id="9" name="Straight Arrow Connector 8">
+            <a:extLst>
+              <a:ext uri="{FF2B5EF4-FFF2-40B4-BE49-F238E27FC236}">
+                <a16:creationId xmlns:a16="http://schemas.microsoft.com/office/drawing/2014/main" id="{C3DE4B30-51FC-46E9-B297-03B96B3E3EEA}"/>
+              </a:ext>
+            </a:extLst>
+          </p:cNvPr>
+          <p:cNvCxnSpPr/>
+          <p:nvPr/>
+        </p:nvCxnSpPr>
+        <p:spPr>
+          <a:xfrm>
+            <a:off x="2867025" y="2751014"/>
+            <a:ext cx="3924300" cy="0"/>
+          </a:xfrm>
+          <a:prstGeom prst="straightConnector1">
+            <a:avLst/>
+          </a:prstGeom>
+          <a:ln>
+            <a:tailEnd type="triangle"/>
+          </a:ln>
+        </p:spPr>
+        <p:style>
+          <a:lnRef idx="1">
+            <a:schemeClr val="accent1"/>
+          </a:lnRef>
+          <a:fillRef idx="0">
+            <a:schemeClr val="accent1"/>
+          </a:fillRef>
+          <a:effectRef idx="0">
+            <a:schemeClr val="accent1"/>
+          </a:effectRef>
+          <a:fontRef idx="minor">
+            <a:schemeClr val="tx1"/>
+          </a:fontRef>
+        </p:style>
+      </p:cxnSp>
+      <p:sp>
+        <p:nvSpPr>
+          <p:cNvPr id="11" name="TextBox 10">
+            <a:extLst>
+              <a:ext uri="{FF2B5EF4-FFF2-40B4-BE49-F238E27FC236}">
+                <a16:creationId xmlns:a16="http://schemas.microsoft.com/office/drawing/2014/main" id="{80225154-A753-42FD-A5B5-6DB377AC949C}"/>
+              </a:ext>
+            </a:extLst>
+          </p:cNvPr>
+          <p:cNvSpPr txBox="1"/>
+          <p:nvPr/>
+        </p:nvSpPr>
+        <p:spPr>
+          <a:xfrm>
+            <a:off x="3894945" y="2935680"/>
+            <a:ext cx="1868460" cy="369332"/>
+          </a:xfrm>
+          <a:prstGeom prst="rect">
+            <a:avLst/>
+          </a:prstGeom>
+          <a:noFill/>
+        </p:spPr>
+        <p:txBody>
+          <a:bodyPr wrap="none" rtlCol="0">
+            <a:spAutoFit/>
+          </a:bodyPr>
+          <a:lstStyle/>
+          <a:p>
+            <a:r>
+              <a:rPr lang="en-US"/>
+              <a:t>List of unique chis</a:t>
+            </a:r>
+            <a:endParaRPr lang="en-GB"/>
+          </a:p>
+        </p:txBody>
+      </p:sp>
+      <p:cxnSp>
+        <p:nvCxnSpPr>
+          <p:cNvPr id="12" name="Straight Arrow Connector 11">
+            <a:extLst>
+              <a:ext uri="{FF2B5EF4-FFF2-40B4-BE49-F238E27FC236}">
+                <a16:creationId xmlns:a16="http://schemas.microsoft.com/office/drawing/2014/main" id="{6E4ADF0E-40B3-4D7C-8225-EF532544CFC1}"/>
+              </a:ext>
+            </a:extLst>
+          </p:cNvPr>
+          <p:cNvCxnSpPr>
+            <a:cxnSpLocks/>
+          </p:cNvCxnSpPr>
+          <p:nvPr/>
+        </p:nvCxnSpPr>
+        <p:spPr>
+          <a:xfrm flipH="1" flipV="1">
+            <a:off x="2857500" y="2907105"/>
+            <a:ext cx="3924300" cy="12515"/>
+          </a:xfrm>
+          <a:prstGeom prst="straightConnector1">
+            <a:avLst/>
+          </a:prstGeom>
+          <a:ln>
+            <a:tailEnd type="triangle"/>
+          </a:ln>
+        </p:spPr>
+        <p:style>
+          <a:lnRef idx="1">
+            <a:schemeClr val="accent1"/>
+          </a:lnRef>
+          <a:fillRef idx="0">
+            <a:schemeClr val="accent1"/>
+          </a:fillRef>
+          <a:effectRef idx="0">
+            <a:schemeClr val="accent1"/>
+          </a:effectRef>
+          <a:fontRef idx="minor">
+            <a:schemeClr val="tx1"/>
+          </a:fontRef>
+        </p:style>
+      </p:cxnSp>
+      <p:pic>
+        <p:nvPicPr>
+          <p:cNvPr id="13" name="Picture 12">
+            <a:extLst>
+              <a:ext uri="{FF2B5EF4-FFF2-40B4-BE49-F238E27FC236}">
+                <a16:creationId xmlns:a16="http://schemas.microsoft.com/office/drawing/2014/main" id="{45D9917A-8419-42E5-B5B0-12DD839FCF91}"/>
+              </a:ext>
+            </a:extLst>
+          </p:cNvPr>
+          <p:cNvPicPr>
+            <a:picLocks noChangeAspect="1"/>
+          </p:cNvPicPr>
+          <p:nvPr/>
+        </p:nvPicPr>
+        <p:blipFill>
+          <a:blip r:embed="rId2"/>
+          <a:stretch>
+            <a:fillRect/>
+          </a:stretch>
+        </p:blipFill>
+        <p:spPr>
+          <a:xfrm>
+            <a:off x="3517001" y="1330707"/>
+            <a:ext cx="2578999" cy="1358024"/>
+          </a:xfrm>
+          <a:prstGeom prst="rect">
+            <a:avLst/>
+          </a:prstGeom>
+        </p:spPr>
+      </p:pic>
+    </p:spTree>
+    <p:extLst>
+      <p:ext uri="{BB962C8B-B14F-4D97-AF65-F5344CB8AC3E}">
+        <p14:creationId xmlns:p14="http://schemas.microsoft.com/office/powerpoint/2010/main" val="935709164"/>
       </p:ext>
     </p:extLst>
   </p:cSld>

</xml_diff>

<commit_message>
Removed out dated documentation
</commit_message>
<xml_diff>
--- a/Documentation/CohortGeneration.pptx
+++ b/Documentation/CohortGeneration.pptx
@@ -238,7 +238,7 @@
           <a:p>
             <a:fld id="{E6799723-5C7A-4148-A580-1582FB869D21}" type="datetimeFigureOut">
               <a:rPr lang="en-GB" smtClean="0"/>
-              <a:t>31/07/2018</a:t>
+              <a:t>23/08/2018</a:t>
             </a:fld>
             <a:endParaRPr lang="en-GB"/>
           </a:p>
@@ -721,7 +721,7 @@
           <a:p>
             <a:fld id="{A4B2E03E-B9F4-48CD-BEDC-03BA93144C1F}" type="datetimeFigureOut">
               <a:rPr lang="en-GB" smtClean="0"/>
-              <a:t>31/07/2018</a:t>
+              <a:t>23/08/2018</a:t>
             </a:fld>
             <a:endParaRPr lang="en-GB"/>
           </a:p>
@@ -891,7 +891,7 @@
           <a:p>
             <a:fld id="{A4B2E03E-B9F4-48CD-BEDC-03BA93144C1F}" type="datetimeFigureOut">
               <a:rPr lang="en-GB" smtClean="0"/>
-              <a:t>31/07/2018</a:t>
+              <a:t>23/08/2018</a:t>
             </a:fld>
             <a:endParaRPr lang="en-GB"/>
           </a:p>
@@ -1071,7 +1071,7 @@
           <a:p>
             <a:fld id="{A4B2E03E-B9F4-48CD-BEDC-03BA93144C1F}" type="datetimeFigureOut">
               <a:rPr lang="en-GB" smtClean="0"/>
-              <a:t>31/07/2018</a:t>
+              <a:t>23/08/2018</a:t>
             </a:fld>
             <a:endParaRPr lang="en-GB"/>
           </a:p>
@@ -1241,7 +1241,7 @@
           <a:p>
             <a:fld id="{A4B2E03E-B9F4-48CD-BEDC-03BA93144C1F}" type="datetimeFigureOut">
               <a:rPr lang="en-GB" smtClean="0"/>
-              <a:t>31/07/2018</a:t>
+              <a:t>23/08/2018</a:t>
             </a:fld>
             <a:endParaRPr lang="en-GB"/>
           </a:p>
@@ -1487,7 +1487,7 @@
           <a:p>
             <a:fld id="{A4B2E03E-B9F4-48CD-BEDC-03BA93144C1F}" type="datetimeFigureOut">
               <a:rPr lang="en-GB" smtClean="0"/>
-              <a:t>31/07/2018</a:t>
+              <a:t>23/08/2018</a:t>
             </a:fld>
             <a:endParaRPr lang="en-GB"/>
           </a:p>
@@ -1719,7 +1719,7 @@
           <a:p>
             <a:fld id="{A4B2E03E-B9F4-48CD-BEDC-03BA93144C1F}" type="datetimeFigureOut">
               <a:rPr lang="en-GB" smtClean="0"/>
-              <a:t>31/07/2018</a:t>
+              <a:t>23/08/2018</a:t>
             </a:fld>
             <a:endParaRPr lang="en-GB"/>
           </a:p>
@@ -2086,7 +2086,7 @@
           <a:p>
             <a:fld id="{A4B2E03E-B9F4-48CD-BEDC-03BA93144C1F}" type="datetimeFigureOut">
               <a:rPr lang="en-GB" smtClean="0"/>
-              <a:t>31/07/2018</a:t>
+              <a:t>23/08/2018</a:t>
             </a:fld>
             <a:endParaRPr lang="en-GB"/>
           </a:p>
@@ -2204,7 +2204,7 @@
           <a:p>
             <a:fld id="{A4B2E03E-B9F4-48CD-BEDC-03BA93144C1F}" type="datetimeFigureOut">
               <a:rPr lang="en-GB" smtClean="0"/>
-              <a:t>31/07/2018</a:t>
+              <a:t>23/08/2018</a:t>
             </a:fld>
             <a:endParaRPr lang="en-GB"/>
           </a:p>
@@ -2299,7 +2299,7 @@
           <a:p>
             <a:fld id="{A4B2E03E-B9F4-48CD-BEDC-03BA93144C1F}" type="datetimeFigureOut">
               <a:rPr lang="en-GB" smtClean="0"/>
-              <a:t>31/07/2018</a:t>
+              <a:t>23/08/2018</a:t>
             </a:fld>
             <a:endParaRPr lang="en-GB"/>
           </a:p>
@@ -2576,7 +2576,7 @@
           <a:p>
             <a:fld id="{A4B2E03E-B9F4-48CD-BEDC-03BA93144C1F}" type="datetimeFigureOut">
               <a:rPr lang="en-GB" smtClean="0"/>
-              <a:t>31/07/2018</a:t>
+              <a:t>23/08/2018</a:t>
             </a:fld>
             <a:endParaRPr lang="en-GB"/>
           </a:p>
@@ -2829,7 +2829,7 @@
           <a:p>
             <a:fld id="{A4B2E03E-B9F4-48CD-BEDC-03BA93144C1F}" type="datetimeFigureOut">
               <a:rPr lang="en-GB" smtClean="0"/>
-              <a:t>31/07/2018</a:t>
+              <a:t>23/08/2018</a:t>
             </a:fld>
             <a:endParaRPr lang="en-GB"/>
           </a:p>
@@ -3042,7 +3042,7 @@
           <a:p>
             <a:fld id="{A4B2E03E-B9F4-48CD-BEDC-03BA93144C1F}" type="datetimeFigureOut">
               <a:rPr lang="en-GB" smtClean="0"/>
-              <a:t>31/07/2018</a:t>
+              <a:t>23/08/2018</a:t>
             </a:fld>
             <a:endParaRPr lang="en-GB"/>
           </a:p>
@@ -4245,8 +4245,8 @@
         </p:nvSpPr>
         <p:spPr>
           <a:xfrm>
-            <a:off x="140380" y="5725133"/>
-            <a:ext cx="930063" cy="600164"/>
+            <a:off x="140380" y="5764488"/>
+            <a:ext cx="1319592" cy="600164"/>
           </a:xfrm>
           <a:prstGeom prst="rect">
             <a:avLst/>
@@ -4261,21 +4261,20 @@
           <a:p>
             <a:r>
               <a:rPr lang="en-US" sz="1100"/>
-              <a:t>Biochemistry</a:t>
+              <a:t>People who have</a:t>
             </a:r>
           </a:p>
           <a:p>
             <a:r>
               <a:rPr lang="en-US" sz="1100"/>
-              <a:t>People with </a:t>
+              <a:t>Ever Been residents</a:t>
             </a:r>
           </a:p>
           <a:p>
             <a:r>
               <a:rPr lang="en-US" sz="1100"/>
-              <a:t>Sodium tests</a:t>
-            </a:r>
-            <a:endParaRPr lang="en-GB" sz="1100"/>
+              <a:t>Of Fife</a:t>
+            </a:r>
           </a:p>
         </p:txBody>
       </p:sp>

</xml_diff>